<commit_message>
documented my approach to IK
</commit_message>
<xml_diff>
--- a/catkin_ws/diagrams.pptx
+++ b/catkin_ws/diagrams.pptx
@@ -615,7 +615,7 @@
           <a:p>
             <a:fld id="{50BABC5D-73AD-A341-9003-8412548A7140}" type="datetimeFigureOut">
               <a:rPr lang="en-US" smtClean="0"/>
-              <a:t>12/14/2018</a:t>
+              <a:t>12/14/18</a:t>
             </a:fld>
             <a:endParaRPr lang="en-US"/>
           </a:p>
@@ -813,7 +813,7 @@
           <a:p>
             <a:fld id="{50BABC5D-73AD-A341-9003-8412548A7140}" type="datetimeFigureOut">
               <a:rPr lang="en-US" smtClean="0"/>
-              <a:t>12/14/2018</a:t>
+              <a:t>12/14/18</a:t>
             </a:fld>
             <a:endParaRPr lang="en-US"/>
           </a:p>
@@ -1021,7 +1021,7 @@
           <a:p>
             <a:fld id="{50BABC5D-73AD-A341-9003-8412548A7140}" type="datetimeFigureOut">
               <a:rPr lang="en-US" smtClean="0"/>
-              <a:t>12/14/2018</a:t>
+              <a:t>12/14/18</a:t>
             </a:fld>
             <a:endParaRPr lang="en-US"/>
           </a:p>
@@ -1219,7 +1219,7 @@
           <a:p>
             <a:fld id="{50BABC5D-73AD-A341-9003-8412548A7140}" type="datetimeFigureOut">
               <a:rPr lang="en-US" smtClean="0"/>
-              <a:t>12/14/2018</a:t>
+              <a:t>12/14/18</a:t>
             </a:fld>
             <a:endParaRPr lang="en-US"/>
           </a:p>
@@ -1494,7 +1494,7 @@
           <a:p>
             <a:fld id="{50BABC5D-73AD-A341-9003-8412548A7140}" type="datetimeFigureOut">
               <a:rPr lang="en-US" smtClean="0"/>
-              <a:t>12/14/2018</a:t>
+              <a:t>12/14/18</a:t>
             </a:fld>
             <a:endParaRPr lang="en-US"/>
           </a:p>
@@ -1759,7 +1759,7 @@
           <a:p>
             <a:fld id="{50BABC5D-73AD-A341-9003-8412548A7140}" type="datetimeFigureOut">
               <a:rPr lang="en-US" smtClean="0"/>
-              <a:t>12/14/2018</a:t>
+              <a:t>12/14/18</a:t>
             </a:fld>
             <a:endParaRPr lang="en-US"/>
           </a:p>
@@ -2171,7 +2171,7 @@
           <a:p>
             <a:fld id="{50BABC5D-73AD-A341-9003-8412548A7140}" type="datetimeFigureOut">
               <a:rPr lang="en-US" smtClean="0"/>
-              <a:t>12/14/2018</a:t>
+              <a:t>12/14/18</a:t>
             </a:fld>
             <a:endParaRPr lang="en-US"/>
           </a:p>
@@ -2312,7 +2312,7 @@
           <a:p>
             <a:fld id="{50BABC5D-73AD-A341-9003-8412548A7140}" type="datetimeFigureOut">
               <a:rPr lang="en-US" smtClean="0"/>
-              <a:t>12/14/2018</a:t>
+              <a:t>12/14/18</a:t>
             </a:fld>
             <a:endParaRPr lang="en-US"/>
           </a:p>
@@ -2425,7 +2425,7 @@
           <a:p>
             <a:fld id="{50BABC5D-73AD-A341-9003-8412548A7140}" type="datetimeFigureOut">
               <a:rPr lang="en-US" smtClean="0"/>
-              <a:t>12/14/2018</a:t>
+              <a:t>12/14/18</a:t>
             </a:fld>
             <a:endParaRPr lang="en-US"/>
           </a:p>
@@ -2736,7 +2736,7 @@
           <a:p>
             <a:fld id="{50BABC5D-73AD-A341-9003-8412548A7140}" type="datetimeFigureOut">
               <a:rPr lang="en-US" smtClean="0"/>
-              <a:t>12/14/2018</a:t>
+              <a:t>12/14/18</a:t>
             </a:fld>
             <a:endParaRPr lang="en-US"/>
           </a:p>
@@ -3024,7 +3024,7 @@
           <a:p>
             <a:fld id="{50BABC5D-73AD-A341-9003-8412548A7140}" type="datetimeFigureOut">
               <a:rPr lang="en-US" smtClean="0"/>
-              <a:t>12/14/2018</a:t>
+              <a:t>12/14/18</a:t>
             </a:fld>
             <a:endParaRPr lang="en-US"/>
           </a:p>
@@ -3265,7 +3265,7 @@
           <a:p>
             <a:fld id="{50BABC5D-73AD-A341-9003-8412548A7140}" type="datetimeFigureOut">
               <a:rPr lang="en-US" smtClean="0"/>
-              <a:t>12/14/2018</a:t>
+              <a:t>12/14/18</a:t>
             </a:fld>
             <a:endParaRPr lang="en-US"/>
           </a:p>
@@ -7990,8 +7990,8 @@
         </p:nvSpPr>
         <p:spPr>
           <a:xfrm>
-            <a:off x="6586861" y="2501328"/>
-            <a:ext cx="335492" cy="283634"/>
+            <a:off x="5031362" y="2103987"/>
+            <a:ext cx="65690" cy="93134"/>
           </a:xfrm>
           <a:custGeom>
             <a:avLst/>
@@ -8052,6 +8052,26 @@
               <a:gd name="connsiteY0" fmla="*/ 0 h 283634"/>
               <a:gd name="connsiteX1" fmla="*/ 335492 w 335492"/>
               <a:gd name="connsiteY1" fmla="*/ 283634 h 283634"/>
+              <a:gd name="connsiteX0" fmla="*/ 0 w 113242"/>
+              <a:gd name="connsiteY0" fmla="*/ 23817 h 101076"/>
+              <a:gd name="connsiteX1" fmla="*/ 113242 w 113242"/>
+              <a:gd name="connsiteY1" fmla="*/ 101076 h 101076"/>
+              <a:gd name="connsiteX0" fmla="*/ 0 w 131430"/>
+              <a:gd name="connsiteY0" fmla="*/ 0 h 77259"/>
+              <a:gd name="connsiteX1" fmla="*/ 113242 w 131430"/>
+              <a:gd name="connsiteY1" fmla="*/ 77259 h 77259"/>
+              <a:gd name="connsiteX0" fmla="*/ 0 w 88086"/>
+              <a:gd name="connsiteY0" fmla="*/ 0 h 96309"/>
+              <a:gd name="connsiteX1" fmla="*/ 33867 w 88086"/>
+              <a:gd name="connsiteY1" fmla="*/ 96309 h 96309"/>
+              <a:gd name="connsiteX0" fmla="*/ 0 w 51968"/>
+              <a:gd name="connsiteY0" fmla="*/ 0 h 96309"/>
+              <a:gd name="connsiteX1" fmla="*/ 33867 w 51968"/>
+              <a:gd name="connsiteY1" fmla="*/ 96309 h 96309"/>
+              <a:gd name="connsiteX0" fmla="*/ 0 w 65690"/>
+              <a:gd name="connsiteY0" fmla="*/ 0 h 93134"/>
+              <a:gd name="connsiteX1" fmla="*/ 52917 w 65690"/>
+              <a:gd name="connsiteY1" fmla="*/ 93134 h 93134"/>
             </a:gdLst>
             <a:ahLst/>
             <a:cxnLst>
@@ -8064,14 +8084,14 @@
             </a:cxnLst>
             <a:rect l="l" t="t" r="r" b="b"/>
             <a:pathLst>
-              <a:path w="335492" h="283634">
+              <a:path w="65690" h="93134">
                 <a:moveTo>
                   <a:pt x="0" y="0"/>
                 </a:moveTo>
                 <a:cubicBezTo>
-                  <a:pt x="156634" y="2116"/>
-                  <a:pt x="319617" y="115359"/>
-                  <a:pt x="335492" y="283634"/>
+                  <a:pt x="61384" y="8466"/>
+                  <a:pt x="81492" y="70909"/>
+                  <a:pt x="52917" y="93134"/>
                 </a:cubicBezTo>
               </a:path>
             </a:pathLst>
@@ -8082,7 +8102,7 @@
               <a:schemeClr val="tx1"/>
             </a:solidFill>
             <a:headEnd type="triangle" w="med" len="med"/>
-            <a:tailEnd type="none" w="med" len="med"/>
+            <a:tailEnd type="none" w="sm" len="med"/>
           </a:ln>
         </p:spPr>
         <p:style>
@@ -8124,7 +8144,7 @@
         </p:nvSpPr>
         <p:spPr>
           <a:xfrm>
-            <a:off x="6754970" y="2390011"/>
+            <a:off x="5125375" y="2075409"/>
             <a:ext cx="154845" cy="138499"/>
           </a:xfrm>
           <a:prstGeom prst="rect">
@@ -8143,11 +8163,11 @@
           <a:p>
             <a:r>
               <a:rPr lang="en-US" sz="900" dirty="0"/>
-              <a:t>θ</a:t>
+              <a:t>g</a:t>
             </a:r>
             <a:r>
               <a:rPr lang="en-US" sz="900" baseline="-25000" dirty="0"/>
-              <a:t>2</a:t>
+              <a:t>1</a:t>
             </a:r>
           </a:p>
         </p:txBody>
@@ -9614,7 +9634,7 @@
         </p:nvSpPr>
         <p:spPr>
           <a:xfrm>
-            <a:off x="4909020" y="1597270"/>
+            <a:off x="4953536" y="1607918"/>
             <a:ext cx="172067" cy="138499"/>
           </a:xfrm>
           <a:prstGeom prst="rect">
@@ -9637,7 +9657,7 @@
             </a:r>
             <a:r>
               <a:rPr lang="en-US" sz="900" baseline="-25000" dirty="0"/>
-              <a:t>3</a:t>
+              <a:t>34</a:t>
             </a:r>
           </a:p>
         </p:txBody>
@@ -9999,7 +10019,7 @@
         </p:nvSpPr>
         <p:spPr>
           <a:xfrm>
-            <a:off x="4632979" y="1730883"/>
+            <a:off x="4560032" y="1561447"/>
             <a:ext cx="104775" cy="138499"/>
           </a:xfrm>
           <a:prstGeom prst="rect">
@@ -10081,7 +10101,7 @@
         <p:spPr>
           <a:xfrm>
             <a:off x="1975269" y="812940"/>
-            <a:ext cx="1662364" cy="830997"/>
+            <a:ext cx="1662364" cy="1015663"/>
           </a:xfrm>
           <a:prstGeom prst="rect">
             <a:avLst/>
@@ -10095,57 +10115,86 @@
           <a:p>
             <a:r>
               <a:rPr lang="en-GB" sz="600" dirty="0"/>
-              <a:t>1. Calculate C from A and B</a:t>
-            </a:r>
-          </a:p>
-          <a:p>
+              <a:t>1. Calculate H4WC from </a:t>
+            </a:r>
+            <a:r>
+              <a:rPr lang="en-GB" sz="600" dirty="0" err="1"/>
+              <a:t>WCx</a:t>
+            </a:r>
             <a:r>
               <a:rPr lang="en-GB" sz="600" dirty="0"/>
-              <a:t>2. Calculate CA from ABC</a:t>
-            </a:r>
+              <a:t> and </a:t>
+            </a:r>
+            <a:r>
+              <a:rPr lang="en-GB" sz="600" dirty="0" err="1"/>
+              <a:t>WCy</a:t>
+            </a:r>
+            <a:endParaRPr lang="en-GB" sz="600" dirty="0"/>
           </a:p>
           <a:p>
             <a:r>
               <a:rPr lang="en-GB" sz="600" dirty="0"/>
-              <a:t>3. Calculate F from L3 and L4 (E)</a:t>
-            </a:r>
-          </a:p>
-          <a:p>
+              <a:t>2. Calculate CA from H4WC, </a:t>
+            </a:r>
+            <a:r>
+              <a:rPr lang="en-GB" sz="600" dirty="0" err="1"/>
+              <a:t>WCx</a:t>
+            </a:r>
             <a:r>
               <a:rPr lang="en-GB" sz="600" dirty="0"/>
-              <a:t>4. calculate angle DC from lengths DFC</a:t>
-            </a:r>
+              <a:t>, </a:t>
+            </a:r>
+            <a:r>
+              <a:rPr lang="en-GB" sz="600" dirty="0" err="1"/>
+              <a:t>Wcy</a:t>
+            </a:r>
+            <a:endParaRPr lang="en-GB" sz="600" dirty="0"/>
           </a:p>
           <a:p>
             <a:r>
               <a:rPr lang="en-GB" sz="600" dirty="0"/>
-              <a:t>5. Calculate theta2 from sum angle DC+CA</a:t>
-            </a:r>
+              <a:t>3. Calculate L4xcx = sqrt(a3*a3 – 0.54*0.54) (</a:t>
+            </a:r>
+            <a:r>
+              <a:rPr lang="en-GB" sz="600"/>
+              <a:t>x displacement J4 to WC)</a:t>
+            </a:r>
+            <a:endParaRPr lang="en-GB" sz="600" dirty="0"/>
           </a:p>
           <a:p>
             <a:r>
               <a:rPr lang="en-GB" sz="600" dirty="0"/>
-              <a:t>6. Calculate angle FL3 from triangle FEL3</a:t>
+              <a:t>4. Calculate L3wc as sum L34x + L4wcx</a:t>
             </a:r>
           </a:p>
           <a:p>
             <a:r>
               <a:rPr lang="en-GB" sz="600" dirty="0"/>
-              <a:t>7. calculate angle DF from triangle DFC</a:t>
+              <a:t>5. Calculate g2 from a2, H4wc, (L34x+L4WCx)</a:t>
             </a:r>
           </a:p>
           <a:p>
             <a:r>
               <a:rPr lang="en-GB" sz="600" dirty="0"/>
-              <a:t>8. subtract </a:t>
-            </a:r>
-            <a:r>
-              <a:rPr lang="en-GB" sz="600" dirty="0" err="1"/>
-              <a:t>abgle</a:t>
-            </a:r>
+              <a:t>6. Calculate g3 from a2, H4wc, (L34x+L4WCx)</a:t>
+            </a:r>
+          </a:p>
+          <a:p>
             <a:r>
               <a:rPr lang="en-GB" sz="600" dirty="0"/>
-              <a:t> FL3 from angle DF</a:t>
+              <a:t>7. Calculate L34 from sqrt(L34x*L34x + a3*a3)</a:t>
+            </a:r>
+          </a:p>
+          <a:p>
+            <a:r>
+              <a:rPr lang="en-GB" sz="600" dirty="0"/>
+              <a:t>7. Calculate g4 from L34x, a3, L34</a:t>
+            </a:r>
+          </a:p>
+          <a:p>
+            <a:r>
+              <a:rPr lang="en-GB" sz="600" dirty="0"/>
+              <a:t>8. Calculate theta3 from g3 – g4</a:t>
             </a:r>
           </a:p>
         </p:txBody>
@@ -10272,16 +10321,13 @@
           <a:p>
             <a:r>
               <a:rPr lang="en-US" sz="900" dirty="0"/>
-              <a:t>L</a:t>
+              <a:t>a</a:t>
             </a:r>
             <a:r>
               <a:rPr lang="en-US" sz="900" baseline="-25000" dirty="0"/>
-              <a:t>34</a:t>
-            </a:r>
-            <a:r>
-              <a:rPr lang="en-US" sz="900" dirty="0"/>
-              <a:t>y</a:t>
-            </a:r>
+              <a:t>3</a:t>
+            </a:r>
+            <a:endParaRPr lang="en-US" sz="900" dirty="0"/>
           </a:p>
         </p:txBody>
       </p:sp>
@@ -10385,7 +10431,7 @@
         </p:nvSpPr>
         <p:spPr>
           <a:xfrm rot="1674800">
-            <a:off x="5251403" y="1628786"/>
+            <a:off x="5254578" y="1631961"/>
             <a:ext cx="45719" cy="45719"/>
           </a:xfrm>
           <a:prstGeom prst="rect">
@@ -10549,6 +10595,980 @@
             <a:r>
               <a:rPr lang="en-US" sz="900" dirty="0"/>
               <a:t>x</a:t>
+            </a:r>
+          </a:p>
+        </p:txBody>
+      </p:sp>
+      <p:sp>
+        <p:nvSpPr>
+          <p:cNvPr id="64" name="Freeform 63">
+            <a:extLst>
+              <a:ext uri="{FF2B5EF4-FFF2-40B4-BE49-F238E27FC236}">
+                <a16:creationId xmlns:a16="http://schemas.microsoft.com/office/drawing/2014/main" id="{2919C9E4-A866-1A48-A904-60092D9A6B66}"/>
+              </a:ext>
+            </a:extLst>
+          </p:cNvPr>
+          <p:cNvSpPr/>
+          <p:nvPr/>
+        </p:nvSpPr>
+        <p:spPr>
+          <a:xfrm>
+            <a:off x="4596582" y="1900813"/>
+            <a:ext cx="174274" cy="229659"/>
+          </a:xfrm>
+          <a:custGeom>
+            <a:avLst/>
+            <a:gdLst>
+              <a:gd name="connsiteX0" fmla="*/ 0 w 147545"/>
+              <a:gd name="connsiteY0" fmla="*/ 0 h 212781"/>
+              <a:gd name="connsiteX1" fmla="*/ 146050 w 147545"/>
+              <a:gd name="connsiteY1" fmla="*/ 200025 h 212781"/>
+              <a:gd name="connsiteX2" fmla="*/ 79375 w 147545"/>
+              <a:gd name="connsiteY2" fmla="*/ 203200 h 212781"/>
+              <a:gd name="connsiteX0" fmla="*/ 0 w 153794"/>
+              <a:gd name="connsiteY0" fmla="*/ 0 h 203200"/>
+              <a:gd name="connsiteX1" fmla="*/ 152400 w 153794"/>
+              <a:gd name="connsiteY1" fmla="*/ 66675 h 203200"/>
+              <a:gd name="connsiteX2" fmla="*/ 79375 w 153794"/>
+              <a:gd name="connsiteY2" fmla="*/ 203200 h 203200"/>
+              <a:gd name="connsiteX0" fmla="*/ 0 w 79375"/>
+              <a:gd name="connsiteY0" fmla="*/ 0 h 203200"/>
+              <a:gd name="connsiteX1" fmla="*/ 79375 w 79375"/>
+              <a:gd name="connsiteY1" fmla="*/ 203200 h 203200"/>
+              <a:gd name="connsiteX0" fmla="*/ 0 w 142919"/>
+              <a:gd name="connsiteY0" fmla="*/ 0 h 203200"/>
+              <a:gd name="connsiteX1" fmla="*/ 79375 w 142919"/>
+              <a:gd name="connsiteY1" fmla="*/ 203200 h 203200"/>
+              <a:gd name="connsiteX0" fmla="*/ 0 w 186211"/>
+              <a:gd name="connsiteY0" fmla="*/ 0 h 203200"/>
+              <a:gd name="connsiteX1" fmla="*/ 79375 w 186211"/>
+              <a:gd name="connsiteY1" fmla="*/ 203200 h 203200"/>
+              <a:gd name="connsiteX0" fmla="*/ 0 w 125812"/>
+              <a:gd name="connsiteY0" fmla="*/ 0 h 203200"/>
+              <a:gd name="connsiteX1" fmla="*/ 79375 w 125812"/>
+              <a:gd name="connsiteY1" fmla="*/ 203200 h 203200"/>
+              <a:gd name="connsiteX0" fmla="*/ 0 w 122234"/>
+              <a:gd name="connsiteY0" fmla="*/ 1233 h 204433"/>
+              <a:gd name="connsiteX1" fmla="*/ 79375 w 122234"/>
+              <a:gd name="connsiteY1" fmla="*/ 204433 h 204433"/>
+              <a:gd name="connsiteX0" fmla="*/ 0 w 148382"/>
+              <a:gd name="connsiteY0" fmla="*/ 1233 h 204433"/>
+              <a:gd name="connsiteX1" fmla="*/ 111125 w 148382"/>
+              <a:gd name="connsiteY1" fmla="*/ 204433 h 204433"/>
+              <a:gd name="connsiteX0" fmla="*/ 0 w 354546"/>
+              <a:gd name="connsiteY0" fmla="*/ 772 h 284406"/>
+              <a:gd name="connsiteX1" fmla="*/ 335492 w 354546"/>
+              <a:gd name="connsiteY1" fmla="*/ 284406 h 284406"/>
+              <a:gd name="connsiteX0" fmla="*/ 0 w 335731"/>
+              <a:gd name="connsiteY0" fmla="*/ 1961 h 285595"/>
+              <a:gd name="connsiteX1" fmla="*/ 335492 w 335731"/>
+              <a:gd name="connsiteY1" fmla="*/ 285595 h 285595"/>
+              <a:gd name="connsiteX0" fmla="*/ 0 w 336219"/>
+              <a:gd name="connsiteY0" fmla="*/ 60 h 283694"/>
+              <a:gd name="connsiteX1" fmla="*/ 335492 w 336219"/>
+              <a:gd name="connsiteY1" fmla="*/ 283694 h 283694"/>
+              <a:gd name="connsiteX0" fmla="*/ 0 w 335839"/>
+              <a:gd name="connsiteY0" fmla="*/ 0 h 283634"/>
+              <a:gd name="connsiteX1" fmla="*/ 335492 w 335839"/>
+              <a:gd name="connsiteY1" fmla="*/ 283634 h 283634"/>
+              <a:gd name="connsiteX0" fmla="*/ 0 w 335492"/>
+              <a:gd name="connsiteY0" fmla="*/ 0 h 283634"/>
+              <a:gd name="connsiteX1" fmla="*/ 335492 w 335492"/>
+              <a:gd name="connsiteY1" fmla="*/ 283634 h 283634"/>
+              <a:gd name="connsiteX0" fmla="*/ 0 w 113242"/>
+              <a:gd name="connsiteY0" fmla="*/ 23817 h 101076"/>
+              <a:gd name="connsiteX1" fmla="*/ 113242 w 113242"/>
+              <a:gd name="connsiteY1" fmla="*/ 101076 h 101076"/>
+              <a:gd name="connsiteX0" fmla="*/ 0 w 131430"/>
+              <a:gd name="connsiteY0" fmla="*/ 0 h 77259"/>
+              <a:gd name="connsiteX1" fmla="*/ 113242 w 131430"/>
+              <a:gd name="connsiteY1" fmla="*/ 77259 h 77259"/>
+              <a:gd name="connsiteX0" fmla="*/ 0 w 88086"/>
+              <a:gd name="connsiteY0" fmla="*/ 0 h 96309"/>
+              <a:gd name="connsiteX1" fmla="*/ 33867 w 88086"/>
+              <a:gd name="connsiteY1" fmla="*/ 96309 h 96309"/>
+              <a:gd name="connsiteX0" fmla="*/ 0 w 51968"/>
+              <a:gd name="connsiteY0" fmla="*/ 0 h 96309"/>
+              <a:gd name="connsiteX1" fmla="*/ 33867 w 51968"/>
+              <a:gd name="connsiteY1" fmla="*/ 96309 h 96309"/>
+              <a:gd name="connsiteX0" fmla="*/ 0 w 65690"/>
+              <a:gd name="connsiteY0" fmla="*/ 0 h 93134"/>
+              <a:gd name="connsiteX1" fmla="*/ 52917 w 65690"/>
+              <a:gd name="connsiteY1" fmla="*/ 93134 h 93134"/>
+              <a:gd name="connsiteX0" fmla="*/ 0 w 171150"/>
+              <a:gd name="connsiteY0" fmla="*/ 0 h 229659"/>
+              <a:gd name="connsiteX1" fmla="*/ 167217 w 171150"/>
+              <a:gd name="connsiteY1" fmla="*/ 229659 h 229659"/>
+              <a:gd name="connsiteX0" fmla="*/ 0 w 172717"/>
+              <a:gd name="connsiteY0" fmla="*/ 0 h 229659"/>
+              <a:gd name="connsiteX1" fmla="*/ 167217 w 172717"/>
+              <a:gd name="connsiteY1" fmla="*/ 229659 h 229659"/>
+              <a:gd name="connsiteX0" fmla="*/ 0 w 178939"/>
+              <a:gd name="connsiteY0" fmla="*/ 0 h 229659"/>
+              <a:gd name="connsiteX1" fmla="*/ 167217 w 178939"/>
+              <a:gd name="connsiteY1" fmla="*/ 229659 h 229659"/>
+              <a:gd name="connsiteX0" fmla="*/ 0 w 174274"/>
+              <a:gd name="connsiteY0" fmla="*/ 0 h 229659"/>
+              <a:gd name="connsiteX1" fmla="*/ 167217 w 174274"/>
+              <a:gd name="connsiteY1" fmla="*/ 229659 h 229659"/>
+            </a:gdLst>
+            <a:ahLst/>
+            <a:cxnLst>
+              <a:cxn ang="0">
+                <a:pos x="connsiteX0" y="connsiteY0"/>
+              </a:cxn>
+              <a:cxn ang="0">
+                <a:pos x="connsiteX1" y="connsiteY1"/>
+              </a:cxn>
+            </a:cxnLst>
+            <a:rect l="l" t="t" r="r" b="b"/>
+            <a:pathLst>
+              <a:path w="174274" h="229659">
+                <a:moveTo>
+                  <a:pt x="0" y="0"/>
+                </a:moveTo>
+                <a:cubicBezTo>
+                  <a:pt x="109009" y="17991"/>
+                  <a:pt x="200882" y="96988"/>
+                  <a:pt x="167217" y="229659"/>
+                </a:cubicBezTo>
+              </a:path>
+            </a:pathLst>
+          </a:custGeom>
+          <a:noFill/>
+          <a:ln>
+            <a:solidFill>
+              <a:schemeClr val="tx1"/>
+            </a:solidFill>
+            <a:headEnd type="triangle" w="med" len="med"/>
+            <a:tailEnd type="none" w="sm" len="med"/>
+          </a:ln>
+        </p:spPr>
+        <p:style>
+          <a:lnRef idx="2">
+            <a:schemeClr val="accent1">
+              <a:shade val="50000"/>
+            </a:schemeClr>
+          </a:lnRef>
+          <a:fillRef idx="1">
+            <a:schemeClr val="accent1"/>
+          </a:fillRef>
+          <a:effectRef idx="0">
+            <a:schemeClr val="accent1"/>
+          </a:effectRef>
+          <a:fontRef idx="minor">
+            <a:schemeClr val="lt1"/>
+          </a:fontRef>
+        </p:style>
+        <p:txBody>
+          <a:bodyPr rtlCol="0" anchor="ctr"/>
+          <a:lstStyle/>
+          <a:p>
+            <a:pPr algn="ctr"/>
+            <a:endParaRPr lang="en-US"/>
+          </a:p>
+        </p:txBody>
+      </p:sp>
+      <p:sp>
+        <p:nvSpPr>
+          <p:cNvPr id="66" name="TextBox 65">
+            <a:extLst>
+              <a:ext uri="{FF2B5EF4-FFF2-40B4-BE49-F238E27FC236}">
+                <a16:creationId xmlns:a16="http://schemas.microsoft.com/office/drawing/2014/main" id="{AFCA11D4-CA72-7A4E-9EC8-2F7190E26C08}"/>
+              </a:ext>
+            </a:extLst>
+          </p:cNvPr>
+          <p:cNvSpPr txBox="1"/>
+          <p:nvPr/>
+        </p:nvSpPr>
+        <p:spPr>
+          <a:xfrm>
+            <a:off x="4659864" y="1931942"/>
+            <a:ext cx="154845" cy="138499"/>
+          </a:xfrm>
+          <a:prstGeom prst="rect">
+            <a:avLst/>
+          </a:prstGeom>
+          <a:noFill/>
+          <a:ln>
+            <a:noFill/>
+          </a:ln>
+        </p:spPr>
+        <p:txBody>
+          <a:bodyPr wrap="square" lIns="0" tIns="0" rIns="0" bIns="0" rtlCol="0">
+            <a:spAutoFit/>
+          </a:bodyPr>
+          <a:lstStyle/>
+          <a:p>
+            <a:r>
+              <a:rPr lang="en-US" sz="900" dirty="0"/>
+              <a:t>g</a:t>
+            </a:r>
+            <a:r>
+              <a:rPr lang="en-US" sz="900" baseline="-25000" dirty="0"/>
+              <a:t>2</a:t>
+            </a:r>
+          </a:p>
+        </p:txBody>
+      </p:sp>
+      <p:sp>
+        <p:nvSpPr>
+          <p:cNvPr id="67" name="Freeform 66">
+            <a:extLst>
+              <a:ext uri="{FF2B5EF4-FFF2-40B4-BE49-F238E27FC236}">
+                <a16:creationId xmlns:a16="http://schemas.microsoft.com/office/drawing/2014/main" id="{E4127EA4-724D-E048-B277-3119A2536AF2}"/>
+              </a:ext>
+            </a:extLst>
+          </p:cNvPr>
+          <p:cNvSpPr/>
+          <p:nvPr/>
+        </p:nvSpPr>
+        <p:spPr>
+          <a:xfrm>
+            <a:off x="4627471" y="1772037"/>
+            <a:ext cx="274098" cy="432859"/>
+          </a:xfrm>
+          <a:custGeom>
+            <a:avLst/>
+            <a:gdLst>
+              <a:gd name="connsiteX0" fmla="*/ 0 w 147545"/>
+              <a:gd name="connsiteY0" fmla="*/ 0 h 212781"/>
+              <a:gd name="connsiteX1" fmla="*/ 146050 w 147545"/>
+              <a:gd name="connsiteY1" fmla="*/ 200025 h 212781"/>
+              <a:gd name="connsiteX2" fmla="*/ 79375 w 147545"/>
+              <a:gd name="connsiteY2" fmla="*/ 203200 h 212781"/>
+              <a:gd name="connsiteX0" fmla="*/ 0 w 153794"/>
+              <a:gd name="connsiteY0" fmla="*/ 0 h 203200"/>
+              <a:gd name="connsiteX1" fmla="*/ 152400 w 153794"/>
+              <a:gd name="connsiteY1" fmla="*/ 66675 h 203200"/>
+              <a:gd name="connsiteX2" fmla="*/ 79375 w 153794"/>
+              <a:gd name="connsiteY2" fmla="*/ 203200 h 203200"/>
+              <a:gd name="connsiteX0" fmla="*/ 0 w 79375"/>
+              <a:gd name="connsiteY0" fmla="*/ 0 h 203200"/>
+              <a:gd name="connsiteX1" fmla="*/ 79375 w 79375"/>
+              <a:gd name="connsiteY1" fmla="*/ 203200 h 203200"/>
+              <a:gd name="connsiteX0" fmla="*/ 0 w 142919"/>
+              <a:gd name="connsiteY0" fmla="*/ 0 h 203200"/>
+              <a:gd name="connsiteX1" fmla="*/ 79375 w 142919"/>
+              <a:gd name="connsiteY1" fmla="*/ 203200 h 203200"/>
+              <a:gd name="connsiteX0" fmla="*/ 0 w 186211"/>
+              <a:gd name="connsiteY0" fmla="*/ 0 h 203200"/>
+              <a:gd name="connsiteX1" fmla="*/ 79375 w 186211"/>
+              <a:gd name="connsiteY1" fmla="*/ 203200 h 203200"/>
+              <a:gd name="connsiteX0" fmla="*/ 0 w 125812"/>
+              <a:gd name="connsiteY0" fmla="*/ 0 h 203200"/>
+              <a:gd name="connsiteX1" fmla="*/ 79375 w 125812"/>
+              <a:gd name="connsiteY1" fmla="*/ 203200 h 203200"/>
+              <a:gd name="connsiteX0" fmla="*/ 0 w 122234"/>
+              <a:gd name="connsiteY0" fmla="*/ 1233 h 204433"/>
+              <a:gd name="connsiteX1" fmla="*/ 79375 w 122234"/>
+              <a:gd name="connsiteY1" fmla="*/ 204433 h 204433"/>
+              <a:gd name="connsiteX0" fmla="*/ 0 w 148382"/>
+              <a:gd name="connsiteY0" fmla="*/ 1233 h 204433"/>
+              <a:gd name="connsiteX1" fmla="*/ 111125 w 148382"/>
+              <a:gd name="connsiteY1" fmla="*/ 204433 h 204433"/>
+              <a:gd name="connsiteX0" fmla="*/ 0 w 354546"/>
+              <a:gd name="connsiteY0" fmla="*/ 772 h 284406"/>
+              <a:gd name="connsiteX1" fmla="*/ 335492 w 354546"/>
+              <a:gd name="connsiteY1" fmla="*/ 284406 h 284406"/>
+              <a:gd name="connsiteX0" fmla="*/ 0 w 335731"/>
+              <a:gd name="connsiteY0" fmla="*/ 1961 h 285595"/>
+              <a:gd name="connsiteX1" fmla="*/ 335492 w 335731"/>
+              <a:gd name="connsiteY1" fmla="*/ 285595 h 285595"/>
+              <a:gd name="connsiteX0" fmla="*/ 0 w 336219"/>
+              <a:gd name="connsiteY0" fmla="*/ 60 h 283694"/>
+              <a:gd name="connsiteX1" fmla="*/ 335492 w 336219"/>
+              <a:gd name="connsiteY1" fmla="*/ 283694 h 283694"/>
+              <a:gd name="connsiteX0" fmla="*/ 0 w 335839"/>
+              <a:gd name="connsiteY0" fmla="*/ 0 h 283634"/>
+              <a:gd name="connsiteX1" fmla="*/ 335492 w 335839"/>
+              <a:gd name="connsiteY1" fmla="*/ 283634 h 283634"/>
+              <a:gd name="connsiteX0" fmla="*/ 0 w 335492"/>
+              <a:gd name="connsiteY0" fmla="*/ 0 h 283634"/>
+              <a:gd name="connsiteX1" fmla="*/ 335492 w 335492"/>
+              <a:gd name="connsiteY1" fmla="*/ 283634 h 283634"/>
+              <a:gd name="connsiteX0" fmla="*/ 0 w 113242"/>
+              <a:gd name="connsiteY0" fmla="*/ 23817 h 101076"/>
+              <a:gd name="connsiteX1" fmla="*/ 113242 w 113242"/>
+              <a:gd name="connsiteY1" fmla="*/ 101076 h 101076"/>
+              <a:gd name="connsiteX0" fmla="*/ 0 w 131430"/>
+              <a:gd name="connsiteY0" fmla="*/ 0 h 77259"/>
+              <a:gd name="connsiteX1" fmla="*/ 113242 w 131430"/>
+              <a:gd name="connsiteY1" fmla="*/ 77259 h 77259"/>
+              <a:gd name="connsiteX0" fmla="*/ 0 w 88086"/>
+              <a:gd name="connsiteY0" fmla="*/ 0 h 96309"/>
+              <a:gd name="connsiteX1" fmla="*/ 33867 w 88086"/>
+              <a:gd name="connsiteY1" fmla="*/ 96309 h 96309"/>
+              <a:gd name="connsiteX0" fmla="*/ 0 w 51968"/>
+              <a:gd name="connsiteY0" fmla="*/ 0 h 96309"/>
+              <a:gd name="connsiteX1" fmla="*/ 33867 w 51968"/>
+              <a:gd name="connsiteY1" fmla="*/ 96309 h 96309"/>
+              <a:gd name="connsiteX0" fmla="*/ 0 w 65690"/>
+              <a:gd name="connsiteY0" fmla="*/ 0 h 93134"/>
+              <a:gd name="connsiteX1" fmla="*/ 52917 w 65690"/>
+              <a:gd name="connsiteY1" fmla="*/ 93134 h 93134"/>
+              <a:gd name="connsiteX0" fmla="*/ 0 w 171150"/>
+              <a:gd name="connsiteY0" fmla="*/ 0 h 229659"/>
+              <a:gd name="connsiteX1" fmla="*/ 167217 w 171150"/>
+              <a:gd name="connsiteY1" fmla="*/ 229659 h 229659"/>
+              <a:gd name="connsiteX0" fmla="*/ 0 w 172717"/>
+              <a:gd name="connsiteY0" fmla="*/ 0 h 229659"/>
+              <a:gd name="connsiteX1" fmla="*/ 167217 w 172717"/>
+              <a:gd name="connsiteY1" fmla="*/ 229659 h 229659"/>
+              <a:gd name="connsiteX0" fmla="*/ 0 w 178939"/>
+              <a:gd name="connsiteY0" fmla="*/ 0 h 229659"/>
+              <a:gd name="connsiteX1" fmla="*/ 167217 w 178939"/>
+              <a:gd name="connsiteY1" fmla="*/ 229659 h 229659"/>
+              <a:gd name="connsiteX0" fmla="*/ 0 w 248138"/>
+              <a:gd name="connsiteY0" fmla="*/ 0 h 432859"/>
+              <a:gd name="connsiteX1" fmla="*/ 240242 w 248138"/>
+              <a:gd name="connsiteY1" fmla="*/ 432859 h 432859"/>
+              <a:gd name="connsiteX0" fmla="*/ 0 w 265317"/>
+              <a:gd name="connsiteY0" fmla="*/ 0 h 432859"/>
+              <a:gd name="connsiteX1" fmla="*/ 240242 w 265317"/>
+              <a:gd name="connsiteY1" fmla="*/ 432859 h 432859"/>
+              <a:gd name="connsiteX0" fmla="*/ 0 w 274098"/>
+              <a:gd name="connsiteY0" fmla="*/ 0 h 432859"/>
+              <a:gd name="connsiteX1" fmla="*/ 240242 w 274098"/>
+              <a:gd name="connsiteY1" fmla="*/ 432859 h 432859"/>
+            </a:gdLst>
+            <a:ahLst/>
+            <a:cxnLst>
+              <a:cxn ang="0">
+                <a:pos x="connsiteX0" y="connsiteY0"/>
+              </a:cxn>
+              <a:cxn ang="0">
+                <a:pos x="connsiteX1" y="connsiteY1"/>
+              </a:cxn>
+            </a:cxnLst>
+            <a:rect l="l" t="t" r="r" b="b"/>
+            <a:pathLst>
+              <a:path w="274098" h="432859">
+                <a:moveTo>
+                  <a:pt x="0" y="0"/>
+                </a:moveTo>
+                <a:cubicBezTo>
+                  <a:pt x="201084" y="49741"/>
+                  <a:pt x="341842" y="293159"/>
+                  <a:pt x="240242" y="432859"/>
+                </a:cubicBezTo>
+              </a:path>
+            </a:pathLst>
+          </a:custGeom>
+          <a:noFill/>
+          <a:ln>
+            <a:solidFill>
+              <a:schemeClr val="tx1"/>
+            </a:solidFill>
+            <a:headEnd type="triangle" w="med" len="med"/>
+            <a:tailEnd type="none" w="sm" len="med"/>
+          </a:ln>
+        </p:spPr>
+        <p:style>
+          <a:lnRef idx="2">
+            <a:schemeClr val="accent1">
+              <a:shade val="50000"/>
+            </a:schemeClr>
+          </a:lnRef>
+          <a:fillRef idx="1">
+            <a:schemeClr val="accent1"/>
+          </a:fillRef>
+          <a:effectRef idx="0">
+            <a:schemeClr val="accent1"/>
+          </a:effectRef>
+          <a:fontRef idx="minor">
+            <a:schemeClr val="lt1"/>
+          </a:fontRef>
+        </p:style>
+        <p:txBody>
+          <a:bodyPr rtlCol="0" anchor="ctr"/>
+          <a:lstStyle/>
+          <a:p>
+            <a:pPr algn="ctr"/>
+            <a:endParaRPr lang="en-US"/>
+          </a:p>
+        </p:txBody>
+      </p:sp>
+      <p:sp>
+        <p:nvSpPr>
+          <p:cNvPr id="68" name="TextBox 67">
+            <a:extLst>
+              <a:ext uri="{FF2B5EF4-FFF2-40B4-BE49-F238E27FC236}">
+                <a16:creationId xmlns:a16="http://schemas.microsoft.com/office/drawing/2014/main" id="{F91A86AF-7EB7-9C4C-8398-67DBD4B79590}"/>
+              </a:ext>
+            </a:extLst>
+          </p:cNvPr>
+          <p:cNvSpPr txBox="1"/>
+          <p:nvPr/>
+        </p:nvSpPr>
+        <p:spPr>
+          <a:xfrm>
+            <a:off x="4849776" y="1822690"/>
+            <a:ext cx="154845" cy="138499"/>
+          </a:xfrm>
+          <a:prstGeom prst="rect">
+            <a:avLst/>
+          </a:prstGeom>
+          <a:noFill/>
+          <a:ln>
+            <a:noFill/>
+          </a:ln>
+        </p:spPr>
+        <p:txBody>
+          <a:bodyPr wrap="square" lIns="0" tIns="0" rIns="0" bIns="0" rtlCol="0">
+            <a:spAutoFit/>
+          </a:bodyPr>
+          <a:lstStyle/>
+          <a:p>
+            <a:r>
+              <a:rPr lang="en-US" sz="900" dirty="0"/>
+              <a:t>θ</a:t>
+            </a:r>
+            <a:r>
+              <a:rPr lang="en-US" sz="900" baseline="-25000" dirty="0"/>
+              <a:t>2</a:t>
+            </a:r>
+          </a:p>
+        </p:txBody>
+      </p:sp>
+      <p:sp>
+        <p:nvSpPr>
+          <p:cNvPr id="71" name="Freeform 70">
+            <a:extLst>
+              <a:ext uri="{FF2B5EF4-FFF2-40B4-BE49-F238E27FC236}">
+                <a16:creationId xmlns:a16="http://schemas.microsoft.com/office/drawing/2014/main" id="{0984C2DF-436C-BE4B-A186-332CAFF2CA4E}"/>
+              </a:ext>
+            </a:extLst>
+          </p:cNvPr>
+          <p:cNvSpPr/>
+          <p:nvPr/>
+        </p:nvSpPr>
+        <p:spPr>
+          <a:xfrm>
+            <a:off x="4675183" y="1512203"/>
+            <a:ext cx="300735" cy="144411"/>
+          </a:xfrm>
+          <a:custGeom>
+            <a:avLst/>
+            <a:gdLst>
+              <a:gd name="connsiteX0" fmla="*/ 0 w 147545"/>
+              <a:gd name="connsiteY0" fmla="*/ 0 h 212781"/>
+              <a:gd name="connsiteX1" fmla="*/ 146050 w 147545"/>
+              <a:gd name="connsiteY1" fmla="*/ 200025 h 212781"/>
+              <a:gd name="connsiteX2" fmla="*/ 79375 w 147545"/>
+              <a:gd name="connsiteY2" fmla="*/ 203200 h 212781"/>
+              <a:gd name="connsiteX0" fmla="*/ 0 w 153794"/>
+              <a:gd name="connsiteY0" fmla="*/ 0 h 203200"/>
+              <a:gd name="connsiteX1" fmla="*/ 152400 w 153794"/>
+              <a:gd name="connsiteY1" fmla="*/ 66675 h 203200"/>
+              <a:gd name="connsiteX2" fmla="*/ 79375 w 153794"/>
+              <a:gd name="connsiteY2" fmla="*/ 203200 h 203200"/>
+              <a:gd name="connsiteX0" fmla="*/ 0 w 79375"/>
+              <a:gd name="connsiteY0" fmla="*/ 0 h 203200"/>
+              <a:gd name="connsiteX1" fmla="*/ 79375 w 79375"/>
+              <a:gd name="connsiteY1" fmla="*/ 203200 h 203200"/>
+              <a:gd name="connsiteX0" fmla="*/ 0 w 142919"/>
+              <a:gd name="connsiteY0" fmla="*/ 0 h 203200"/>
+              <a:gd name="connsiteX1" fmla="*/ 79375 w 142919"/>
+              <a:gd name="connsiteY1" fmla="*/ 203200 h 203200"/>
+              <a:gd name="connsiteX0" fmla="*/ 0 w 186211"/>
+              <a:gd name="connsiteY0" fmla="*/ 0 h 203200"/>
+              <a:gd name="connsiteX1" fmla="*/ 79375 w 186211"/>
+              <a:gd name="connsiteY1" fmla="*/ 203200 h 203200"/>
+              <a:gd name="connsiteX0" fmla="*/ 0 w 125812"/>
+              <a:gd name="connsiteY0" fmla="*/ 0 h 203200"/>
+              <a:gd name="connsiteX1" fmla="*/ 79375 w 125812"/>
+              <a:gd name="connsiteY1" fmla="*/ 203200 h 203200"/>
+              <a:gd name="connsiteX0" fmla="*/ 0 w 122234"/>
+              <a:gd name="connsiteY0" fmla="*/ 1233 h 204433"/>
+              <a:gd name="connsiteX1" fmla="*/ 79375 w 122234"/>
+              <a:gd name="connsiteY1" fmla="*/ 204433 h 204433"/>
+              <a:gd name="connsiteX0" fmla="*/ 0 w 148382"/>
+              <a:gd name="connsiteY0" fmla="*/ 1233 h 204433"/>
+              <a:gd name="connsiteX1" fmla="*/ 111125 w 148382"/>
+              <a:gd name="connsiteY1" fmla="*/ 204433 h 204433"/>
+              <a:gd name="connsiteX0" fmla="*/ 0 w 354546"/>
+              <a:gd name="connsiteY0" fmla="*/ 772 h 284406"/>
+              <a:gd name="connsiteX1" fmla="*/ 335492 w 354546"/>
+              <a:gd name="connsiteY1" fmla="*/ 284406 h 284406"/>
+              <a:gd name="connsiteX0" fmla="*/ 0 w 335731"/>
+              <a:gd name="connsiteY0" fmla="*/ 1961 h 285595"/>
+              <a:gd name="connsiteX1" fmla="*/ 335492 w 335731"/>
+              <a:gd name="connsiteY1" fmla="*/ 285595 h 285595"/>
+              <a:gd name="connsiteX0" fmla="*/ 0 w 336219"/>
+              <a:gd name="connsiteY0" fmla="*/ 60 h 283694"/>
+              <a:gd name="connsiteX1" fmla="*/ 335492 w 336219"/>
+              <a:gd name="connsiteY1" fmla="*/ 283694 h 283694"/>
+              <a:gd name="connsiteX0" fmla="*/ 0 w 335839"/>
+              <a:gd name="connsiteY0" fmla="*/ 0 h 283634"/>
+              <a:gd name="connsiteX1" fmla="*/ 335492 w 335839"/>
+              <a:gd name="connsiteY1" fmla="*/ 283634 h 283634"/>
+              <a:gd name="connsiteX0" fmla="*/ 0 w 335492"/>
+              <a:gd name="connsiteY0" fmla="*/ 0 h 283634"/>
+              <a:gd name="connsiteX1" fmla="*/ 335492 w 335492"/>
+              <a:gd name="connsiteY1" fmla="*/ 283634 h 283634"/>
+              <a:gd name="connsiteX0" fmla="*/ 0 w 113242"/>
+              <a:gd name="connsiteY0" fmla="*/ 23817 h 101076"/>
+              <a:gd name="connsiteX1" fmla="*/ 113242 w 113242"/>
+              <a:gd name="connsiteY1" fmla="*/ 101076 h 101076"/>
+              <a:gd name="connsiteX0" fmla="*/ 0 w 131430"/>
+              <a:gd name="connsiteY0" fmla="*/ 0 h 77259"/>
+              <a:gd name="connsiteX1" fmla="*/ 113242 w 131430"/>
+              <a:gd name="connsiteY1" fmla="*/ 77259 h 77259"/>
+              <a:gd name="connsiteX0" fmla="*/ 0 w 88086"/>
+              <a:gd name="connsiteY0" fmla="*/ 0 h 96309"/>
+              <a:gd name="connsiteX1" fmla="*/ 33867 w 88086"/>
+              <a:gd name="connsiteY1" fmla="*/ 96309 h 96309"/>
+              <a:gd name="connsiteX0" fmla="*/ 0 w 51968"/>
+              <a:gd name="connsiteY0" fmla="*/ 0 h 96309"/>
+              <a:gd name="connsiteX1" fmla="*/ 33867 w 51968"/>
+              <a:gd name="connsiteY1" fmla="*/ 96309 h 96309"/>
+              <a:gd name="connsiteX0" fmla="*/ 0 w 65690"/>
+              <a:gd name="connsiteY0" fmla="*/ 0 h 93134"/>
+              <a:gd name="connsiteX1" fmla="*/ 52917 w 65690"/>
+              <a:gd name="connsiteY1" fmla="*/ 93134 h 93134"/>
+              <a:gd name="connsiteX0" fmla="*/ 0 w 171150"/>
+              <a:gd name="connsiteY0" fmla="*/ 0 h 229659"/>
+              <a:gd name="connsiteX1" fmla="*/ 167217 w 171150"/>
+              <a:gd name="connsiteY1" fmla="*/ 229659 h 229659"/>
+              <a:gd name="connsiteX0" fmla="*/ 0 w 172717"/>
+              <a:gd name="connsiteY0" fmla="*/ 0 h 229659"/>
+              <a:gd name="connsiteX1" fmla="*/ 167217 w 172717"/>
+              <a:gd name="connsiteY1" fmla="*/ 229659 h 229659"/>
+              <a:gd name="connsiteX0" fmla="*/ 0 w 178939"/>
+              <a:gd name="connsiteY0" fmla="*/ 0 h 229659"/>
+              <a:gd name="connsiteX1" fmla="*/ 167217 w 178939"/>
+              <a:gd name="connsiteY1" fmla="*/ 229659 h 229659"/>
+              <a:gd name="connsiteX0" fmla="*/ 0 w 248138"/>
+              <a:gd name="connsiteY0" fmla="*/ 0 h 432859"/>
+              <a:gd name="connsiteX1" fmla="*/ 240242 w 248138"/>
+              <a:gd name="connsiteY1" fmla="*/ 432859 h 432859"/>
+              <a:gd name="connsiteX0" fmla="*/ 0 w 265317"/>
+              <a:gd name="connsiteY0" fmla="*/ 0 h 432859"/>
+              <a:gd name="connsiteX1" fmla="*/ 240242 w 265317"/>
+              <a:gd name="connsiteY1" fmla="*/ 432859 h 432859"/>
+              <a:gd name="connsiteX0" fmla="*/ 0 w 274098"/>
+              <a:gd name="connsiteY0" fmla="*/ 0 h 432859"/>
+              <a:gd name="connsiteX1" fmla="*/ 240242 w 274098"/>
+              <a:gd name="connsiteY1" fmla="*/ 432859 h 432859"/>
+              <a:gd name="connsiteX0" fmla="*/ 11043 w 123323"/>
+              <a:gd name="connsiteY0" fmla="*/ 0 h 513131"/>
+              <a:gd name="connsiteX1" fmla="*/ 0 w 123323"/>
+              <a:gd name="connsiteY1" fmla="*/ 513131 h 513131"/>
+              <a:gd name="connsiteX0" fmla="*/ 349581 w 400790"/>
+              <a:gd name="connsiteY0" fmla="*/ 0 h 115262"/>
+              <a:gd name="connsiteX1" fmla="*/ 0 w 400790"/>
+              <a:gd name="connsiteY1" fmla="*/ 115262 h 115262"/>
+              <a:gd name="connsiteX0" fmla="*/ 349581 w 398662"/>
+              <a:gd name="connsiteY0" fmla="*/ 0 h 117610"/>
+              <a:gd name="connsiteX1" fmla="*/ 0 w 398662"/>
+              <a:gd name="connsiteY1" fmla="*/ 115262 h 117610"/>
+              <a:gd name="connsiteX0" fmla="*/ 300720 w 353952"/>
+              <a:gd name="connsiteY0" fmla="*/ 0 h 141571"/>
+              <a:gd name="connsiteX1" fmla="*/ 0 w 353952"/>
+              <a:gd name="connsiteY1" fmla="*/ 139693 h 141571"/>
+              <a:gd name="connsiteX0" fmla="*/ 300720 w 300735"/>
+              <a:gd name="connsiteY0" fmla="*/ 0 h 144411"/>
+              <a:gd name="connsiteX1" fmla="*/ 0 w 300735"/>
+              <a:gd name="connsiteY1" fmla="*/ 139693 h 144411"/>
+            </a:gdLst>
+            <a:ahLst/>
+            <a:cxnLst>
+              <a:cxn ang="0">
+                <a:pos x="connsiteX0" y="connsiteY0"/>
+              </a:cxn>
+              <a:cxn ang="0">
+                <a:pos x="connsiteX1" y="connsiteY1"/>
+              </a:cxn>
+            </a:cxnLst>
+            <a:rect l="l" t="t" r="r" b="b"/>
+            <a:pathLst>
+              <a:path w="300735" h="144411">
+                <a:moveTo>
+                  <a:pt x="300720" y="0"/>
+                </a:moveTo>
+                <a:cubicBezTo>
+                  <a:pt x="302870" y="130013"/>
+                  <a:pt x="73679" y="157047"/>
+                  <a:pt x="0" y="139693"/>
+                </a:cubicBezTo>
+              </a:path>
+            </a:pathLst>
+          </a:custGeom>
+          <a:noFill/>
+          <a:ln>
+            <a:solidFill>
+              <a:schemeClr val="tx1"/>
+            </a:solidFill>
+            <a:headEnd type="triangle" w="med" len="med"/>
+            <a:tailEnd type="none" w="sm" len="med"/>
+          </a:ln>
+        </p:spPr>
+        <p:style>
+          <a:lnRef idx="2">
+            <a:schemeClr val="accent1">
+              <a:shade val="50000"/>
+            </a:schemeClr>
+          </a:lnRef>
+          <a:fillRef idx="1">
+            <a:schemeClr val="accent1"/>
+          </a:fillRef>
+          <a:effectRef idx="0">
+            <a:schemeClr val="accent1"/>
+          </a:effectRef>
+          <a:fontRef idx="minor">
+            <a:schemeClr val="lt1"/>
+          </a:fontRef>
+        </p:style>
+        <p:txBody>
+          <a:bodyPr rtlCol="0" anchor="ctr"/>
+          <a:lstStyle/>
+          <a:p>
+            <a:pPr algn="ctr"/>
+            <a:endParaRPr lang="en-US"/>
+          </a:p>
+        </p:txBody>
+      </p:sp>
+      <p:sp>
+        <p:nvSpPr>
+          <p:cNvPr id="73" name="TextBox 72">
+            <a:extLst>
+              <a:ext uri="{FF2B5EF4-FFF2-40B4-BE49-F238E27FC236}">
+                <a16:creationId xmlns:a16="http://schemas.microsoft.com/office/drawing/2014/main" id="{958BEA23-5D5B-AC44-A031-0D1AB2758EDE}"/>
+              </a:ext>
+            </a:extLst>
+          </p:cNvPr>
+          <p:cNvSpPr txBox="1"/>
+          <p:nvPr/>
+        </p:nvSpPr>
+        <p:spPr>
+          <a:xfrm>
+            <a:off x="4718574" y="1628338"/>
+            <a:ext cx="154845" cy="138499"/>
+          </a:xfrm>
+          <a:prstGeom prst="rect">
+            <a:avLst/>
+          </a:prstGeom>
+          <a:noFill/>
+          <a:ln>
+            <a:noFill/>
+          </a:ln>
+        </p:spPr>
+        <p:txBody>
+          <a:bodyPr wrap="square" lIns="0" tIns="0" rIns="0" bIns="0" rtlCol="0">
+            <a:spAutoFit/>
+          </a:bodyPr>
+          <a:lstStyle/>
+          <a:p>
+            <a:r>
+              <a:rPr lang="en-US" sz="900" dirty="0"/>
+              <a:t>g</a:t>
+            </a:r>
+            <a:r>
+              <a:rPr lang="en-US" sz="900" baseline="-25000" dirty="0"/>
+              <a:t>3</a:t>
+            </a:r>
+          </a:p>
+        </p:txBody>
+      </p:sp>
+      <p:sp>
+        <p:nvSpPr>
+          <p:cNvPr id="74" name="Freeform 73">
+            <a:extLst>
+              <a:ext uri="{FF2B5EF4-FFF2-40B4-BE49-F238E27FC236}">
+                <a16:creationId xmlns:a16="http://schemas.microsoft.com/office/drawing/2014/main" id="{A11F7750-B990-E044-A3B6-E1F9728CC996}"/>
+              </a:ext>
+            </a:extLst>
+          </p:cNvPr>
+          <p:cNvSpPr/>
+          <p:nvPr/>
+        </p:nvSpPr>
+        <p:spPr>
+          <a:xfrm>
+            <a:off x="5013390" y="1513036"/>
+            <a:ext cx="92841" cy="113814"/>
+          </a:xfrm>
+          <a:custGeom>
+            <a:avLst/>
+            <a:gdLst>
+              <a:gd name="connsiteX0" fmla="*/ 0 w 147545"/>
+              <a:gd name="connsiteY0" fmla="*/ 0 h 212781"/>
+              <a:gd name="connsiteX1" fmla="*/ 146050 w 147545"/>
+              <a:gd name="connsiteY1" fmla="*/ 200025 h 212781"/>
+              <a:gd name="connsiteX2" fmla="*/ 79375 w 147545"/>
+              <a:gd name="connsiteY2" fmla="*/ 203200 h 212781"/>
+              <a:gd name="connsiteX0" fmla="*/ 0 w 153794"/>
+              <a:gd name="connsiteY0" fmla="*/ 0 h 203200"/>
+              <a:gd name="connsiteX1" fmla="*/ 152400 w 153794"/>
+              <a:gd name="connsiteY1" fmla="*/ 66675 h 203200"/>
+              <a:gd name="connsiteX2" fmla="*/ 79375 w 153794"/>
+              <a:gd name="connsiteY2" fmla="*/ 203200 h 203200"/>
+              <a:gd name="connsiteX0" fmla="*/ 0 w 79375"/>
+              <a:gd name="connsiteY0" fmla="*/ 0 h 203200"/>
+              <a:gd name="connsiteX1" fmla="*/ 79375 w 79375"/>
+              <a:gd name="connsiteY1" fmla="*/ 203200 h 203200"/>
+              <a:gd name="connsiteX0" fmla="*/ 0 w 142919"/>
+              <a:gd name="connsiteY0" fmla="*/ 0 h 203200"/>
+              <a:gd name="connsiteX1" fmla="*/ 79375 w 142919"/>
+              <a:gd name="connsiteY1" fmla="*/ 203200 h 203200"/>
+              <a:gd name="connsiteX0" fmla="*/ 0 w 186211"/>
+              <a:gd name="connsiteY0" fmla="*/ 0 h 203200"/>
+              <a:gd name="connsiteX1" fmla="*/ 79375 w 186211"/>
+              <a:gd name="connsiteY1" fmla="*/ 203200 h 203200"/>
+              <a:gd name="connsiteX0" fmla="*/ 0 w 125812"/>
+              <a:gd name="connsiteY0" fmla="*/ 0 h 203200"/>
+              <a:gd name="connsiteX1" fmla="*/ 79375 w 125812"/>
+              <a:gd name="connsiteY1" fmla="*/ 203200 h 203200"/>
+              <a:gd name="connsiteX0" fmla="*/ 0 w 122234"/>
+              <a:gd name="connsiteY0" fmla="*/ 1233 h 204433"/>
+              <a:gd name="connsiteX1" fmla="*/ 79375 w 122234"/>
+              <a:gd name="connsiteY1" fmla="*/ 204433 h 204433"/>
+              <a:gd name="connsiteX0" fmla="*/ 0 w 148382"/>
+              <a:gd name="connsiteY0" fmla="*/ 1233 h 204433"/>
+              <a:gd name="connsiteX1" fmla="*/ 111125 w 148382"/>
+              <a:gd name="connsiteY1" fmla="*/ 204433 h 204433"/>
+              <a:gd name="connsiteX0" fmla="*/ 0 w 354546"/>
+              <a:gd name="connsiteY0" fmla="*/ 772 h 284406"/>
+              <a:gd name="connsiteX1" fmla="*/ 335492 w 354546"/>
+              <a:gd name="connsiteY1" fmla="*/ 284406 h 284406"/>
+              <a:gd name="connsiteX0" fmla="*/ 0 w 335731"/>
+              <a:gd name="connsiteY0" fmla="*/ 1961 h 285595"/>
+              <a:gd name="connsiteX1" fmla="*/ 335492 w 335731"/>
+              <a:gd name="connsiteY1" fmla="*/ 285595 h 285595"/>
+              <a:gd name="connsiteX0" fmla="*/ 0 w 336219"/>
+              <a:gd name="connsiteY0" fmla="*/ 60 h 283694"/>
+              <a:gd name="connsiteX1" fmla="*/ 335492 w 336219"/>
+              <a:gd name="connsiteY1" fmla="*/ 283694 h 283694"/>
+              <a:gd name="connsiteX0" fmla="*/ 0 w 335839"/>
+              <a:gd name="connsiteY0" fmla="*/ 0 h 283634"/>
+              <a:gd name="connsiteX1" fmla="*/ 335492 w 335839"/>
+              <a:gd name="connsiteY1" fmla="*/ 283634 h 283634"/>
+              <a:gd name="connsiteX0" fmla="*/ 0 w 335492"/>
+              <a:gd name="connsiteY0" fmla="*/ 0 h 283634"/>
+              <a:gd name="connsiteX1" fmla="*/ 335492 w 335492"/>
+              <a:gd name="connsiteY1" fmla="*/ 283634 h 283634"/>
+              <a:gd name="connsiteX0" fmla="*/ 0 w 113242"/>
+              <a:gd name="connsiteY0" fmla="*/ 23817 h 101076"/>
+              <a:gd name="connsiteX1" fmla="*/ 113242 w 113242"/>
+              <a:gd name="connsiteY1" fmla="*/ 101076 h 101076"/>
+              <a:gd name="connsiteX0" fmla="*/ 0 w 131430"/>
+              <a:gd name="connsiteY0" fmla="*/ 0 h 77259"/>
+              <a:gd name="connsiteX1" fmla="*/ 113242 w 131430"/>
+              <a:gd name="connsiteY1" fmla="*/ 77259 h 77259"/>
+              <a:gd name="connsiteX0" fmla="*/ 0 w 88086"/>
+              <a:gd name="connsiteY0" fmla="*/ 0 h 96309"/>
+              <a:gd name="connsiteX1" fmla="*/ 33867 w 88086"/>
+              <a:gd name="connsiteY1" fmla="*/ 96309 h 96309"/>
+              <a:gd name="connsiteX0" fmla="*/ 0 w 51968"/>
+              <a:gd name="connsiteY0" fmla="*/ 0 h 96309"/>
+              <a:gd name="connsiteX1" fmla="*/ 33867 w 51968"/>
+              <a:gd name="connsiteY1" fmla="*/ 96309 h 96309"/>
+              <a:gd name="connsiteX0" fmla="*/ 0 w 65690"/>
+              <a:gd name="connsiteY0" fmla="*/ 0 h 93134"/>
+              <a:gd name="connsiteX1" fmla="*/ 52917 w 65690"/>
+              <a:gd name="connsiteY1" fmla="*/ 93134 h 93134"/>
+              <a:gd name="connsiteX0" fmla="*/ 0 w 171150"/>
+              <a:gd name="connsiteY0" fmla="*/ 0 h 229659"/>
+              <a:gd name="connsiteX1" fmla="*/ 167217 w 171150"/>
+              <a:gd name="connsiteY1" fmla="*/ 229659 h 229659"/>
+              <a:gd name="connsiteX0" fmla="*/ 0 w 172717"/>
+              <a:gd name="connsiteY0" fmla="*/ 0 h 229659"/>
+              <a:gd name="connsiteX1" fmla="*/ 167217 w 172717"/>
+              <a:gd name="connsiteY1" fmla="*/ 229659 h 229659"/>
+              <a:gd name="connsiteX0" fmla="*/ 0 w 178939"/>
+              <a:gd name="connsiteY0" fmla="*/ 0 h 229659"/>
+              <a:gd name="connsiteX1" fmla="*/ 167217 w 178939"/>
+              <a:gd name="connsiteY1" fmla="*/ 229659 h 229659"/>
+              <a:gd name="connsiteX0" fmla="*/ 0 w 248138"/>
+              <a:gd name="connsiteY0" fmla="*/ 0 h 432859"/>
+              <a:gd name="connsiteX1" fmla="*/ 240242 w 248138"/>
+              <a:gd name="connsiteY1" fmla="*/ 432859 h 432859"/>
+              <a:gd name="connsiteX0" fmla="*/ 0 w 265317"/>
+              <a:gd name="connsiteY0" fmla="*/ 0 h 432859"/>
+              <a:gd name="connsiteX1" fmla="*/ 240242 w 265317"/>
+              <a:gd name="connsiteY1" fmla="*/ 432859 h 432859"/>
+              <a:gd name="connsiteX0" fmla="*/ 0 w 274098"/>
+              <a:gd name="connsiteY0" fmla="*/ 0 h 432859"/>
+              <a:gd name="connsiteX1" fmla="*/ 240242 w 274098"/>
+              <a:gd name="connsiteY1" fmla="*/ 432859 h 432859"/>
+              <a:gd name="connsiteX0" fmla="*/ 11043 w 123323"/>
+              <a:gd name="connsiteY0" fmla="*/ 0 h 513131"/>
+              <a:gd name="connsiteX1" fmla="*/ 0 w 123323"/>
+              <a:gd name="connsiteY1" fmla="*/ 513131 h 513131"/>
+              <a:gd name="connsiteX0" fmla="*/ 349581 w 400790"/>
+              <a:gd name="connsiteY0" fmla="*/ 0 h 115262"/>
+              <a:gd name="connsiteX1" fmla="*/ 0 w 400790"/>
+              <a:gd name="connsiteY1" fmla="*/ 115262 h 115262"/>
+              <a:gd name="connsiteX0" fmla="*/ 349581 w 398662"/>
+              <a:gd name="connsiteY0" fmla="*/ 0 h 117610"/>
+              <a:gd name="connsiteX1" fmla="*/ 0 w 398662"/>
+              <a:gd name="connsiteY1" fmla="*/ 115262 h 117610"/>
+              <a:gd name="connsiteX0" fmla="*/ 300720 w 353952"/>
+              <a:gd name="connsiteY0" fmla="*/ 0 h 141571"/>
+              <a:gd name="connsiteX1" fmla="*/ 0 w 353952"/>
+              <a:gd name="connsiteY1" fmla="*/ 139693 h 141571"/>
+              <a:gd name="connsiteX0" fmla="*/ 300720 w 300735"/>
+              <a:gd name="connsiteY0" fmla="*/ 0 h 144411"/>
+              <a:gd name="connsiteX1" fmla="*/ 0 w 300735"/>
+              <a:gd name="connsiteY1" fmla="*/ 139693 h 144411"/>
+              <a:gd name="connsiteX0" fmla="*/ 35474 w 46173"/>
+              <a:gd name="connsiteY0" fmla="*/ 0 h 94844"/>
+              <a:gd name="connsiteX1" fmla="*/ 0 w 46173"/>
+              <a:gd name="connsiteY1" fmla="*/ 76872 h 94844"/>
+              <a:gd name="connsiteX0" fmla="*/ 35474 w 48838"/>
+              <a:gd name="connsiteY0" fmla="*/ 0 h 80909"/>
+              <a:gd name="connsiteX1" fmla="*/ 0 w 48838"/>
+              <a:gd name="connsiteY1" fmla="*/ 76872 h 80909"/>
+              <a:gd name="connsiteX0" fmla="*/ 35474 w 35524"/>
+              <a:gd name="connsiteY0" fmla="*/ 0 h 89934"/>
+              <a:gd name="connsiteX1" fmla="*/ 9174 w 35524"/>
+              <a:gd name="connsiteY1" fmla="*/ 89934 h 89934"/>
+              <a:gd name="connsiteX2" fmla="*/ 0 w 35524"/>
+              <a:gd name="connsiteY2" fmla="*/ 76872 h 89934"/>
+              <a:gd name="connsiteX0" fmla="*/ 26379 w 33904"/>
+              <a:gd name="connsiteY0" fmla="*/ 0 h 114618"/>
+              <a:gd name="connsiteX1" fmla="*/ 79 w 33904"/>
+              <a:gd name="connsiteY1" fmla="*/ 89934 h 114618"/>
+              <a:gd name="connsiteX2" fmla="*/ 1375 w 33904"/>
+              <a:gd name="connsiteY2" fmla="*/ 111773 h 114618"/>
+              <a:gd name="connsiteX0" fmla="*/ 158938 w 158947"/>
+              <a:gd name="connsiteY0" fmla="*/ 0 h 320532"/>
+              <a:gd name="connsiteX1" fmla="*/ 15 w 158947"/>
+              <a:gd name="connsiteY1" fmla="*/ 295848 h 320532"/>
+              <a:gd name="connsiteX2" fmla="*/ 1311 w 158947"/>
+              <a:gd name="connsiteY2" fmla="*/ 317687 h 320532"/>
+              <a:gd name="connsiteX0" fmla="*/ 157627 w 157627"/>
+              <a:gd name="connsiteY0" fmla="*/ 0 h 317687"/>
+              <a:gd name="connsiteX1" fmla="*/ 0 w 157627"/>
+              <a:gd name="connsiteY1" fmla="*/ 317687 h 317687"/>
+              <a:gd name="connsiteX0" fmla="*/ 178567 w 178567"/>
+              <a:gd name="connsiteY0" fmla="*/ 0 h 300237"/>
+              <a:gd name="connsiteX1" fmla="*/ 0 w 178567"/>
+              <a:gd name="connsiteY1" fmla="*/ 300237 h 300237"/>
+              <a:gd name="connsiteX0" fmla="*/ 178567 w 178567"/>
+              <a:gd name="connsiteY0" fmla="*/ 0 h 303942"/>
+              <a:gd name="connsiteX1" fmla="*/ 0 w 178567"/>
+              <a:gd name="connsiteY1" fmla="*/ 300237 h 303942"/>
+              <a:gd name="connsiteX0" fmla="*/ 52924 w 52924"/>
+              <a:gd name="connsiteY0" fmla="*/ 0 h 103297"/>
+              <a:gd name="connsiteX1" fmla="*/ 0 w 52924"/>
+              <a:gd name="connsiteY1" fmla="*/ 87342 h 103297"/>
+              <a:gd name="connsiteX0" fmla="*/ 10722 w 86816"/>
+              <a:gd name="connsiteY0" fmla="*/ 0 h 108939"/>
+              <a:gd name="connsiteX1" fmla="*/ 55520 w 86816"/>
+              <a:gd name="connsiteY1" fmla="*/ 94323 h 108939"/>
+              <a:gd name="connsiteX0" fmla="*/ 10722 w 86816"/>
+              <a:gd name="connsiteY0" fmla="*/ 0 h 120706"/>
+              <a:gd name="connsiteX1" fmla="*/ 55520 w 86816"/>
+              <a:gd name="connsiteY1" fmla="*/ 108283 h 120706"/>
+              <a:gd name="connsiteX0" fmla="*/ 80845 w 80845"/>
+              <a:gd name="connsiteY0" fmla="*/ 0 h 136105"/>
+              <a:gd name="connsiteX1" fmla="*/ 0 w 80845"/>
+              <a:gd name="connsiteY1" fmla="*/ 125733 h 136105"/>
+              <a:gd name="connsiteX0" fmla="*/ 80845 w 121113"/>
+              <a:gd name="connsiteY0" fmla="*/ 0 h 135489"/>
+              <a:gd name="connsiteX1" fmla="*/ 0 w 121113"/>
+              <a:gd name="connsiteY1" fmla="*/ 125733 h 135489"/>
+              <a:gd name="connsiteX0" fmla="*/ 38964 w 92841"/>
+              <a:gd name="connsiteY0" fmla="*/ 0 h 113814"/>
+              <a:gd name="connsiteX1" fmla="*/ 0 w 92841"/>
+              <a:gd name="connsiteY1" fmla="*/ 101302 h 113814"/>
+            </a:gdLst>
+            <a:ahLst/>
+            <a:cxnLst>
+              <a:cxn ang="0">
+                <a:pos x="connsiteX0" y="connsiteY0"/>
+              </a:cxn>
+              <a:cxn ang="0">
+                <a:pos x="connsiteX1" y="connsiteY1"/>
+              </a:cxn>
+            </a:cxnLst>
+            <a:rect l="l" t="t" r="r" b="b"/>
+            <a:pathLst>
+              <a:path w="92841" h="113814">
+                <a:moveTo>
+                  <a:pt x="38964" y="0"/>
+                </a:moveTo>
+                <a:cubicBezTo>
+                  <a:pt x="122535" y="93099"/>
+                  <a:pt x="108383" y="137336"/>
+                  <a:pt x="0" y="101302"/>
+                </a:cubicBezTo>
+              </a:path>
+            </a:pathLst>
+          </a:custGeom>
+          <a:noFill/>
+          <a:ln>
+            <a:solidFill>
+              <a:schemeClr val="tx1"/>
+            </a:solidFill>
+            <a:headEnd type="triangle" w="med" len="med"/>
+            <a:tailEnd type="none" w="sm" len="med"/>
+          </a:ln>
+        </p:spPr>
+        <p:style>
+          <a:lnRef idx="2">
+            <a:schemeClr val="accent1">
+              <a:shade val="50000"/>
+            </a:schemeClr>
+          </a:lnRef>
+          <a:fillRef idx="1">
+            <a:schemeClr val="accent1"/>
+          </a:fillRef>
+          <a:effectRef idx="0">
+            <a:schemeClr val="accent1"/>
+          </a:effectRef>
+          <a:fontRef idx="minor">
+            <a:schemeClr val="lt1"/>
+          </a:fontRef>
+        </p:style>
+        <p:txBody>
+          <a:bodyPr rtlCol="0" anchor="ctr"/>
+          <a:lstStyle/>
+          <a:p>
+            <a:pPr algn="ctr"/>
+            <a:endParaRPr lang="en-US"/>
+          </a:p>
+        </p:txBody>
+      </p:sp>
+      <p:sp>
+        <p:nvSpPr>
+          <p:cNvPr id="75" name="TextBox 74">
+            <a:extLst>
+              <a:ext uri="{FF2B5EF4-FFF2-40B4-BE49-F238E27FC236}">
+                <a16:creationId xmlns:a16="http://schemas.microsoft.com/office/drawing/2014/main" id="{3FB9905F-EF2F-0A4B-9665-926D46280EBB}"/>
+              </a:ext>
+            </a:extLst>
+          </p:cNvPr>
+          <p:cNvSpPr txBox="1"/>
+          <p:nvPr/>
+        </p:nvSpPr>
+        <p:spPr>
+          <a:xfrm>
+            <a:off x="5110318" y="1541614"/>
+            <a:ext cx="154845" cy="138499"/>
+          </a:xfrm>
+          <a:prstGeom prst="rect">
+            <a:avLst/>
+          </a:prstGeom>
+          <a:noFill/>
+          <a:ln>
+            <a:noFill/>
+          </a:ln>
+        </p:spPr>
+        <p:txBody>
+          <a:bodyPr wrap="square" lIns="0" tIns="0" rIns="0" bIns="0" rtlCol="0">
+            <a:spAutoFit/>
+          </a:bodyPr>
+          <a:lstStyle/>
+          <a:p>
+            <a:r>
+              <a:rPr lang="en-US" sz="900" dirty="0"/>
+              <a:t>g</a:t>
+            </a:r>
+            <a:r>
+              <a:rPr lang="en-US" sz="900" baseline="-25000" dirty="0"/>
+              <a:t>4</a:t>
             </a:r>
           </a:p>
         </p:txBody>

</xml_diff>

<commit_message>
next attempt... including description in PPT
</commit_message>
<xml_diff>
--- a/catkin_ws/diagrams.pptx
+++ b/catkin_ws/diagrams.pptx
@@ -5,13 +5,15 @@
     <p:sldMasterId id="2147483648" r:id="rId1"/>
   </p:sldMasterIdLst>
   <p:notesMasterIdLst>
-    <p:notesMasterId r:id="rId6"/>
+    <p:notesMasterId r:id="rId8"/>
   </p:notesMasterIdLst>
   <p:sldIdLst>
     <p:sldId id="256" r:id="rId2"/>
     <p:sldId id="257" r:id="rId3"/>
     <p:sldId id="258" r:id="rId4"/>
-    <p:sldId id="259" r:id="rId5"/>
+    <p:sldId id="261" r:id="rId5"/>
+    <p:sldId id="260" r:id="rId6"/>
+    <p:sldId id="259" r:id="rId7"/>
   </p:sldIdLst>
   <p:sldSz cx="12192000" cy="6858000"/>
   <p:notesSz cx="6797675" cy="9926638"/>
@@ -10101,7 +10103,7 @@
         <p:spPr>
           <a:xfrm>
             <a:off x="1975269" y="812940"/>
-            <a:ext cx="1662364" cy="1015663"/>
+            <a:ext cx="1662364" cy="1292662"/>
           </a:xfrm>
           <a:prstGeom prst="rect">
             <a:avLst/>
@@ -10115,7 +10117,7 @@
           <a:p>
             <a:r>
               <a:rPr lang="en-GB" sz="600" dirty="0"/>
-              <a:t>1. Calculate H4WC from </a:t>
+              <a:t>1. Calculate H2WC from </a:t>
             </a:r>
             <a:r>
               <a:rPr lang="en-GB" sz="600" dirty="0" err="1"/>
@@ -10134,7 +10136,7 @@
           <a:p>
             <a:r>
               <a:rPr lang="en-GB" sz="600" dirty="0"/>
-              <a:t>2. Calculate CA from H4WC, </a:t>
+              <a:t>2. Calculate g1 from H4WC, </a:t>
             </a:r>
             <a:r>
               <a:rPr lang="en-GB" sz="600" dirty="0" err="1"/>
@@ -10153,13 +10155,17 @@
           <a:p>
             <a:r>
               <a:rPr lang="en-GB" sz="600" dirty="0"/>
-              <a:t>3. Calculate L4xcx = sqrt(a3*a3 – 0.54*0.54) (</a:t>
-            </a:r>
-            <a:r>
-              <a:rPr lang="en-GB" sz="600"/>
-              <a:t>x displacement J4 to WC)</a:t>
-            </a:r>
+              <a:t>3. L34X = sqrt(0.96*0.96 – 0.054 * 0.-54)</a:t>
+            </a:r>
+          </a:p>
+          <a:p>
             <a:endParaRPr lang="en-GB" sz="600" dirty="0"/>
+          </a:p>
+          <a:p>
+            <a:r>
+              <a:rPr lang="en-GB" sz="600" dirty="0"/>
+              <a:t>3. Calculate L4wcX = sqrt(a3*a3 – 0.54*0.54) (x displacement J4 to WC)</a:t>
+            </a:r>
           </a:p>
           <a:p>
             <a:r>
@@ -10168,6 +10174,9 @@
             </a:r>
           </a:p>
           <a:p>
+            <a:endParaRPr lang="en-GB" sz="600" dirty="0"/>
+          </a:p>
+          <a:p>
             <a:r>
               <a:rPr lang="en-GB" sz="600" dirty="0"/>
               <a:t>5. Calculate g2 from a2, H4wc, (L34x+L4WCx)</a:t>
@@ -10182,13 +10191,13 @@
           <a:p>
             <a:r>
               <a:rPr lang="en-GB" sz="600" dirty="0"/>
-              <a:t>7. Calculate L34 from sqrt(L34x*L34x + a3*a3)</a:t>
+              <a:t>7. Calculate L34 from sqrt(L3wc*L3wc + a3*a3)</a:t>
             </a:r>
           </a:p>
           <a:p>
             <a:r>
               <a:rPr lang="en-GB" sz="600" dirty="0"/>
-              <a:t>7. Calculate g4 from L34x, a3, L34</a:t>
+              <a:t>7. 	</a:t>
             </a:r>
           </a:p>
           <a:p>
@@ -10275,15 +10284,7 @@
           <a:p>
             <a:r>
               <a:rPr lang="en-US" sz="900" dirty="0"/>
-              <a:t>L</a:t>
-            </a:r>
-            <a:r>
-              <a:rPr lang="en-US" sz="900" baseline="-25000" dirty="0"/>
-              <a:t>34</a:t>
-            </a:r>
-            <a:r>
-              <a:rPr lang="en-US" sz="900" dirty="0"/>
-              <a:t>x</a:t>
+              <a:t>0.96</a:t>
             </a:r>
           </a:p>
         </p:txBody>
@@ -10303,7 +10304,7 @@
         <p:spPr>
           <a:xfrm>
             <a:off x="5448926" y="1463969"/>
-            <a:ext cx="227875" cy="138499"/>
+            <a:ext cx="558461" cy="138499"/>
           </a:xfrm>
           <a:prstGeom prst="rect">
             <a:avLst/>
@@ -10321,13 +10322,16 @@
           <a:p>
             <a:r>
               <a:rPr lang="en-US" sz="900" dirty="0"/>
-              <a:t>a</a:t>
+              <a:t>A</a:t>
             </a:r>
             <a:r>
               <a:rPr lang="en-US" sz="900" baseline="-25000" dirty="0"/>
-              <a:t>3</a:t>
-            </a:r>
-            <a:endParaRPr lang="en-US" sz="900" dirty="0"/>
+              <a:t>3 </a:t>
+            </a:r>
+            <a:r>
+              <a:rPr lang="en-US" sz="900" dirty="0"/>
+              <a:t>0.054</a:t>
+            </a:r>
           </a:p>
         </p:txBody>
       </p:sp>
@@ -10411,7 +10415,7 @@
             </a:r>
             <a:r>
               <a:rPr lang="en-US" sz="900" baseline="-25000" dirty="0"/>
-              <a:t>4WC</a:t>
+              <a:t>2WC</a:t>
             </a:r>
             <a:endParaRPr lang="en-US" sz="900" dirty="0"/>
           </a:p>
@@ -11587,6 +11591,4229 @@
 </file>
 
 <file path=ppt/slides/slide4.xml><?xml version="1.0" encoding="utf-8"?>
+<p:sld xmlns:a="http://schemas.openxmlformats.org/drawingml/2006/main" xmlns:r="http://schemas.openxmlformats.org/officeDocument/2006/relationships" xmlns:p="http://schemas.openxmlformats.org/presentationml/2006/main">
+  <p:cSld>
+    <p:spTree>
+      <p:nvGrpSpPr>
+        <p:cNvPr id="1" name=""/>
+        <p:cNvGrpSpPr/>
+        <p:nvPr/>
+      </p:nvGrpSpPr>
+      <p:grpSpPr>
+        <a:xfrm>
+          <a:off x="0" y="0"/>
+          <a:ext cx="0" cy="0"/>
+          <a:chOff x="0" y="0"/>
+          <a:chExt cx="0" cy="0"/>
+        </a:xfrm>
+      </p:grpSpPr>
+      <p:sp>
+        <p:nvSpPr>
+          <p:cNvPr id="2" name="TextBox 1">
+            <a:extLst>
+              <a:ext uri="{FF2B5EF4-FFF2-40B4-BE49-F238E27FC236}">
+                <a16:creationId xmlns:a16="http://schemas.microsoft.com/office/drawing/2014/main" id="{6BDA9042-E77E-9647-90C8-02536F6362EF}"/>
+              </a:ext>
+            </a:extLst>
+          </p:cNvPr>
+          <p:cNvSpPr txBox="1"/>
+          <p:nvPr/>
+        </p:nvSpPr>
+        <p:spPr>
+          <a:xfrm>
+            <a:off x="372532" y="797510"/>
+            <a:ext cx="11819467" cy="5478423"/>
+          </a:xfrm>
+          <a:prstGeom prst="rect">
+            <a:avLst/>
+          </a:prstGeom>
+          <a:noFill/>
+        </p:spPr>
+        <p:txBody>
+          <a:bodyPr wrap="square" rtlCol="0">
+            <a:spAutoFit/>
+          </a:bodyPr>
+          <a:lstStyle/>
+          <a:p>
+            <a:pPr marL="342900" lvl="0" indent="-342900">
+              <a:buFont typeface="+mj-lt"/>
+              <a:buAutoNum type="arabicPeriod"/>
+            </a:pPr>
+            <a:r>
+              <a:rPr lang="en-GB" sz="1400" dirty="0"/>
+              <a:t>work out theta1 from relative position of </a:t>
+            </a:r>
+            <a:r>
+              <a:rPr lang="en-GB" sz="1400" dirty="0" err="1"/>
+              <a:t>wy</a:t>
+            </a:r>
+            <a:r>
+              <a:rPr lang="en-GB" sz="1400" dirty="0"/>
+              <a:t> and </a:t>
+            </a:r>
+            <a:r>
+              <a:rPr lang="en-GB" sz="1400" dirty="0" err="1"/>
+              <a:t>wx</a:t>
+            </a:r>
+            <a:endParaRPr lang="en-GB" sz="1400" dirty="0"/>
+          </a:p>
+          <a:p>
+            <a:pPr marL="342900" lvl="0" indent="-342900">
+              <a:buFont typeface="+mj-lt"/>
+              <a:buAutoNum type="arabicPeriod"/>
+            </a:pPr>
+            <a:r>
+              <a:rPr lang="en-GB" sz="1400" dirty="0"/>
+              <a:t>all of the rest of </a:t>
+            </a:r>
+            <a:r>
+              <a:rPr lang="en-GB" sz="1400" dirty="0" err="1"/>
+              <a:t>teh</a:t>
+            </a:r>
+            <a:r>
+              <a:rPr lang="en-GB" sz="1400" dirty="0"/>
+              <a:t> steps can be completed in the plane </a:t>
+            </a:r>
+            <a:r>
+              <a:rPr lang="en-GB" sz="1400" dirty="0" err="1"/>
+              <a:t>xz</a:t>
+            </a:r>
+            <a:endParaRPr lang="en-GB" sz="1400" dirty="0"/>
+          </a:p>
+          <a:p>
+            <a:pPr marL="342900" lvl="0" indent="-342900">
+              <a:buFont typeface="+mj-lt"/>
+              <a:buAutoNum type="arabicPeriod"/>
+            </a:pPr>
+            <a:r>
+              <a:rPr lang="en-GB" sz="1400" dirty="0"/>
+              <a:t>calculate the length of the line J3 -&gt; J5(WC)</a:t>
+            </a:r>
+          </a:p>
+          <a:p>
+            <a:pPr marL="800100" lvl="1" indent="-342900">
+              <a:buFont typeface="+mj-lt"/>
+              <a:buAutoNum type="arabicPeriod"/>
+            </a:pPr>
+            <a:r>
+              <a:rPr lang="en-GB" sz="1400" dirty="0"/>
+              <a:t>this step can be completed outside the for loop as this is fixed as J4 rotates around X in this plane</a:t>
+            </a:r>
+          </a:p>
+          <a:p>
+            <a:pPr marL="800100" lvl="1" indent="-342900">
+              <a:buFont typeface="+mj-lt"/>
+              <a:buAutoNum type="arabicPeriod"/>
+            </a:pPr>
+            <a:r>
+              <a:rPr lang="en-GB" sz="1400" dirty="0"/>
+              <a:t>From the URDF, we know that J4 is at (0.96, -0.054) with respect to J3</a:t>
+            </a:r>
+          </a:p>
+          <a:p>
+            <a:pPr marL="800100" lvl="1" indent="-342900">
+              <a:buFont typeface="+mj-lt"/>
+              <a:buAutoNum type="arabicPeriod"/>
+            </a:pPr>
+            <a:r>
+              <a:rPr lang="en-GB" sz="1400" dirty="0"/>
+              <a:t>From the URDF, we know that J5 is at (0.96+0.54, -0.054) with respect to J3</a:t>
+            </a:r>
+          </a:p>
+          <a:p>
+            <a:pPr marL="800100" lvl="1" indent="-342900">
+              <a:buFont typeface="+mj-lt"/>
+              <a:buAutoNum type="arabicPeriod"/>
+            </a:pPr>
+            <a:r>
+              <a:rPr lang="en-GB" sz="1400" dirty="0"/>
+              <a:t>Using Pythagoras theorem we can calculate the length J3-J4 as sqrt(0.96**2, 0.052**2)</a:t>
+            </a:r>
+          </a:p>
+          <a:p>
+            <a:pPr marL="800100" lvl="1" indent="-342900">
+              <a:buFont typeface="+mj-lt"/>
+              <a:buAutoNum type="arabicPeriod"/>
+            </a:pPr>
+            <a:r>
+              <a:rPr lang="en-GB" sz="1400" dirty="0"/>
+              <a:t>Using atan2 we can work out the angle of J5 WRT J3</a:t>
+            </a:r>
+          </a:p>
+          <a:p>
+            <a:pPr marL="800100" lvl="1" indent="-342900">
+              <a:buFont typeface="+mj-lt"/>
+              <a:buAutoNum type="arabicPeriod"/>
+            </a:pPr>
+            <a:r>
+              <a:rPr lang="en-GB" sz="1400" dirty="0"/>
+              <a:t>Using atan2, work out angle of J4 WRT J3</a:t>
+            </a:r>
+          </a:p>
+          <a:p>
+            <a:pPr marL="800100" lvl="1" indent="-342900">
+              <a:buFont typeface="+mj-lt"/>
+              <a:buAutoNum type="arabicPeriod"/>
+            </a:pPr>
+            <a:r>
+              <a:rPr lang="en-GB" sz="1400" dirty="0"/>
+              <a:t>Angle J4-J3-J5 (i.e. the angle at J3 between the lines J3-J5 and J3-J4) is the difference between these two</a:t>
+            </a:r>
+          </a:p>
+          <a:p>
+            <a:pPr marL="800100" lvl="1" indent="-342900">
+              <a:buFont typeface="+mj-lt"/>
+              <a:buAutoNum type="arabicPeriod"/>
+            </a:pPr>
+            <a:r>
+              <a:rPr lang="en-GB" sz="1400" dirty="0"/>
+              <a:t>Knowing the lengths of 2 sides and the angle, we use cosine rule to say that the length J3-J5 is sqrt(length J3-4**2 + 0.54** - 2 * length J3-4 * 0.54*cos(angle J4-J3-J5))</a:t>
+            </a:r>
+          </a:p>
+          <a:p>
+            <a:pPr marL="342900" lvl="0" indent="-342900">
+              <a:buFont typeface="+mj-lt"/>
+              <a:buAutoNum type="arabicPeriod"/>
+            </a:pPr>
+            <a:r>
+              <a:rPr lang="en-GB" sz="1400" dirty="0"/>
+              <a:t>Calculate the length of the line J2-J5(WC)</a:t>
+            </a:r>
+          </a:p>
+          <a:p>
+            <a:pPr marL="800100" lvl="1" indent="-342900">
+              <a:buFont typeface="+mj-lt"/>
+              <a:buAutoNum type="arabicPeriod"/>
+            </a:pPr>
+            <a:r>
+              <a:rPr lang="en-GB" sz="1400" dirty="0"/>
+              <a:t>Adjust WC for plane </a:t>
+            </a:r>
+            <a:r>
+              <a:rPr lang="en-GB" sz="1400" dirty="0" err="1"/>
+              <a:t>yz</a:t>
+            </a:r>
+            <a:r>
+              <a:rPr lang="en-GB" sz="1400" dirty="0"/>
+              <a:t> and with J2 at zero:</a:t>
+            </a:r>
+          </a:p>
+          <a:p>
+            <a:pPr marL="1257300" lvl="2" indent="-342900">
+              <a:buFont typeface="+mj-lt"/>
+              <a:buAutoNum type="arabicPeriod"/>
+            </a:pPr>
+            <a:r>
+              <a:rPr lang="en-GB" sz="1400" dirty="0" err="1"/>
+              <a:t>WCx</a:t>
+            </a:r>
+            <a:r>
+              <a:rPr lang="en-GB" sz="1400" dirty="0"/>
+              <a:t> = wrist centre X – 0.35</a:t>
+            </a:r>
+          </a:p>
+          <a:p>
+            <a:pPr marL="1257300" lvl="2" indent="-342900">
+              <a:buFont typeface="+mj-lt"/>
+              <a:buAutoNum type="arabicPeriod"/>
+            </a:pPr>
+            <a:r>
+              <a:rPr lang="en-GB" sz="1400" dirty="0" err="1"/>
+              <a:t>WCy</a:t>
+            </a:r>
+            <a:r>
+              <a:rPr lang="en-GB" sz="1400" dirty="0"/>
+              <a:t> = Wrist Centre Z – 0.33 – 0.42</a:t>
+            </a:r>
+          </a:p>
+          <a:p>
+            <a:pPr marL="800100" lvl="1" indent="-342900">
+              <a:buFont typeface="+mj-lt"/>
+              <a:buAutoNum type="arabicPeriod"/>
+            </a:pPr>
+            <a:r>
+              <a:rPr lang="en-GB" sz="1400" dirty="0"/>
+              <a:t>Length J2 – J5 is sqrt(</a:t>
+            </a:r>
+            <a:r>
+              <a:rPr lang="en-GB" sz="1400" dirty="0" err="1"/>
+              <a:t>WCx</a:t>
+            </a:r>
+            <a:r>
+              <a:rPr lang="en-GB" sz="1400" dirty="0"/>
+              <a:t>**2 + </a:t>
+            </a:r>
+            <a:r>
+              <a:rPr lang="en-GB" sz="1400" dirty="0" err="1"/>
+              <a:t>WCy</a:t>
+            </a:r>
+            <a:r>
+              <a:rPr lang="en-GB" sz="1400" dirty="0"/>
+              <a:t>**2)</a:t>
+            </a:r>
+          </a:p>
+          <a:p>
+            <a:pPr marL="342900" lvl="0" indent="-342900">
+              <a:buFont typeface="+mj-lt"/>
+              <a:buAutoNum type="arabicPeriod"/>
+            </a:pPr>
+            <a:r>
+              <a:rPr lang="en-GB" sz="1400" dirty="0"/>
+              <a:t>Theta2</a:t>
+            </a:r>
+          </a:p>
+          <a:p>
+            <a:pPr marL="800100" lvl="1" indent="-342900">
+              <a:buFont typeface="+mj-lt"/>
+              <a:buAutoNum type="arabicPeriod"/>
+            </a:pPr>
+            <a:r>
+              <a:rPr lang="en-GB" sz="1400" dirty="0"/>
+              <a:t>Knowing position of WC with respect to J2 we can work out angle between J2 and WC using arctan</a:t>
+            </a:r>
+          </a:p>
+          <a:p>
+            <a:pPr marL="800100" lvl="1" indent="-342900">
+              <a:buFont typeface="+mj-lt"/>
+              <a:buAutoNum type="arabicPeriod"/>
+            </a:pPr>
+            <a:r>
+              <a:rPr lang="en-GB" sz="1400" dirty="0"/>
+              <a:t>We need to work out the length from J2 to WC using Pythagoras theorem</a:t>
+            </a:r>
+          </a:p>
+          <a:p>
+            <a:pPr marL="800100" lvl="1" indent="-342900">
+              <a:buFont typeface="+mj-lt"/>
+              <a:buAutoNum type="arabicPeriod"/>
+            </a:pPr>
+            <a:r>
+              <a:rPr lang="en-GB" sz="1400" dirty="0"/>
+              <a:t>Can then angle between WC-J2-J3 which we calculate using cosine rule and the size of the triangle J2-J3-WC</a:t>
+            </a:r>
+          </a:p>
+          <a:p>
+            <a:pPr marL="800100" lvl="1" indent="-342900">
+              <a:buFont typeface="+mj-lt"/>
+              <a:buAutoNum type="arabicPeriod"/>
+            </a:pPr>
+            <a:r>
+              <a:rPr lang="en-GB" sz="1400" dirty="0"/>
+              <a:t>Subtract this from pi/2 to get theta2? Not sure…</a:t>
+            </a:r>
+          </a:p>
+          <a:p>
+            <a:pPr marL="342900" lvl="0" indent="-342900">
+              <a:buFont typeface="+mj-lt"/>
+              <a:buAutoNum type="arabicPeriod"/>
+            </a:pPr>
+            <a:r>
+              <a:rPr lang="en-GB" sz="1400" dirty="0"/>
+              <a:t>Theta3</a:t>
+            </a:r>
+          </a:p>
+          <a:p>
+            <a:pPr marL="800100" lvl="1" indent="-342900">
+              <a:buFont typeface="+mj-lt"/>
+              <a:buAutoNum type="arabicPeriod"/>
+            </a:pPr>
+            <a:r>
+              <a:rPr lang="en-GB" sz="1400" dirty="0"/>
+              <a:t>Knowing the lengths of all 3 sides of the triangle J2-J3-J5, we can work out the internal angle at J3 using cosine rule</a:t>
+            </a:r>
+          </a:p>
+          <a:p>
+            <a:pPr marL="800100" lvl="1" indent="-342900">
+              <a:buFont typeface="+mj-lt"/>
+              <a:buAutoNum type="arabicPeriod"/>
+            </a:pPr>
+            <a:r>
+              <a:rPr lang="en-GB" sz="1400" dirty="0"/>
+              <a:t>We need to subtract the angle J4-J3-J5 from this, and add pi/2 (to account for 90 degree rotation) to get the angle theta3</a:t>
+            </a:r>
+          </a:p>
+        </p:txBody>
+      </p:sp>
+    </p:spTree>
+    <p:extLst>
+      <p:ext uri="{BB962C8B-B14F-4D97-AF65-F5344CB8AC3E}">
+        <p14:creationId xmlns:p14="http://schemas.microsoft.com/office/powerpoint/2010/main" val="3057621477"/>
+      </p:ext>
+    </p:extLst>
+  </p:cSld>
+  <p:clrMapOvr>
+    <a:masterClrMapping/>
+  </p:clrMapOvr>
+</p:sld>
+</file>
+
+<file path=ppt/slides/slide5.xml><?xml version="1.0" encoding="utf-8"?>
+<p:sld xmlns:a="http://schemas.openxmlformats.org/drawingml/2006/main" xmlns:r="http://schemas.openxmlformats.org/officeDocument/2006/relationships" xmlns:p="http://schemas.openxmlformats.org/presentationml/2006/main">
+  <p:cSld>
+    <p:spTree>
+      <p:nvGrpSpPr>
+        <p:cNvPr id="1" name=""/>
+        <p:cNvGrpSpPr/>
+        <p:nvPr/>
+      </p:nvGrpSpPr>
+      <p:grpSpPr>
+        <a:xfrm>
+          <a:off x="0" y="0"/>
+          <a:ext cx="0" cy="0"/>
+          <a:chOff x="0" y="0"/>
+          <a:chExt cx="0" cy="0"/>
+        </a:xfrm>
+      </p:grpSpPr>
+      <p:cxnSp>
+        <p:nvCxnSpPr>
+          <p:cNvPr id="32" name="Straight Connector 31">
+            <a:extLst>
+              <a:ext uri="{FF2B5EF4-FFF2-40B4-BE49-F238E27FC236}">
+                <a16:creationId xmlns:a16="http://schemas.microsoft.com/office/drawing/2014/main" id="{7C2C114F-7785-0948-B27D-9D0BC946A8A5}"/>
+              </a:ext>
+            </a:extLst>
+          </p:cNvPr>
+          <p:cNvCxnSpPr>
+            <a:cxnSpLocks/>
+          </p:cNvCxnSpPr>
+          <p:nvPr/>
+        </p:nvCxnSpPr>
+        <p:spPr>
+          <a:xfrm>
+            <a:off x="5214164" y="1771270"/>
+            <a:ext cx="707935" cy="138667"/>
+          </a:xfrm>
+          <a:prstGeom prst="line">
+            <a:avLst/>
+          </a:prstGeom>
+          <a:ln>
+            <a:solidFill>
+              <a:schemeClr val="tx1"/>
+            </a:solidFill>
+          </a:ln>
+        </p:spPr>
+        <p:style>
+          <a:lnRef idx="1">
+            <a:schemeClr val="accent1"/>
+          </a:lnRef>
+          <a:fillRef idx="0">
+            <a:schemeClr val="accent1"/>
+          </a:fillRef>
+          <a:effectRef idx="0">
+            <a:schemeClr val="accent1"/>
+          </a:effectRef>
+          <a:fontRef idx="minor">
+            <a:schemeClr val="tx1"/>
+          </a:fontRef>
+        </p:style>
+      </p:cxnSp>
+      <p:cxnSp>
+        <p:nvCxnSpPr>
+          <p:cNvPr id="3" name="Straight Connector 2">
+            <a:extLst>
+              <a:ext uri="{FF2B5EF4-FFF2-40B4-BE49-F238E27FC236}">
+                <a16:creationId xmlns:a16="http://schemas.microsoft.com/office/drawing/2014/main" id="{EC9D61CD-A4C1-FD43-8261-AE78C5097005}"/>
+              </a:ext>
+            </a:extLst>
+          </p:cNvPr>
+          <p:cNvCxnSpPr>
+            <a:cxnSpLocks/>
+          </p:cNvCxnSpPr>
+          <p:nvPr/>
+        </p:nvCxnSpPr>
+        <p:spPr>
+          <a:xfrm>
+            <a:off x="4758787" y="1410011"/>
+            <a:ext cx="455377" cy="354560"/>
+          </a:xfrm>
+          <a:prstGeom prst="line">
+            <a:avLst/>
+          </a:prstGeom>
+          <a:ln>
+            <a:solidFill>
+              <a:schemeClr val="tx1"/>
+            </a:solidFill>
+          </a:ln>
+        </p:spPr>
+        <p:style>
+          <a:lnRef idx="1">
+            <a:schemeClr val="accent1"/>
+          </a:lnRef>
+          <a:fillRef idx="0">
+            <a:schemeClr val="accent1"/>
+          </a:fillRef>
+          <a:effectRef idx="0">
+            <a:schemeClr val="accent1"/>
+          </a:effectRef>
+          <a:fontRef idx="minor">
+            <a:schemeClr val="tx1"/>
+          </a:fontRef>
+        </p:style>
+      </p:cxnSp>
+      <p:sp>
+        <p:nvSpPr>
+          <p:cNvPr id="4" name="Rectangle 3">
+            <a:extLst>
+              <a:ext uri="{FF2B5EF4-FFF2-40B4-BE49-F238E27FC236}">
+                <a16:creationId xmlns:a16="http://schemas.microsoft.com/office/drawing/2014/main" id="{DC37C897-54C4-CB4A-9414-52F44AE62D55}"/>
+              </a:ext>
+            </a:extLst>
+          </p:cNvPr>
+          <p:cNvSpPr/>
+          <p:nvPr/>
+        </p:nvSpPr>
+        <p:spPr>
+          <a:xfrm>
+            <a:off x="3767781" y="2531759"/>
+            <a:ext cx="391886" cy="230837"/>
+          </a:xfrm>
+          <a:prstGeom prst="rect">
+            <a:avLst/>
+          </a:prstGeom>
+          <a:ln>
+            <a:solidFill>
+              <a:schemeClr val="tx1"/>
+            </a:solidFill>
+          </a:ln>
+        </p:spPr>
+        <p:style>
+          <a:lnRef idx="2">
+            <a:schemeClr val="accent1"/>
+          </a:lnRef>
+          <a:fillRef idx="1">
+            <a:schemeClr val="lt1"/>
+          </a:fillRef>
+          <a:effectRef idx="0">
+            <a:schemeClr val="accent1"/>
+          </a:effectRef>
+          <a:fontRef idx="minor">
+            <a:schemeClr val="dk1"/>
+          </a:fontRef>
+        </p:style>
+        <p:txBody>
+          <a:bodyPr rtlCol="0" anchor="ctr"/>
+          <a:lstStyle/>
+          <a:p>
+            <a:pPr algn="ctr"/>
+            <a:r>
+              <a:rPr lang="en-US" dirty="0"/>
+              <a:t>1</a:t>
+            </a:r>
+          </a:p>
+        </p:txBody>
+      </p:sp>
+      <p:sp>
+        <p:nvSpPr>
+          <p:cNvPr id="6" name="Oval 5">
+            <a:extLst>
+              <a:ext uri="{FF2B5EF4-FFF2-40B4-BE49-F238E27FC236}">
+                <a16:creationId xmlns:a16="http://schemas.microsoft.com/office/drawing/2014/main" id="{3265532C-D0AB-9B45-A482-23D7D466C94D}"/>
+              </a:ext>
+            </a:extLst>
+          </p:cNvPr>
+          <p:cNvSpPr/>
+          <p:nvPr/>
+        </p:nvSpPr>
+        <p:spPr>
+          <a:xfrm>
+            <a:off x="5833458" y="1815589"/>
+            <a:ext cx="177282" cy="166986"/>
+          </a:xfrm>
+          <a:prstGeom prst="ellipse">
+            <a:avLst/>
+          </a:prstGeom>
+          <a:ln>
+            <a:solidFill>
+              <a:schemeClr val="tx1"/>
+            </a:solidFill>
+          </a:ln>
+        </p:spPr>
+        <p:style>
+          <a:lnRef idx="2">
+            <a:schemeClr val="accent1"/>
+          </a:lnRef>
+          <a:fillRef idx="1">
+            <a:schemeClr val="lt1"/>
+          </a:fillRef>
+          <a:effectRef idx="0">
+            <a:schemeClr val="accent1"/>
+          </a:effectRef>
+          <a:fontRef idx="minor">
+            <a:schemeClr val="dk1"/>
+          </a:fontRef>
+        </p:style>
+        <p:txBody>
+          <a:bodyPr rtlCol="0" anchor="ctr"/>
+          <a:lstStyle/>
+          <a:p>
+            <a:pPr algn="ctr"/>
+            <a:endParaRPr lang="en-US"/>
+          </a:p>
+        </p:txBody>
+      </p:sp>
+      <p:cxnSp>
+        <p:nvCxnSpPr>
+          <p:cNvPr id="8" name="Straight Connector 7">
+            <a:extLst>
+              <a:ext uri="{FF2B5EF4-FFF2-40B4-BE49-F238E27FC236}">
+                <a16:creationId xmlns:a16="http://schemas.microsoft.com/office/drawing/2014/main" id="{2A96B7C4-18F6-9F4D-BA89-DAB44FE820CB}"/>
+              </a:ext>
+            </a:extLst>
+          </p:cNvPr>
+          <p:cNvCxnSpPr>
+            <a:cxnSpLocks/>
+          </p:cNvCxnSpPr>
+          <p:nvPr/>
+        </p:nvCxnSpPr>
+        <p:spPr>
+          <a:xfrm>
+            <a:off x="3966849" y="840993"/>
+            <a:ext cx="0" cy="1494827"/>
+          </a:xfrm>
+          <a:prstGeom prst="line">
+            <a:avLst/>
+          </a:prstGeom>
+          <a:ln>
+            <a:prstDash val="sysDot"/>
+          </a:ln>
+        </p:spPr>
+        <p:style>
+          <a:lnRef idx="1">
+            <a:schemeClr val="accent4"/>
+          </a:lnRef>
+          <a:fillRef idx="0">
+            <a:schemeClr val="accent4"/>
+          </a:fillRef>
+          <a:effectRef idx="0">
+            <a:schemeClr val="accent4"/>
+          </a:effectRef>
+          <a:fontRef idx="minor">
+            <a:schemeClr val="tx1"/>
+          </a:fontRef>
+        </p:style>
+      </p:cxnSp>
+      <p:cxnSp>
+        <p:nvCxnSpPr>
+          <p:cNvPr id="13" name="Straight Connector 12">
+            <a:extLst>
+              <a:ext uri="{FF2B5EF4-FFF2-40B4-BE49-F238E27FC236}">
+                <a16:creationId xmlns:a16="http://schemas.microsoft.com/office/drawing/2014/main" id="{3087EC4D-5856-E747-A262-3559894F30F5}"/>
+              </a:ext>
+            </a:extLst>
+          </p:cNvPr>
+          <p:cNvCxnSpPr>
+            <a:cxnSpLocks/>
+          </p:cNvCxnSpPr>
+          <p:nvPr/>
+        </p:nvCxnSpPr>
+        <p:spPr>
+          <a:xfrm flipV="1">
+            <a:off x="4471660" y="1410011"/>
+            <a:ext cx="284751" cy="808024"/>
+          </a:xfrm>
+          <a:prstGeom prst="line">
+            <a:avLst/>
+          </a:prstGeom>
+          <a:ln>
+            <a:solidFill>
+              <a:schemeClr val="tx1"/>
+            </a:solidFill>
+          </a:ln>
+        </p:spPr>
+        <p:style>
+          <a:lnRef idx="1">
+            <a:schemeClr val="accent1"/>
+          </a:lnRef>
+          <a:fillRef idx="0">
+            <a:schemeClr val="accent1"/>
+          </a:fillRef>
+          <a:effectRef idx="0">
+            <a:schemeClr val="accent1"/>
+          </a:effectRef>
+          <a:fontRef idx="minor">
+            <a:schemeClr val="tx1"/>
+          </a:fontRef>
+        </p:style>
+      </p:cxnSp>
+      <p:cxnSp>
+        <p:nvCxnSpPr>
+          <p:cNvPr id="14" name="Straight Connector 13">
+            <a:extLst>
+              <a:ext uri="{FF2B5EF4-FFF2-40B4-BE49-F238E27FC236}">
+                <a16:creationId xmlns:a16="http://schemas.microsoft.com/office/drawing/2014/main" id="{96152974-1F70-194E-8C73-C228E03DFB12}"/>
+              </a:ext>
+            </a:extLst>
+          </p:cNvPr>
+          <p:cNvCxnSpPr>
+            <a:cxnSpLocks/>
+          </p:cNvCxnSpPr>
+          <p:nvPr/>
+        </p:nvCxnSpPr>
+        <p:spPr>
+          <a:xfrm>
+            <a:off x="3956178" y="2216559"/>
+            <a:ext cx="519111" cy="1"/>
+          </a:xfrm>
+          <a:prstGeom prst="line">
+            <a:avLst/>
+          </a:prstGeom>
+          <a:ln>
+            <a:solidFill>
+              <a:schemeClr val="tx1"/>
+            </a:solidFill>
+          </a:ln>
+        </p:spPr>
+        <p:style>
+          <a:lnRef idx="1">
+            <a:schemeClr val="accent1"/>
+          </a:lnRef>
+          <a:fillRef idx="0">
+            <a:schemeClr val="accent1"/>
+          </a:fillRef>
+          <a:effectRef idx="0">
+            <a:schemeClr val="accent1"/>
+          </a:effectRef>
+          <a:fontRef idx="minor">
+            <a:schemeClr val="tx1"/>
+          </a:fontRef>
+        </p:style>
+      </p:cxnSp>
+      <p:cxnSp>
+        <p:nvCxnSpPr>
+          <p:cNvPr id="15" name="Straight Connector 14">
+            <a:extLst>
+              <a:ext uri="{FF2B5EF4-FFF2-40B4-BE49-F238E27FC236}">
+                <a16:creationId xmlns:a16="http://schemas.microsoft.com/office/drawing/2014/main" id="{D8400B72-4D17-2C43-8193-587AC6B70394}"/>
+              </a:ext>
+            </a:extLst>
+          </p:cNvPr>
+          <p:cNvCxnSpPr>
+            <a:cxnSpLocks/>
+          </p:cNvCxnSpPr>
+          <p:nvPr/>
+        </p:nvCxnSpPr>
+        <p:spPr>
+          <a:xfrm flipV="1">
+            <a:off x="3963724" y="2217138"/>
+            <a:ext cx="0" cy="433247"/>
+          </a:xfrm>
+          <a:prstGeom prst="line">
+            <a:avLst/>
+          </a:prstGeom>
+          <a:ln>
+            <a:solidFill>
+              <a:schemeClr val="tx1"/>
+            </a:solidFill>
+          </a:ln>
+        </p:spPr>
+        <p:style>
+          <a:lnRef idx="1">
+            <a:schemeClr val="accent1"/>
+          </a:lnRef>
+          <a:fillRef idx="0">
+            <a:schemeClr val="accent1"/>
+          </a:fillRef>
+          <a:effectRef idx="0">
+            <a:schemeClr val="accent1"/>
+          </a:effectRef>
+          <a:fontRef idx="minor">
+            <a:schemeClr val="tx1"/>
+          </a:fontRef>
+        </p:style>
+      </p:cxnSp>
+      <p:sp>
+        <p:nvSpPr>
+          <p:cNvPr id="16" name="Freeform 15">
+            <a:extLst>
+              <a:ext uri="{FF2B5EF4-FFF2-40B4-BE49-F238E27FC236}">
+                <a16:creationId xmlns:a16="http://schemas.microsoft.com/office/drawing/2014/main" id="{CA3F3335-F0B6-2344-9BC9-3547C33CCF12}"/>
+              </a:ext>
+            </a:extLst>
+          </p:cNvPr>
+          <p:cNvSpPr/>
+          <p:nvPr/>
+        </p:nvSpPr>
+        <p:spPr>
+          <a:xfrm>
+            <a:off x="5031362" y="2103987"/>
+            <a:ext cx="65690" cy="93134"/>
+          </a:xfrm>
+          <a:custGeom>
+            <a:avLst/>
+            <a:gdLst>
+              <a:gd name="connsiteX0" fmla="*/ 0 w 147545"/>
+              <a:gd name="connsiteY0" fmla="*/ 0 h 212781"/>
+              <a:gd name="connsiteX1" fmla="*/ 146050 w 147545"/>
+              <a:gd name="connsiteY1" fmla="*/ 200025 h 212781"/>
+              <a:gd name="connsiteX2" fmla="*/ 79375 w 147545"/>
+              <a:gd name="connsiteY2" fmla="*/ 203200 h 212781"/>
+              <a:gd name="connsiteX0" fmla="*/ 0 w 153794"/>
+              <a:gd name="connsiteY0" fmla="*/ 0 h 203200"/>
+              <a:gd name="connsiteX1" fmla="*/ 152400 w 153794"/>
+              <a:gd name="connsiteY1" fmla="*/ 66675 h 203200"/>
+              <a:gd name="connsiteX2" fmla="*/ 79375 w 153794"/>
+              <a:gd name="connsiteY2" fmla="*/ 203200 h 203200"/>
+              <a:gd name="connsiteX0" fmla="*/ 0 w 79375"/>
+              <a:gd name="connsiteY0" fmla="*/ 0 h 203200"/>
+              <a:gd name="connsiteX1" fmla="*/ 79375 w 79375"/>
+              <a:gd name="connsiteY1" fmla="*/ 203200 h 203200"/>
+              <a:gd name="connsiteX0" fmla="*/ 0 w 142919"/>
+              <a:gd name="connsiteY0" fmla="*/ 0 h 203200"/>
+              <a:gd name="connsiteX1" fmla="*/ 79375 w 142919"/>
+              <a:gd name="connsiteY1" fmla="*/ 203200 h 203200"/>
+              <a:gd name="connsiteX0" fmla="*/ 0 w 186211"/>
+              <a:gd name="connsiteY0" fmla="*/ 0 h 203200"/>
+              <a:gd name="connsiteX1" fmla="*/ 79375 w 186211"/>
+              <a:gd name="connsiteY1" fmla="*/ 203200 h 203200"/>
+              <a:gd name="connsiteX0" fmla="*/ 0 w 125812"/>
+              <a:gd name="connsiteY0" fmla="*/ 0 h 203200"/>
+              <a:gd name="connsiteX1" fmla="*/ 79375 w 125812"/>
+              <a:gd name="connsiteY1" fmla="*/ 203200 h 203200"/>
+              <a:gd name="connsiteX0" fmla="*/ 0 w 122234"/>
+              <a:gd name="connsiteY0" fmla="*/ 1233 h 204433"/>
+              <a:gd name="connsiteX1" fmla="*/ 79375 w 122234"/>
+              <a:gd name="connsiteY1" fmla="*/ 204433 h 204433"/>
+              <a:gd name="connsiteX0" fmla="*/ 0 w 148382"/>
+              <a:gd name="connsiteY0" fmla="*/ 1233 h 204433"/>
+              <a:gd name="connsiteX1" fmla="*/ 111125 w 148382"/>
+              <a:gd name="connsiteY1" fmla="*/ 204433 h 204433"/>
+              <a:gd name="connsiteX0" fmla="*/ 0 w 354546"/>
+              <a:gd name="connsiteY0" fmla="*/ 772 h 284406"/>
+              <a:gd name="connsiteX1" fmla="*/ 335492 w 354546"/>
+              <a:gd name="connsiteY1" fmla="*/ 284406 h 284406"/>
+              <a:gd name="connsiteX0" fmla="*/ 0 w 335731"/>
+              <a:gd name="connsiteY0" fmla="*/ 1961 h 285595"/>
+              <a:gd name="connsiteX1" fmla="*/ 335492 w 335731"/>
+              <a:gd name="connsiteY1" fmla="*/ 285595 h 285595"/>
+              <a:gd name="connsiteX0" fmla="*/ 0 w 336219"/>
+              <a:gd name="connsiteY0" fmla="*/ 60 h 283694"/>
+              <a:gd name="connsiteX1" fmla="*/ 335492 w 336219"/>
+              <a:gd name="connsiteY1" fmla="*/ 283694 h 283694"/>
+              <a:gd name="connsiteX0" fmla="*/ 0 w 335839"/>
+              <a:gd name="connsiteY0" fmla="*/ 0 h 283634"/>
+              <a:gd name="connsiteX1" fmla="*/ 335492 w 335839"/>
+              <a:gd name="connsiteY1" fmla="*/ 283634 h 283634"/>
+              <a:gd name="connsiteX0" fmla="*/ 0 w 335492"/>
+              <a:gd name="connsiteY0" fmla="*/ 0 h 283634"/>
+              <a:gd name="connsiteX1" fmla="*/ 335492 w 335492"/>
+              <a:gd name="connsiteY1" fmla="*/ 283634 h 283634"/>
+              <a:gd name="connsiteX0" fmla="*/ 0 w 113242"/>
+              <a:gd name="connsiteY0" fmla="*/ 23817 h 101076"/>
+              <a:gd name="connsiteX1" fmla="*/ 113242 w 113242"/>
+              <a:gd name="connsiteY1" fmla="*/ 101076 h 101076"/>
+              <a:gd name="connsiteX0" fmla="*/ 0 w 131430"/>
+              <a:gd name="connsiteY0" fmla="*/ 0 h 77259"/>
+              <a:gd name="connsiteX1" fmla="*/ 113242 w 131430"/>
+              <a:gd name="connsiteY1" fmla="*/ 77259 h 77259"/>
+              <a:gd name="connsiteX0" fmla="*/ 0 w 88086"/>
+              <a:gd name="connsiteY0" fmla="*/ 0 h 96309"/>
+              <a:gd name="connsiteX1" fmla="*/ 33867 w 88086"/>
+              <a:gd name="connsiteY1" fmla="*/ 96309 h 96309"/>
+              <a:gd name="connsiteX0" fmla="*/ 0 w 51968"/>
+              <a:gd name="connsiteY0" fmla="*/ 0 h 96309"/>
+              <a:gd name="connsiteX1" fmla="*/ 33867 w 51968"/>
+              <a:gd name="connsiteY1" fmla="*/ 96309 h 96309"/>
+              <a:gd name="connsiteX0" fmla="*/ 0 w 65690"/>
+              <a:gd name="connsiteY0" fmla="*/ 0 h 93134"/>
+              <a:gd name="connsiteX1" fmla="*/ 52917 w 65690"/>
+              <a:gd name="connsiteY1" fmla="*/ 93134 h 93134"/>
+            </a:gdLst>
+            <a:ahLst/>
+            <a:cxnLst>
+              <a:cxn ang="0">
+                <a:pos x="connsiteX0" y="connsiteY0"/>
+              </a:cxn>
+              <a:cxn ang="0">
+                <a:pos x="connsiteX1" y="connsiteY1"/>
+              </a:cxn>
+            </a:cxnLst>
+            <a:rect l="l" t="t" r="r" b="b"/>
+            <a:pathLst>
+              <a:path w="65690" h="93134">
+                <a:moveTo>
+                  <a:pt x="0" y="0"/>
+                </a:moveTo>
+                <a:cubicBezTo>
+                  <a:pt x="61384" y="8466"/>
+                  <a:pt x="81492" y="70909"/>
+                  <a:pt x="52917" y="93134"/>
+                </a:cubicBezTo>
+              </a:path>
+            </a:pathLst>
+          </a:custGeom>
+          <a:noFill/>
+          <a:ln>
+            <a:solidFill>
+              <a:schemeClr val="tx1"/>
+            </a:solidFill>
+            <a:headEnd type="triangle" w="med" len="med"/>
+            <a:tailEnd type="none" w="sm" len="med"/>
+          </a:ln>
+        </p:spPr>
+        <p:style>
+          <a:lnRef idx="2">
+            <a:schemeClr val="accent1">
+              <a:shade val="50000"/>
+            </a:schemeClr>
+          </a:lnRef>
+          <a:fillRef idx="1">
+            <a:schemeClr val="accent1"/>
+          </a:fillRef>
+          <a:effectRef idx="0">
+            <a:schemeClr val="accent1"/>
+          </a:effectRef>
+          <a:fontRef idx="minor">
+            <a:schemeClr val="lt1"/>
+          </a:fontRef>
+        </p:style>
+        <p:txBody>
+          <a:bodyPr rtlCol="0" anchor="ctr"/>
+          <a:lstStyle/>
+          <a:p>
+            <a:pPr algn="ctr"/>
+            <a:endParaRPr lang="en-US"/>
+          </a:p>
+        </p:txBody>
+      </p:sp>
+      <p:sp>
+        <p:nvSpPr>
+          <p:cNvPr id="17" name="TextBox 16">
+            <a:extLst>
+              <a:ext uri="{FF2B5EF4-FFF2-40B4-BE49-F238E27FC236}">
+                <a16:creationId xmlns:a16="http://schemas.microsoft.com/office/drawing/2014/main" id="{A5574B50-B113-6F48-945D-2C6FDBE30BF0}"/>
+              </a:ext>
+            </a:extLst>
+          </p:cNvPr>
+          <p:cNvSpPr txBox="1"/>
+          <p:nvPr/>
+        </p:nvSpPr>
+        <p:spPr>
+          <a:xfrm>
+            <a:off x="5125375" y="2075409"/>
+            <a:ext cx="154845" cy="138499"/>
+          </a:xfrm>
+          <a:prstGeom prst="rect">
+            <a:avLst/>
+          </a:prstGeom>
+          <a:noFill/>
+          <a:ln>
+            <a:noFill/>
+          </a:ln>
+        </p:spPr>
+        <p:txBody>
+          <a:bodyPr wrap="square" lIns="0" tIns="0" rIns="0" bIns="0" rtlCol="0">
+            <a:spAutoFit/>
+          </a:bodyPr>
+          <a:lstStyle/>
+          <a:p>
+            <a:r>
+              <a:rPr lang="en-US" sz="900" dirty="0"/>
+              <a:t>g</a:t>
+            </a:r>
+            <a:r>
+              <a:rPr lang="en-US" sz="900" baseline="-25000" dirty="0"/>
+              <a:t>1</a:t>
+            </a:r>
+          </a:p>
+        </p:txBody>
+      </p:sp>
+      <p:cxnSp>
+        <p:nvCxnSpPr>
+          <p:cNvPr id="18" name="Straight Connector 17">
+            <a:extLst>
+              <a:ext uri="{FF2B5EF4-FFF2-40B4-BE49-F238E27FC236}">
+                <a16:creationId xmlns:a16="http://schemas.microsoft.com/office/drawing/2014/main" id="{458E8048-E553-CB49-9AA6-CF7D38C86999}"/>
+              </a:ext>
+            </a:extLst>
+          </p:cNvPr>
+          <p:cNvCxnSpPr>
+            <a:cxnSpLocks/>
+          </p:cNvCxnSpPr>
+          <p:nvPr/>
+        </p:nvCxnSpPr>
+        <p:spPr>
+          <a:xfrm flipV="1">
+            <a:off x="3964416" y="2335820"/>
+            <a:ext cx="0" cy="452099"/>
+          </a:xfrm>
+          <a:prstGeom prst="line">
+            <a:avLst/>
+          </a:prstGeom>
+          <a:ln>
+            <a:solidFill>
+              <a:srgbClr val="0070C0"/>
+            </a:solidFill>
+            <a:headEnd type="none" w="med" len="med"/>
+            <a:tailEnd type="triangle" w="med" len="med"/>
+          </a:ln>
+        </p:spPr>
+        <p:style>
+          <a:lnRef idx="1">
+            <a:schemeClr val="accent1"/>
+          </a:lnRef>
+          <a:fillRef idx="0">
+            <a:schemeClr val="accent1"/>
+          </a:fillRef>
+          <a:effectRef idx="0">
+            <a:schemeClr val="accent1"/>
+          </a:effectRef>
+          <a:fontRef idx="minor">
+            <a:schemeClr val="tx1"/>
+          </a:fontRef>
+        </p:style>
+      </p:cxnSp>
+      <p:sp>
+        <p:nvSpPr>
+          <p:cNvPr id="19" name="TextBox 18">
+            <a:extLst>
+              <a:ext uri="{FF2B5EF4-FFF2-40B4-BE49-F238E27FC236}">
+                <a16:creationId xmlns:a16="http://schemas.microsoft.com/office/drawing/2014/main" id="{ED2F0E2A-0F2F-B44B-BC4C-843759B096FD}"/>
+              </a:ext>
+            </a:extLst>
+          </p:cNvPr>
+          <p:cNvSpPr txBox="1"/>
+          <p:nvPr/>
+        </p:nvSpPr>
+        <p:spPr>
+          <a:xfrm>
+            <a:off x="7438801" y="2394572"/>
+            <a:ext cx="104775" cy="138499"/>
+          </a:xfrm>
+          <a:prstGeom prst="rect">
+            <a:avLst/>
+          </a:prstGeom>
+          <a:noFill/>
+          <a:ln>
+            <a:noFill/>
+          </a:ln>
+        </p:spPr>
+        <p:txBody>
+          <a:bodyPr wrap="square" lIns="0" tIns="0" rIns="0" bIns="0" rtlCol="0">
+            <a:spAutoFit/>
+          </a:bodyPr>
+          <a:lstStyle/>
+          <a:p>
+            <a:r>
+              <a:rPr lang="en-US" sz="900" dirty="0"/>
+              <a:t>y</a:t>
+            </a:r>
+            <a:r>
+              <a:rPr lang="en-US" sz="900" baseline="-25000" dirty="0"/>
+              <a:t>1</a:t>
+            </a:r>
+          </a:p>
+        </p:txBody>
+      </p:sp>
+      <p:cxnSp>
+        <p:nvCxnSpPr>
+          <p:cNvPr id="20" name="Straight Connector 19">
+            <a:extLst>
+              <a:ext uri="{FF2B5EF4-FFF2-40B4-BE49-F238E27FC236}">
+                <a16:creationId xmlns:a16="http://schemas.microsoft.com/office/drawing/2014/main" id="{A9594CC4-69F9-E440-BF29-75CFC90629E7}"/>
+              </a:ext>
+            </a:extLst>
+          </p:cNvPr>
+          <p:cNvCxnSpPr>
+            <a:cxnSpLocks/>
+          </p:cNvCxnSpPr>
+          <p:nvPr/>
+        </p:nvCxnSpPr>
+        <p:spPr>
+          <a:xfrm>
+            <a:off x="7263336" y="2796661"/>
+            <a:ext cx="643467" cy="0"/>
+          </a:xfrm>
+          <a:prstGeom prst="line">
+            <a:avLst/>
+          </a:prstGeom>
+          <a:ln>
+            <a:solidFill>
+              <a:srgbClr val="FF0000"/>
+            </a:solidFill>
+            <a:headEnd type="none" w="med" len="med"/>
+            <a:tailEnd type="triangle" w="med" len="med"/>
+          </a:ln>
+        </p:spPr>
+        <p:style>
+          <a:lnRef idx="1">
+            <a:schemeClr val="accent1"/>
+          </a:lnRef>
+          <a:fillRef idx="0">
+            <a:schemeClr val="accent1"/>
+          </a:fillRef>
+          <a:effectRef idx="0">
+            <a:schemeClr val="accent1"/>
+          </a:effectRef>
+          <a:fontRef idx="minor">
+            <a:schemeClr val="tx1"/>
+          </a:fontRef>
+        </p:style>
+      </p:cxnSp>
+      <p:sp>
+        <p:nvSpPr>
+          <p:cNvPr id="21" name="TextBox 20">
+            <a:extLst>
+              <a:ext uri="{FF2B5EF4-FFF2-40B4-BE49-F238E27FC236}">
+                <a16:creationId xmlns:a16="http://schemas.microsoft.com/office/drawing/2014/main" id="{B5A1D5C5-1F96-C741-B8B6-F861DD3FDAFA}"/>
+              </a:ext>
+            </a:extLst>
+          </p:cNvPr>
+          <p:cNvSpPr txBox="1"/>
+          <p:nvPr/>
+        </p:nvSpPr>
+        <p:spPr>
+          <a:xfrm>
+            <a:off x="4004822" y="2367937"/>
+            <a:ext cx="154845" cy="138499"/>
+          </a:xfrm>
+          <a:prstGeom prst="rect">
+            <a:avLst/>
+          </a:prstGeom>
+          <a:noFill/>
+          <a:ln>
+            <a:noFill/>
+          </a:ln>
+        </p:spPr>
+        <p:txBody>
+          <a:bodyPr wrap="square" lIns="0" tIns="0" rIns="0" bIns="0" rtlCol="0">
+            <a:spAutoFit/>
+          </a:bodyPr>
+          <a:lstStyle/>
+          <a:p>
+            <a:r>
+              <a:rPr lang="en-US" sz="900" dirty="0"/>
+              <a:t>z</a:t>
+            </a:r>
+            <a:r>
+              <a:rPr lang="en-US" sz="900" baseline="-25000" dirty="0"/>
+              <a:t>1</a:t>
+            </a:r>
+          </a:p>
+        </p:txBody>
+      </p:sp>
+      <p:sp>
+        <p:nvSpPr>
+          <p:cNvPr id="22" name="TextBox 21">
+            <a:extLst>
+              <a:ext uri="{FF2B5EF4-FFF2-40B4-BE49-F238E27FC236}">
+                <a16:creationId xmlns:a16="http://schemas.microsoft.com/office/drawing/2014/main" id="{51E89F48-525B-3342-8273-0E2513EBB03A}"/>
+              </a:ext>
+            </a:extLst>
+          </p:cNvPr>
+          <p:cNvSpPr txBox="1"/>
+          <p:nvPr/>
+        </p:nvSpPr>
+        <p:spPr>
+          <a:xfrm>
+            <a:off x="7625104" y="2459615"/>
+            <a:ext cx="229050" cy="138499"/>
+          </a:xfrm>
+          <a:prstGeom prst="rect">
+            <a:avLst/>
+          </a:prstGeom>
+          <a:noFill/>
+          <a:ln>
+            <a:noFill/>
+          </a:ln>
+        </p:spPr>
+        <p:txBody>
+          <a:bodyPr wrap="square" lIns="0" tIns="0" rIns="0" bIns="0" rtlCol="0">
+            <a:spAutoFit/>
+          </a:bodyPr>
+          <a:lstStyle/>
+          <a:p>
+            <a:r>
+              <a:rPr lang="en-US" sz="900" dirty="0" err="1"/>
+              <a:t>wc</a:t>
+            </a:r>
+            <a:r>
+              <a:rPr lang="en-US" sz="900" baseline="-25000" dirty="0" err="1"/>
+              <a:t>x</a:t>
+            </a:r>
+            <a:endParaRPr lang="en-US" sz="900" baseline="-25000" dirty="0"/>
+          </a:p>
+        </p:txBody>
+      </p:sp>
+      <p:sp>
+        <p:nvSpPr>
+          <p:cNvPr id="23" name="TextBox 22">
+            <a:extLst>
+              <a:ext uri="{FF2B5EF4-FFF2-40B4-BE49-F238E27FC236}">
+                <a16:creationId xmlns:a16="http://schemas.microsoft.com/office/drawing/2014/main" id="{5E34942D-5921-204B-966B-6B9A461117AE}"/>
+              </a:ext>
+            </a:extLst>
+          </p:cNvPr>
+          <p:cNvSpPr txBox="1"/>
+          <p:nvPr/>
+        </p:nvSpPr>
+        <p:spPr>
+          <a:xfrm>
+            <a:off x="6745088" y="1702021"/>
+            <a:ext cx="229050" cy="138499"/>
+          </a:xfrm>
+          <a:prstGeom prst="rect">
+            <a:avLst/>
+          </a:prstGeom>
+          <a:noFill/>
+          <a:ln>
+            <a:noFill/>
+          </a:ln>
+        </p:spPr>
+        <p:txBody>
+          <a:bodyPr wrap="square" lIns="0" tIns="0" rIns="0" bIns="0" rtlCol="0">
+            <a:spAutoFit/>
+          </a:bodyPr>
+          <a:lstStyle/>
+          <a:p>
+            <a:r>
+              <a:rPr lang="en-US" sz="900" dirty="0" err="1"/>
+              <a:t>wc</a:t>
+            </a:r>
+            <a:r>
+              <a:rPr lang="en-US" sz="900" baseline="-25000" dirty="0" err="1"/>
+              <a:t>y</a:t>
+            </a:r>
+            <a:endParaRPr lang="en-US" sz="900" baseline="-25000" dirty="0"/>
+          </a:p>
+        </p:txBody>
+      </p:sp>
+      <p:sp>
+        <p:nvSpPr>
+          <p:cNvPr id="24" name="TextBox 23">
+            <a:extLst>
+              <a:ext uri="{FF2B5EF4-FFF2-40B4-BE49-F238E27FC236}">
+                <a16:creationId xmlns:a16="http://schemas.microsoft.com/office/drawing/2014/main" id="{DBC75440-E4AD-8645-B249-66A5D3787ED3}"/>
+              </a:ext>
+            </a:extLst>
+          </p:cNvPr>
+          <p:cNvSpPr txBox="1"/>
+          <p:nvPr/>
+        </p:nvSpPr>
+        <p:spPr>
+          <a:xfrm>
+            <a:off x="6403666" y="1864926"/>
+            <a:ext cx="172067" cy="138499"/>
+          </a:xfrm>
+          <a:prstGeom prst="rect">
+            <a:avLst/>
+          </a:prstGeom>
+          <a:noFill/>
+          <a:ln>
+            <a:noFill/>
+          </a:ln>
+        </p:spPr>
+        <p:txBody>
+          <a:bodyPr wrap="square" lIns="0" tIns="0" rIns="0" bIns="0" rtlCol="0">
+            <a:spAutoFit/>
+          </a:bodyPr>
+          <a:lstStyle/>
+          <a:p>
+            <a:r>
+              <a:rPr lang="en-US" sz="900" dirty="0"/>
+              <a:t>a</a:t>
+            </a:r>
+            <a:r>
+              <a:rPr lang="en-US" sz="900" baseline="-25000" dirty="0"/>
+              <a:t>2</a:t>
+            </a:r>
+          </a:p>
+        </p:txBody>
+      </p:sp>
+      <p:sp>
+        <p:nvSpPr>
+          <p:cNvPr id="25" name="TextBox 24">
+            <a:extLst>
+              <a:ext uri="{FF2B5EF4-FFF2-40B4-BE49-F238E27FC236}">
+                <a16:creationId xmlns:a16="http://schemas.microsoft.com/office/drawing/2014/main" id="{63C081D7-4F0F-6443-8E2B-F1AAEAA7BEED}"/>
+              </a:ext>
+            </a:extLst>
+          </p:cNvPr>
+          <p:cNvSpPr txBox="1"/>
+          <p:nvPr/>
+        </p:nvSpPr>
+        <p:spPr>
+          <a:xfrm>
+            <a:off x="3341796" y="2390366"/>
+            <a:ext cx="164353" cy="138499"/>
+          </a:xfrm>
+          <a:prstGeom prst="rect">
+            <a:avLst/>
+          </a:prstGeom>
+          <a:noFill/>
+          <a:ln>
+            <a:noFill/>
+          </a:ln>
+        </p:spPr>
+        <p:txBody>
+          <a:bodyPr wrap="square" lIns="0" tIns="0" rIns="0" bIns="0" rtlCol="0">
+            <a:spAutoFit/>
+          </a:bodyPr>
+          <a:lstStyle/>
+          <a:p>
+            <a:r>
+              <a:rPr lang="en-US" sz="900" dirty="0"/>
+              <a:t>d</a:t>
+            </a:r>
+            <a:r>
+              <a:rPr lang="en-US" sz="900" baseline="-25000" dirty="0"/>
+              <a:t>1</a:t>
+            </a:r>
+          </a:p>
+        </p:txBody>
+      </p:sp>
+      <p:sp>
+        <p:nvSpPr>
+          <p:cNvPr id="27" name="TextBox 26">
+            <a:extLst>
+              <a:ext uri="{FF2B5EF4-FFF2-40B4-BE49-F238E27FC236}">
+                <a16:creationId xmlns:a16="http://schemas.microsoft.com/office/drawing/2014/main" id="{742DB2D2-FF77-8849-A1B3-4DADBC2447E0}"/>
+              </a:ext>
+            </a:extLst>
+          </p:cNvPr>
+          <p:cNvSpPr txBox="1"/>
+          <p:nvPr/>
+        </p:nvSpPr>
+        <p:spPr>
+          <a:xfrm>
+            <a:off x="6040261" y="1817618"/>
+            <a:ext cx="229050" cy="138499"/>
+          </a:xfrm>
+          <a:prstGeom prst="rect">
+            <a:avLst/>
+          </a:prstGeom>
+          <a:noFill/>
+          <a:ln>
+            <a:noFill/>
+          </a:ln>
+        </p:spPr>
+        <p:txBody>
+          <a:bodyPr wrap="square" lIns="0" tIns="0" rIns="0" bIns="0" rtlCol="0">
+            <a:spAutoFit/>
+          </a:bodyPr>
+          <a:lstStyle/>
+          <a:p>
+            <a:r>
+              <a:rPr lang="en-US" sz="900" dirty="0"/>
+              <a:t>WC</a:t>
+            </a:r>
+            <a:endParaRPr lang="en-US" sz="900" baseline="-25000" dirty="0"/>
+          </a:p>
+        </p:txBody>
+      </p:sp>
+      <p:sp>
+        <p:nvSpPr>
+          <p:cNvPr id="28" name="Oval 27">
+            <a:extLst>
+              <a:ext uri="{FF2B5EF4-FFF2-40B4-BE49-F238E27FC236}">
+                <a16:creationId xmlns:a16="http://schemas.microsoft.com/office/drawing/2014/main" id="{F605B447-54B6-134C-8003-F8BB6CCBEAE1}"/>
+              </a:ext>
+            </a:extLst>
+          </p:cNvPr>
+          <p:cNvSpPr/>
+          <p:nvPr/>
+        </p:nvSpPr>
+        <p:spPr>
+          <a:xfrm>
+            <a:off x="4564806" y="1214432"/>
+            <a:ext cx="391886" cy="391886"/>
+          </a:xfrm>
+          <a:prstGeom prst="ellipse">
+            <a:avLst/>
+          </a:prstGeom>
+          <a:ln>
+            <a:solidFill>
+              <a:schemeClr val="tx1"/>
+            </a:solidFill>
+          </a:ln>
+        </p:spPr>
+        <p:style>
+          <a:lnRef idx="2">
+            <a:schemeClr val="accent1"/>
+          </a:lnRef>
+          <a:fillRef idx="1">
+            <a:schemeClr val="lt1"/>
+          </a:fillRef>
+          <a:effectRef idx="0">
+            <a:schemeClr val="accent1"/>
+          </a:effectRef>
+          <a:fontRef idx="minor">
+            <a:schemeClr val="dk1"/>
+          </a:fontRef>
+        </p:style>
+        <p:txBody>
+          <a:bodyPr rtlCol="0" anchor="ctr"/>
+          <a:lstStyle/>
+          <a:p>
+            <a:pPr algn="ctr"/>
+            <a:r>
+              <a:rPr lang="en-US" dirty="0"/>
+              <a:t>3</a:t>
+            </a:r>
+          </a:p>
+        </p:txBody>
+      </p:sp>
+      <p:sp>
+        <p:nvSpPr>
+          <p:cNvPr id="29" name="Oval 28">
+            <a:extLst>
+              <a:ext uri="{FF2B5EF4-FFF2-40B4-BE49-F238E27FC236}">
+                <a16:creationId xmlns:a16="http://schemas.microsoft.com/office/drawing/2014/main" id="{14BBA4C1-2A93-FA48-89DB-600E6D4FCB5B}"/>
+              </a:ext>
+            </a:extLst>
+          </p:cNvPr>
+          <p:cNvSpPr/>
+          <p:nvPr/>
+        </p:nvSpPr>
+        <p:spPr>
+          <a:xfrm>
+            <a:off x="8348191" y="4341172"/>
+            <a:ext cx="227976" cy="227976"/>
+          </a:xfrm>
+          <a:prstGeom prst="ellipse">
+            <a:avLst/>
+          </a:prstGeom>
+          <a:ln>
+            <a:solidFill>
+              <a:schemeClr val="tx1"/>
+            </a:solidFill>
+          </a:ln>
+        </p:spPr>
+        <p:style>
+          <a:lnRef idx="2">
+            <a:schemeClr val="accent1"/>
+          </a:lnRef>
+          <a:fillRef idx="1">
+            <a:schemeClr val="lt1"/>
+          </a:fillRef>
+          <a:effectRef idx="0">
+            <a:schemeClr val="accent1"/>
+          </a:effectRef>
+          <a:fontRef idx="minor">
+            <a:schemeClr val="dk1"/>
+          </a:fontRef>
+        </p:style>
+        <p:txBody>
+          <a:bodyPr rtlCol="0" anchor="ctr"/>
+          <a:lstStyle/>
+          <a:p>
+            <a:pPr algn="ctr"/>
+            <a:r>
+              <a:rPr lang="en-US" dirty="0"/>
+              <a:t>4</a:t>
+            </a:r>
+          </a:p>
+        </p:txBody>
+      </p:sp>
+      <p:sp>
+        <p:nvSpPr>
+          <p:cNvPr id="2" name="Oval 1">
+            <a:extLst>
+              <a:ext uri="{FF2B5EF4-FFF2-40B4-BE49-F238E27FC236}">
+                <a16:creationId xmlns:a16="http://schemas.microsoft.com/office/drawing/2014/main" id="{DD0E6DD4-0DC4-1448-B86C-4ACF3A4BF32A}"/>
+              </a:ext>
+            </a:extLst>
+          </p:cNvPr>
+          <p:cNvSpPr/>
+          <p:nvPr/>
+        </p:nvSpPr>
+        <p:spPr>
+          <a:xfrm>
+            <a:off x="4273000" y="2011584"/>
+            <a:ext cx="391886" cy="391886"/>
+          </a:xfrm>
+          <a:prstGeom prst="ellipse">
+            <a:avLst/>
+          </a:prstGeom>
+          <a:ln>
+            <a:solidFill>
+              <a:schemeClr val="tx1"/>
+            </a:solidFill>
+          </a:ln>
+        </p:spPr>
+        <p:style>
+          <a:lnRef idx="2">
+            <a:schemeClr val="accent1"/>
+          </a:lnRef>
+          <a:fillRef idx="1">
+            <a:schemeClr val="lt1"/>
+          </a:fillRef>
+          <a:effectRef idx="0">
+            <a:schemeClr val="accent1"/>
+          </a:effectRef>
+          <a:fontRef idx="minor">
+            <a:schemeClr val="dk1"/>
+          </a:fontRef>
+        </p:style>
+        <p:txBody>
+          <a:bodyPr rtlCol="0" anchor="ctr"/>
+          <a:lstStyle/>
+          <a:p>
+            <a:pPr algn="ctr"/>
+            <a:r>
+              <a:rPr lang="en-US" dirty="0"/>
+              <a:t>2</a:t>
+            </a:r>
+          </a:p>
+        </p:txBody>
+      </p:sp>
+      <p:cxnSp>
+        <p:nvCxnSpPr>
+          <p:cNvPr id="7" name="Straight Connector 6">
+            <a:extLst>
+              <a:ext uri="{FF2B5EF4-FFF2-40B4-BE49-F238E27FC236}">
+                <a16:creationId xmlns:a16="http://schemas.microsoft.com/office/drawing/2014/main" id="{95DCCCA5-AE8A-8444-ACC4-675D3DECAE96}"/>
+              </a:ext>
+            </a:extLst>
+          </p:cNvPr>
+          <p:cNvCxnSpPr>
+            <a:cxnSpLocks/>
+          </p:cNvCxnSpPr>
+          <p:nvPr/>
+        </p:nvCxnSpPr>
+        <p:spPr>
+          <a:xfrm flipV="1">
+            <a:off x="4472481" y="1916318"/>
+            <a:ext cx="1449618" cy="291209"/>
+          </a:xfrm>
+          <a:prstGeom prst="line">
+            <a:avLst/>
+          </a:prstGeom>
+          <a:ln>
+            <a:prstDash val="sysDot"/>
+          </a:ln>
+        </p:spPr>
+        <p:style>
+          <a:lnRef idx="1">
+            <a:schemeClr val="accent4"/>
+          </a:lnRef>
+          <a:fillRef idx="0">
+            <a:schemeClr val="accent4"/>
+          </a:fillRef>
+          <a:effectRef idx="0">
+            <a:schemeClr val="accent4"/>
+          </a:effectRef>
+          <a:fontRef idx="minor">
+            <a:schemeClr val="tx1"/>
+          </a:fontRef>
+        </p:style>
+      </p:cxnSp>
+      <p:cxnSp>
+        <p:nvCxnSpPr>
+          <p:cNvPr id="9" name="Straight Connector 8">
+            <a:extLst>
+              <a:ext uri="{FF2B5EF4-FFF2-40B4-BE49-F238E27FC236}">
+                <a16:creationId xmlns:a16="http://schemas.microsoft.com/office/drawing/2014/main" id="{19F40CE3-9439-5C49-B99D-84D768B03184}"/>
+              </a:ext>
+            </a:extLst>
+          </p:cNvPr>
+          <p:cNvCxnSpPr>
+            <a:cxnSpLocks/>
+          </p:cNvCxnSpPr>
+          <p:nvPr/>
+        </p:nvCxnSpPr>
+        <p:spPr>
+          <a:xfrm>
+            <a:off x="3894667" y="1410011"/>
+            <a:ext cx="2624666" cy="0"/>
+          </a:xfrm>
+          <a:prstGeom prst="line">
+            <a:avLst/>
+          </a:prstGeom>
+          <a:ln>
+            <a:prstDash val="sysDot"/>
+          </a:ln>
+        </p:spPr>
+        <p:style>
+          <a:lnRef idx="1">
+            <a:schemeClr val="accent4"/>
+          </a:lnRef>
+          <a:fillRef idx="0">
+            <a:schemeClr val="accent4"/>
+          </a:fillRef>
+          <a:effectRef idx="0">
+            <a:schemeClr val="accent4"/>
+          </a:effectRef>
+          <a:fontRef idx="minor">
+            <a:schemeClr val="tx1"/>
+          </a:fontRef>
+        </p:style>
+      </p:cxnSp>
+      <p:cxnSp>
+        <p:nvCxnSpPr>
+          <p:cNvPr id="10" name="Straight Connector 9">
+            <a:extLst>
+              <a:ext uri="{FF2B5EF4-FFF2-40B4-BE49-F238E27FC236}">
+                <a16:creationId xmlns:a16="http://schemas.microsoft.com/office/drawing/2014/main" id="{69C54D5C-2B83-6447-AF10-9F2FE40F4A56}"/>
+              </a:ext>
+            </a:extLst>
+          </p:cNvPr>
+          <p:cNvCxnSpPr>
+            <a:cxnSpLocks/>
+          </p:cNvCxnSpPr>
+          <p:nvPr/>
+        </p:nvCxnSpPr>
+        <p:spPr>
+          <a:xfrm>
+            <a:off x="3369733" y="2210690"/>
+            <a:ext cx="3119967" cy="0"/>
+          </a:xfrm>
+          <a:prstGeom prst="line">
+            <a:avLst/>
+          </a:prstGeom>
+          <a:ln>
+            <a:prstDash val="sysDot"/>
+          </a:ln>
+        </p:spPr>
+        <p:style>
+          <a:lnRef idx="1">
+            <a:schemeClr val="accent4"/>
+          </a:lnRef>
+          <a:fillRef idx="0">
+            <a:schemeClr val="accent4"/>
+          </a:fillRef>
+          <a:effectRef idx="0">
+            <a:schemeClr val="accent4"/>
+          </a:effectRef>
+          <a:fontRef idx="minor">
+            <a:schemeClr val="tx1"/>
+          </a:fontRef>
+        </p:style>
+      </p:cxnSp>
+      <p:cxnSp>
+        <p:nvCxnSpPr>
+          <p:cNvPr id="11" name="Straight Connector 10">
+            <a:extLst>
+              <a:ext uri="{FF2B5EF4-FFF2-40B4-BE49-F238E27FC236}">
+                <a16:creationId xmlns:a16="http://schemas.microsoft.com/office/drawing/2014/main" id="{BB15EC97-22F3-F845-BB61-0D7DF466D702}"/>
+              </a:ext>
+            </a:extLst>
+          </p:cNvPr>
+          <p:cNvCxnSpPr>
+            <a:cxnSpLocks/>
+          </p:cNvCxnSpPr>
+          <p:nvPr/>
+        </p:nvCxnSpPr>
+        <p:spPr>
+          <a:xfrm>
+            <a:off x="5934273" y="948267"/>
+            <a:ext cx="0" cy="1269767"/>
+          </a:xfrm>
+          <a:prstGeom prst="line">
+            <a:avLst/>
+          </a:prstGeom>
+          <a:ln>
+            <a:prstDash val="sysDot"/>
+          </a:ln>
+        </p:spPr>
+        <p:style>
+          <a:lnRef idx="1">
+            <a:schemeClr val="accent4"/>
+          </a:lnRef>
+          <a:fillRef idx="0">
+            <a:schemeClr val="accent4"/>
+          </a:fillRef>
+          <a:effectRef idx="0">
+            <a:schemeClr val="accent4"/>
+          </a:effectRef>
+          <a:fontRef idx="minor">
+            <a:schemeClr val="tx1"/>
+          </a:fontRef>
+        </p:style>
+      </p:cxnSp>
+      <p:cxnSp>
+        <p:nvCxnSpPr>
+          <p:cNvPr id="12" name="Straight Connector 11">
+            <a:extLst>
+              <a:ext uri="{FF2B5EF4-FFF2-40B4-BE49-F238E27FC236}">
+                <a16:creationId xmlns:a16="http://schemas.microsoft.com/office/drawing/2014/main" id="{9897E682-6751-C143-AD1F-C456E68F1625}"/>
+              </a:ext>
+            </a:extLst>
+          </p:cNvPr>
+          <p:cNvCxnSpPr>
+            <a:cxnSpLocks/>
+          </p:cNvCxnSpPr>
+          <p:nvPr/>
+        </p:nvCxnSpPr>
+        <p:spPr>
+          <a:xfrm>
+            <a:off x="4760749" y="1410011"/>
+            <a:ext cx="1161350" cy="494726"/>
+          </a:xfrm>
+          <a:prstGeom prst="line">
+            <a:avLst/>
+          </a:prstGeom>
+          <a:ln>
+            <a:prstDash val="sysDot"/>
+          </a:ln>
+        </p:spPr>
+        <p:style>
+          <a:lnRef idx="1">
+            <a:schemeClr val="accent4"/>
+          </a:lnRef>
+          <a:fillRef idx="0">
+            <a:schemeClr val="accent4"/>
+          </a:fillRef>
+          <a:effectRef idx="0">
+            <a:schemeClr val="accent4"/>
+          </a:effectRef>
+          <a:fontRef idx="minor">
+            <a:schemeClr val="tx1"/>
+          </a:fontRef>
+        </p:style>
+      </p:cxnSp>
+      <p:cxnSp>
+        <p:nvCxnSpPr>
+          <p:cNvPr id="58" name="Straight Connector 57">
+            <a:extLst>
+              <a:ext uri="{FF2B5EF4-FFF2-40B4-BE49-F238E27FC236}">
+                <a16:creationId xmlns:a16="http://schemas.microsoft.com/office/drawing/2014/main" id="{23A588F6-4470-2349-A13D-5B0B0CC94BE1}"/>
+              </a:ext>
+            </a:extLst>
+          </p:cNvPr>
+          <p:cNvCxnSpPr>
+            <a:cxnSpLocks/>
+            <a:stCxn id="4" idx="2"/>
+          </p:cNvCxnSpPr>
+          <p:nvPr/>
+        </p:nvCxnSpPr>
+        <p:spPr>
+          <a:xfrm flipH="1" flipV="1">
+            <a:off x="3321208" y="2759872"/>
+            <a:ext cx="642516" cy="2724"/>
+          </a:xfrm>
+          <a:prstGeom prst="line">
+            <a:avLst/>
+          </a:prstGeom>
+          <a:ln>
+            <a:prstDash val="sysDot"/>
+          </a:ln>
+        </p:spPr>
+        <p:style>
+          <a:lnRef idx="1">
+            <a:schemeClr val="accent4"/>
+          </a:lnRef>
+          <a:fillRef idx="0">
+            <a:schemeClr val="accent4"/>
+          </a:fillRef>
+          <a:effectRef idx="0">
+            <a:schemeClr val="accent4"/>
+          </a:effectRef>
+          <a:fontRef idx="minor">
+            <a:schemeClr val="tx1"/>
+          </a:fontRef>
+        </p:style>
+      </p:cxnSp>
+      <p:cxnSp>
+        <p:nvCxnSpPr>
+          <p:cNvPr id="62" name="Straight Connector 61">
+            <a:extLst>
+              <a:ext uri="{FF2B5EF4-FFF2-40B4-BE49-F238E27FC236}">
+                <a16:creationId xmlns:a16="http://schemas.microsoft.com/office/drawing/2014/main" id="{F0D8B5F2-2ACA-0D46-8DC7-156C5FA9C22A}"/>
+              </a:ext>
+            </a:extLst>
+          </p:cNvPr>
+          <p:cNvCxnSpPr>
+            <a:cxnSpLocks/>
+          </p:cNvCxnSpPr>
+          <p:nvPr/>
+        </p:nvCxnSpPr>
+        <p:spPr>
+          <a:xfrm flipV="1">
+            <a:off x="3475472" y="2141924"/>
+            <a:ext cx="0" cy="645995"/>
+          </a:xfrm>
+          <a:prstGeom prst="line">
+            <a:avLst/>
+          </a:prstGeom>
+          <a:ln>
+            <a:solidFill>
+              <a:schemeClr val="tx1"/>
+            </a:solidFill>
+          </a:ln>
+        </p:spPr>
+        <p:style>
+          <a:lnRef idx="1">
+            <a:schemeClr val="accent1"/>
+          </a:lnRef>
+          <a:fillRef idx="0">
+            <a:schemeClr val="accent1"/>
+          </a:fillRef>
+          <a:effectRef idx="0">
+            <a:schemeClr val="accent1"/>
+          </a:effectRef>
+          <a:fontRef idx="minor">
+            <a:schemeClr val="tx1"/>
+          </a:fontRef>
+        </p:style>
+      </p:cxnSp>
+      <p:cxnSp>
+        <p:nvCxnSpPr>
+          <p:cNvPr id="65" name="Straight Connector 64">
+            <a:extLst>
+              <a:ext uri="{FF2B5EF4-FFF2-40B4-BE49-F238E27FC236}">
+                <a16:creationId xmlns:a16="http://schemas.microsoft.com/office/drawing/2014/main" id="{EB5A8975-9F0F-DE45-8877-01FDAA33FCC4}"/>
+              </a:ext>
+            </a:extLst>
+          </p:cNvPr>
+          <p:cNvCxnSpPr>
+            <a:cxnSpLocks/>
+          </p:cNvCxnSpPr>
+          <p:nvPr/>
+        </p:nvCxnSpPr>
+        <p:spPr>
+          <a:xfrm flipV="1">
+            <a:off x="6376237" y="1278467"/>
+            <a:ext cx="0" cy="990194"/>
+          </a:xfrm>
+          <a:prstGeom prst="line">
+            <a:avLst/>
+          </a:prstGeom>
+          <a:ln>
+            <a:solidFill>
+              <a:schemeClr val="tx1"/>
+            </a:solidFill>
+          </a:ln>
+        </p:spPr>
+        <p:style>
+          <a:lnRef idx="1">
+            <a:schemeClr val="accent1"/>
+          </a:lnRef>
+          <a:fillRef idx="0">
+            <a:schemeClr val="accent1"/>
+          </a:fillRef>
+          <a:effectRef idx="0">
+            <a:schemeClr val="accent1"/>
+          </a:effectRef>
+          <a:fontRef idx="minor">
+            <a:schemeClr val="tx1"/>
+          </a:fontRef>
+        </p:style>
+      </p:cxnSp>
+      <p:cxnSp>
+        <p:nvCxnSpPr>
+          <p:cNvPr id="69" name="Straight Connector 68">
+            <a:extLst>
+              <a:ext uri="{FF2B5EF4-FFF2-40B4-BE49-F238E27FC236}">
+                <a16:creationId xmlns:a16="http://schemas.microsoft.com/office/drawing/2014/main" id="{4B06659B-8252-C549-9EF6-AD45B12CBFFD}"/>
+              </a:ext>
+            </a:extLst>
+          </p:cNvPr>
+          <p:cNvCxnSpPr>
+            <a:cxnSpLocks/>
+          </p:cNvCxnSpPr>
+          <p:nvPr/>
+        </p:nvCxnSpPr>
+        <p:spPr>
+          <a:xfrm>
+            <a:off x="4482176" y="881969"/>
+            <a:ext cx="0" cy="1426599"/>
+          </a:xfrm>
+          <a:prstGeom prst="line">
+            <a:avLst/>
+          </a:prstGeom>
+          <a:ln>
+            <a:prstDash val="sysDot"/>
+          </a:ln>
+        </p:spPr>
+        <p:style>
+          <a:lnRef idx="1">
+            <a:schemeClr val="accent4"/>
+          </a:lnRef>
+          <a:fillRef idx="0">
+            <a:schemeClr val="accent4"/>
+          </a:fillRef>
+          <a:effectRef idx="0">
+            <a:schemeClr val="accent4"/>
+          </a:effectRef>
+          <a:fontRef idx="minor">
+            <a:schemeClr val="tx1"/>
+          </a:fontRef>
+        </p:style>
+      </p:cxnSp>
+      <p:cxnSp>
+        <p:nvCxnSpPr>
+          <p:cNvPr id="72" name="Straight Connector 71">
+            <a:extLst>
+              <a:ext uri="{FF2B5EF4-FFF2-40B4-BE49-F238E27FC236}">
+                <a16:creationId xmlns:a16="http://schemas.microsoft.com/office/drawing/2014/main" id="{A9F23B00-68C9-8544-ADE6-8CF68432E0EA}"/>
+              </a:ext>
+            </a:extLst>
+          </p:cNvPr>
+          <p:cNvCxnSpPr>
+            <a:cxnSpLocks/>
+          </p:cNvCxnSpPr>
+          <p:nvPr/>
+        </p:nvCxnSpPr>
+        <p:spPr>
+          <a:xfrm>
+            <a:off x="3894667" y="937002"/>
+            <a:ext cx="639233" cy="0"/>
+          </a:xfrm>
+          <a:prstGeom prst="line">
+            <a:avLst/>
+          </a:prstGeom>
+          <a:ln>
+            <a:solidFill>
+              <a:schemeClr val="tx1"/>
+            </a:solidFill>
+          </a:ln>
+        </p:spPr>
+        <p:style>
+          <a:lnRef idx="1">
+            <a:schemeClr val="accent1"/>
+          </a:lnRef>
+          <a:fillRef idx="0">
+            <a:schemeClr val="accent1"/>
+          </a:fillRef>
+          <a:effectRef idx="0">
+            <a:schemeClr val="accent1"/>
+          </a:effectRef>
+          <a:fontRef idx="minor">
+            <a:schemeClr val="tx1"/>
+          </a:fontRef>
+        </p:style>
+      </p:cxnSp>
+      <p:sp>
+        <p:nvSpPr>
+          <p:cNvPr id="77" name="TextBox 76">
+            <a:extLst>
+              <a:ext uri="{FF2B5EF4-FFF2-40B4-BE49-F238E27FC236}">
+                <a16:creationId xmlns:a16="http://schemas.microsoft.com/office/drawing/2014/main" id="{1CB98E0C-9D31-584A-B8B0-98FBC6D92F2C}"/>
+              </a:ext>
+            </a:extLst>
+          </p:cNvPr>
+          <p:cNvSpPr txBox="1"/>
+          <p:nvPr/>
+        </p:nvSpPr>
+        <p:spPr>
+          <a:xfrm>
+            <a:off x="4155991" y="795569"/>
+            <a:ext cx="172067" cy="138499"/>
+          </a:xfrm>
+          <a:prstGeom prst="rect">
+            <a:avLst/>
+          </a:prstGeom>
+          <a:noFill/>
+          <a:ln>
+            <a:noFill/>
+          </a:ln>
+        </p:spPr>
+        <p:txBody>
+          <a:bodyPr wrap="square" lIns="0" tIns="0" rIns="0" bIns="0" rtlCol="0">
+            <a:spAutoFit/>
+          </a:bodyPr>
+          <a:lstStyle/>
+          <a:p>
+            <a:r>
+              <a:rPr lang="en-US" sz="900" dirty="0"/>
+              <a:t>a</a:t>
+            </a:r>
+            <a:r>
+              <a:rPr lang="en-US" sz="900" baseline="-25000" dirty="0"/>
+              <a:t>1</a:t>
+            </a:r>
+          </a:p>
+        </p:txBody>
+      </p:sp>
+      <p:cxnSp>
+        <p:nvCxnSpPr>
+          <p:cNvPr id="80" name="Straight Connector 79">
+            <a:extLst>
+              <a:ext uri="{FF2B5EF4-FFF2-40B4-BE49-F238E27FC236}">
+                <a16:creationId xmlns:a16="http://schemas.microsoft.com/office/drawing/2014/main" id="{A452A629-83E0-4444-B3CC-3C4D61754E45}"/>
+              </a:ext>
+            </a:extLst>
+          </p:cNvPr>
+          <p:cNvCxnSpPr>
+            <a:cxnSpLocks/>
+          </p:cNvCxnSpPr>
+          <p:nvPr/>
+        </p:nvCxnSpPr>
+        <p:spPr>
+          <a:xfrm>
+            <a:off x="4393011" y="881969"/>
+            <a:ext cx="1598214" cy="0"/>
+          </a:xfrm>
+          <a:prstGeom prst="line">
+            <a:avLst/>
+          </a:prstGeom>
+          <a:ln>
+            <a:solidFill>
+              <a:schemeClr val="tx1"/>
+            </a:solidFill>
+          </a:ln>
+        </p:spPr>
+        <p:style>
+          <a:lnRef idx="1">
+            <a:schemeClr val="accent1"/>
+          </a:lnRef>
+          <a:fillRef idx="0">
+            <a:schemeClr val="accent1"/>
+          </a:fillRef>
+          <a:effectRef idx="0">
+            <a:schemeClr val="accent1"/>
+          </a:effectRef>
+          <a:fontRef idx="minor">
+            <a:schemeClr val="tx1"/>
+          </a:fontRef>
+        </p:style>
+      </p:cxnSp>
+      <p:sp>
+        <p:nvSpPr>
+          <p:cNvPr id="82" name="TextBox 81">
+            <a:extLst>
+              <a:ext uri="{FF2B5EF4-FFF2-40B4-BE49-F238E27FC236}">
+                <a16:creationId xmlns:a16="http://schemas.microsoft.com/office/drawing/2014/main" id="{879DB5E6-1D89-FF4E-9324-C5DA5A965784}"/>
+              </a:ext>
+            </a:extLst>
+          </p:cNvPr>
+          <p:cNvSpPr txBox="1"/>
+          <p:nvPr/>
+        </p:nvSpPr>
+        <p:spPr>
+          <a:xfrm>
+            <a:off x="5218548" y="719662"/>
+            <a:ext cx="172067" cy="138499"/>
+          </a:xfrm>
+          <a:prstGeom prst="rect">
+            <a:avLst/>
+          </a:prstGeom>
+          <a:noFill/>
+          <a:ln>
+            <a:noFill/>
+          </a:ln>
+        </p:spPr>
+        <p:txBody>
+          <a:bodyPr wrap="square" lIns="0" tIns="0" rIns="0" bIns="0" rtlCol="0">
+            <a:spAutoFit/>
+          </a:bodyPr>
+          <a:lstStyle/>
+          <a:p>
+            <a:r>
+              <a:rPr lang="en-US" sz="900" dirty="0"/>
+              <a:t>d</a:t>
+            </a:r>
+            <a:r>
+              <a:rPr lang="en-US" sz="900" baseline="-25000" dirty="0"/>
+              <a:t>4</a:t>
+            </a:r>
+          </a:p>
+        </p:txBody>
+      </p:sp>
+      <p:sp>
+        <p:nvSpPr>
+          <p:cNvPr id="92" name="TextBox 91">
+            <a:extLst>
+              <a:ext uri="{FF2B5EF4-FFF2-40B4-BE49-F238E27FC236}">
+                <a16:creationId xmlns:a16="http://schemas.microsoft.com/office/drawing/2014/main" id="{A518C755-6FA3-F94A-BD8F-EFD96C0CC7AD}"/>
+              </a:ext>
+            </a:extLst>
+          </p:cNvPr>
+          <p:cNvSpPr txBox="1"/>
+          <p:nvPr/>
+        </p:nvSpPr>
+        <p:spPr>
+          <a:xfrm>
+            <a:off x="8482550" y="1429082"/>
+            <a:ext cx="172067" cy="138499"/>
+          </a:xfrm>
+          <a:prstGeom prst="rect">
+            <a:avLst/>
+          </a:prstGeom>
+          <a:noFill/>
+          <a:ln>
+            <a:noFill/>
+          </a:ln>
+        </p:spPr>
+        <p:txBody>
+          <a:bodyPr wrap="square" lIns="0" tIns="0" rIns="0" bIns="0" rtlCol="0">
+            <a:spAutoFit/>
+          </a:bodyPr>
+          <a:lstStyle/>
+          <a:p>
+            <a:r>
+              <a:rPr lang="en-US" sz="900" dirty="0"/>
+              <a:t>a</a:t>
+            </a:r>
+            <a:r>
+              <a:rPr lang="en-US" sz="900" baseline="-25000" dirty="0"/>
+              <a:t>3</a:t>
+            </a:r>
+          </a:p>
+        </p:txBody>
+      </p:sp>
+      <p:cxnSp>
+        <p:nvCxnSpPr>
+          <p:cNvPr id="93" name="Straight Connector 92">
+            <a:extLst>
+              <a:ext uri="{FF2B5EF4-FFF2-40B4-BE49-F238E27FC236}">
+                <a16:creationId xmlns:a16="http://schemas.microsoft.com/office/drawing/2014/main" id="{5EF72578-4EF4-BB4E-A6F2-A09555ABE86F}"/>
+              </a:ext>
+            </a:extLst>
+          </p:cNvPr>
+          <p:cNvCxnSpPr>
+            <a:cxnSpLocks/>
+          </p:cNvCxnSpPr>
+          <p:nvPr/>
+        </p:nvCxnSpPr>
+        <p:spPr>
+          <a:xfrm>
+            <a:off x="8433166" y="1214432"/>
+            <a:ext cx="0" cy="539151"/>
+          </a:xfrm>
+          <a:prstGeom prst="line">
+            <a:avLst/>
+          </a:prstGeom>
+          <a:ln>
+            <a:solidFill>
+              <a:schemeClr val="tx1"/>
+            </a:solidFill>
+          </a:ln>
+        </p:spPr>
+        <p:style>
+          <a:lnRef idx="1">
+            <a:schemeClr val="accent1"/>
+          </a:lnRef>
+          <a:fillRef idx="0">
+            <a:schemeClr val="accent1"/>
+          </a:fillRef>
+          <a:effectRef idx="0">
+            <a:schemeClr val="accent1"/>
+          </a:effectRef>
+          <a:fontRef idx="minor">
+            <a:schemeClr val="tx1"/>
+          </a:fontRef>
+        </p:style>
+      </p:cxnSp>
+      <p:sp>
+        <p:nvSpPr>
+          <p:cNvPr id="101" name="Freeform 100">
+            <a:extLst>
+              <a:ext uri="{FF2B5EF4-FFF2-40B4-BE49-F238E27FC236}">
+                <a16:creationId xmlns:a16="http://schemas.microsoft.com/office/drawing/2014/main" id="{6266E420-F222-6046-861C-2383539BBEDE}"/>
+              </a:ext>
+            </a:extLst>
+          </p:cNvPr>
+          <p:cNvSpPr/>
+          <p:nvPr/>
+        </p:nvSpPr>
+        <p:spPr>
+          <a:xfrm>
+            <a:off x="7078032" y="979792"/>
+            <a:ext cx="139301" cy="213981"/>
+          </a:xfrm>
+          <a:custGeom>
+            <a:avLst/>
+            <a:gdLst>
+              <a:gd name="connsiteX0" fmla="*/ 0 w 147545"/>
+              <a:gd name="connsiteY0" fmla="*/ 0 h 212781"/>
+              <a:gd name="connsiteX1" fmla="*/ 146050 w 147545"/>
+              <a:gd name="connsiteY1" fmla="*/ 200025 h 212781"/>
+              <a:gd name="connsiteX2" fmla="*/ 79375 w 147545"/>
+              <a:gd name="connsiteY2" fmla="*/ 203200 h 212781"/>
+              <a:gd name="connsiteX0" fmla="*/ 0 w 153794"/>
+              <a:gd name="connsiteY0" fmla="*/ 0 h 203200"/>
+              <a:gd name="connsiteX1" fmla="*/ 152400 w 153794"/>
+              <a:gd name="connsiteY1" fmla="*/ 66675 h 203200"/>
+              <a:gd name="connsiteX2" fmla="*/ 79375 w 153794"/>
+              <a:gd name="connsiteY2" fmla="*/ 203200 h 203200"/>
+              <a:gd name="connsiteX0" fmla="*/ 0 w 79375"/>
+              <a:gd name="connsiteY0" fmla="*/ 0 h 203200"/>
+              <a:gd name="connsiteX1" fmla="*/ 79375 w 79375"/>
+              <a:gd name="connsiteY1" fmla="*/ 203200 h 203200"/>
+              <a:gd name="connsiteX0" fmla="*/ 0 w 142919"/>
+              <a:gd name="connsiteY0" fmla="*/ 0 h 203200"/>
+              <a:gd name="connsiteX1" fmla="*/ 79375 w 142919"/>
+              <a:gd name="connsiteY1" fmla="*/ 203200 h 203200"/>
+              <a:gd name="connsiteX0" fmla="*/ 0 w 186211"/>
+              <a:gd name="connsiteY0" fmla="*/ 0 h 203200"/>
+              <a:gd name="connsiteX1" fmla="*/ 79375 w 186211"/>
+              <a:gd name="connsiteY1" fmla="*/ 203200 h 203200"/>
+              <a:gd name="connsiteX0" fmla="*/ 0 w 125812"/>
+              <a:gd name="connsiteY0" fmla="*/ 0 h 203200"/>
+              <a:gd name="connsiteX1" fmla="*/ 79375 w 125812"/>
+              <a:gd name="connsiteY1" fmla="*/ 203200 h 203200"/>
+              <a:gd name="connsiteX0" fmla="*/ 0 w 122234"/>
+              <a:gd name="connsiteY0" fmla="*/ 1233 h 204433"/>
+              <a:gd name="connsiteX1" fmla="*/ 79375 w 122234"/>
+              <a:gd name="connsiteY1" fmla="*/ 204433 h 204433"/>
+              <a:gd name="connsiteX0" fmla="*/ 0 w 148382"/>
+              <a:gd name="connsiteY0" fmla="*/ 1233 h 204433"/>
+              <a:gd name="connsiteX1" fmla="*/ 111125 w 148382"/>
+              <a:gd name="connsiteY1" fmla="*/ 204433 h 204433"/>
+              <a:gd name="connsiteX0" fmla="*/ 0 w 354546"/>
+              <a:gd name="connsiteY0" fmla="*/ 772 h 284406"/>
+              <a:gd name="connsiteX1" fmla="*/ 335492 w 354546"/>
+              <a:gd name="connsiteY1" fmla="*/ 284406 h 284406"/>
+              <a:gd name="connsiteX0" fmla="*/ 0 w 335731"/>
+              <a:gd name="connsiteY0" fmla="*/ 1961 h 285595"/>
+              <a:gd name="connsiteX1" fmla="*/ 335492 w 335731"/>
+              <a:gd name="connsiteY1" fmla="*/ 285595 h 285595"/>
+              <a:gd name="connsiteX0" fmla="*/ 0 w 336219"/>
+              <a:gd name="connsiteY0" fmla="*/ 60 h 283694"/>
+              <a:gd name="connsiteX1" fmla="*/ 335492 w 336219"/>
+              <a:gd name="connsiteY1" fmla="*/ 283694 h 283694"/>
+              <a:gd name="connsiteX0" fmla="*/ 0 w 335839"/>
+              <a:gd name="connsiteY0" fmla="*/ 0 h 283634"/>
+              <a:gd name="connsiteX1" fmla="*/ 335492 w 335839"/>
+              <a:gd name="connsiteY1" fmla="*/ 283634 h 283634"/>
+              <a:gd name="connsiteX0" fmla="*/ 0 w 335492"/>
+              <a:gd name="connsiteY0" fmla="*/ 0 h 283634"/>
+              <a:gd name="connsiteX1" fmla="*/ 335492 w 335492"/>
+              <a:gd name="connsiteY1" fmla="*/ 283634 h 283634"/>
+              <a:gd name="connsiteX0" fmla="*/ 0 w 128059"/>
+              <a:gd name="connsiteY0" fmla="*/ 0 h 503767"/>
+              <a:gd name="connsiteX1" fmla="*/ 128059 w 128059"/>
+              <a:gd name="connsiteY1" fmla="*/ 503767 h 503767"/>
+              <a:gd name="connsiteX0" fmla="*/ 67435 w 120865"/>
+              <a:gd name="connsiteY0" fmla="*/ 0 h 211667"/>
+              <a:gd name="connsiteX1" fmla="*/ 761 w 120865"/>
+              <a:gd name="connsiteY1" fmla="*/ 211667 h 211667"/>
+              <a:gd name="connsiteX0" fmla="*/ 66674 w 140917"/>
+              <a:gd name="connsiteY0" fmla="*/ 0 h 211667"/>
+              <a:gd name="connsiteX1" fmla="*/ 0 w 140917"/>
+              <a:gd name="connsiteY1" fmla="*/ 211667 h 211667"/>
+              <a:gd name="connsiteX0" fmla="*/ 66674 w 129636"/>
+              <a:gd name="connsiteY0" fmla="*/ 0 h 211667"/>
+              <a:gd name="connsiteX1" fmla="*/ 0 w 129636"/>
+              <a:gd name="connsiteY1" fmla="*/ 211667 h 211667"/>
+              <a:gd name="connsiteX0" fmla="*/ 66674 w 139301"/>
+              <a:gd name="connsiteY0" fmla="*/ 0 h 213981"/>
+              <a:gd name="connsiteX1" fmla="*/ 0 w 139301"/>
+              <a:gd name="connsiteY1" fmla="*/ 211667 h 213981"/>
+            </a:gdLst>
+            <a:ahLst/>
+            <a:cxnLst>
+              <a:cxn ang="0">
+                <a:pos x="connsiteX0" y="connsiteY0"/>
+              </a:cxn>
+              <a:cxn ang="0">
+                <a:pos x="connsiteX1" y="connsiteY1"/>
+              </a:cxn>
+            </a:cxnLst>
+            <a:rect l="l" t="t" r="r" b="b"/>
+            <a:pathLst>
+              <a:path w="139301" h="213981">
+                <a:moveTo>
+                  <a:pt x="66674" y="0"/>
+                </a:moveTo>
+                <a:cubicBezTo>
+                  <a:pt x="197908" y="91016"/>
+                  <a:pt x="136525" y="233892"/>
+                  <a:pt x="0" y="211667"/>
+                </a:cubicBezTo>
+              </a:path>
+            </a:pathLst>
+          </a:custGeom>
+          <a:noFill/>
+          <a:ln>
+            <a:solidFill>
+              <a:schemeClr val="tx1"/>
+            </a:solidFill>
+            <a:headEnd type="triangle" w="med" len="med"/>
+            <a:tailEnd type="none" w="med" len="med"/>
+          </a:ln>
+        </p:spPr>
+        <p:style>
+          <a:lnRef idx="2">
+            <a:schemeClr val="accent1">
+              <a:shade val="50000"/>
+            </a:schemeClr>
+          </a:lnRef>
+          <a:fillRef idx="1">
+            <a:schemeClr val="accent1"/>
+          </a:fillRef>
+          <a:effectRef idx="0">
+            <a:schemeClr val="accent1"/>
+          </a:effectRef>
+          <a:fontRef idx="minor">
+            <a:schemeClr val="lt1"/>
+          </a:fontRef>
+        </p:style>
+        <p:txBody>
+          <a:bodyPr rtlCol="0" anchor="ctr"/>
+          <a:lstStyle/>
+          <a:p>
+            <a:pPr algn="ctr"/>
+            <a:endParaRPr lang="en-US"/>
+          </a:p>
+        </p:txBody>
+      </p:sp>
+      <p:sp>
+        <p:nvSpPr>
+          <p:cNvPr id="102" name="TextBox 101">
+            <a:extLst>
+              <a:ext uri="{FF2B5EF4-FFF2-40B4-BE49-F238E27FC236}">
+                <a16:creationId xmlns:a16="http://schemas.microsoft.com/office/drawing/2014/main" id="{97DDF2A7-6AAE-964E-82C7-F144F3C33C12}"/>
+              </a:ext>
+            </a:extLst>
+          </p:cNvPr>
+          <p:cNvSpPr txBox="1"/>
+          <p:nvPr/>
+        </p:nvSpPr>
+        <p:spPr>
+          <a:xfrm>
+            <a:off x="7283956" y="1017532"/>
+            <a:ext cx="154845" cy="138499"/>
+          </a:xfrm>
+          <a:prstGeom prst="rect">
+            <a:avLst/>
+          </a:prstGeom>
+          <a:noFill/>
+          <a:ln>
+            <a:noFill/>
+          </a:ln>
+        </p:spPr>
+        <p:txBody>
+          <a:bodyPr wrap="square" lIns="0" tIns="0" rIns="0" bIns="0" rtlCol="0">
+            <a:spAutoFit/>
+          </a:bodyPr>
+          <a:lstStyle/>
+          <a:p>
+            <a:r>
+              <a:rPr lang="en-US" sz="900" dirty="0"/>
+              <a:t>θ</a:t>
+            </a:r>
+            <a:r>
+              <a:rPr lang="en-US" sz="900" baseline="-25000" dirty="0"/>
+              <a:t>3</a:t>
+            </a:r>
+          </a:p>
+        </p:txBody>
+      </p:sp>
+      <p:cxnSp>
+        <p:nvCxnSpPr>
+          <p:cNvPr id="107" name="Straight Connector 106">
+            <a:extLst>
+              <a:ext uri="{FF2B5EF4-FFF2-40B4-BE49-F238E27FC236}">
+                <a16:creationId xmlns:a16="http://schemas.microsoft.com/office/drawing/2014/main" id="{2781CF86-0842-7F44-BDBC-859B3E4F66ED}"/>
+              </a:ext>
+            </a:extLst>
+          </p:cNvPr>
+          <p:cNvCxnSpPr>
+            <a:cxnSpLocks/>
+          </p:cNvCxnSpPr>
+          <p:nvPr/>
+        </p:nvCxnSpPr>
+        <p:spPr>
+          <a:xfrm flipV="1">
+            <a:off x="5211775" y="1554884"/>
+            <a:ext cx="150660" cy="250106"/>
+          </a:xfrm>
+          <a:prstGeom prst="line">
+            <a:avLst/>
+          </a:prstGeom>
+          <a:ln>
+            <a:prstDash val="sysDot"/>
+          </a:ln>
+        </p:spPr>
+        <p:style>
+          <a:lnRef idx="1">
+            <a:schemeClr val="accent4"/>
+          </a:lnRef>
+          <a:fillRef idx="0">
+            <a:schemeClr val="accent4"/>
+          </a:fillRef>
+          <a:effectRef idx="0">
+            <a:schemeClr val="accent4"/>
+          </a:effectRef>
+          <a:fontRef idx="minor">
+            <a:schemeClr val="tx1"/>
+          </a:fontRef>
+        </p:style>
+      </p:cxnSp>
+      <p:cxnSp>
+        <p:nvCxnSpPr>
+          <p:cNvPr id="115" name="Straight Connector 114">
+            <a:extLst>
+              <a:ext uri="{FF2B5EF4-FFF2-40B4-BE49-F238E27FC236}">
+                <a16:creationId xmlns:a16="http://schemas.microsoft.com/office/drawing/2014/main" id="{7502F26B-A5CE-F340-BAFE-B5CD98DE3968}"/>
+              </a:ext>
+            </a:extLst>
+          </p:cNvPr>
+          <p:cNvCxnSpPr>
+            <a:cxnSpLocks/>
+          </p:cNvCxnSpPr>
+          <p:nvPr/>
+        </p:nvCxnSpPr>
+        <p:spPr>
+          <a:xfrm>
+            <a:off x="4393011" y="1114802"/>
+            <a:ext cx="898418" cy="0"/>
+          </a:xfrm>
+          <a:prstGeom prst="line">
+            <a:avLst/>
+          </a:prstGeom>
+          <a:ln>
+            <a:solidFill>
+              <a:schemeClr val="tx1"/>
+            </a:solidFill>
+          </a:ln>
+        </p:spPr>
+        <p:style>
+          <a:lnRef idx="1">
+            <a:schemeClr val="accent1"/>
+          </a:lnRef>
+          <a:fillRef idx="0">
+            <a:schemeClr val="accent1"/>
+          </a:fillRef>
+          <a:effectRef idx="0">
+            <a:schemeClr val="accent1"/>
+          </a:effectRef>
+          <a:fontRef idx="minor">
+            <a:schemeClr val="tx1"/>
+          </a:fontRef>
+        </p:style>
+      </p:cxnSp>
+      <p:sp>
+        <p:nvSpPr>
+          <p:cNvPr id="117" name="TextBox 116">
+            <a:extLst>
+              <a:ext uri="{FF2B5EF4-FFF2-40B4-BE49-F238E27FC236}">
+                <a16:creationId xmlns:a16="http://schemas.microsoft.com/office/drawing/2014/main" id="{A66F783A-4053-5B4D-9DE3-9EC8CF08FF1F}"/>
+              </a:ext>
+            </a:extLst>
+          </p:cNvPr>
+          <p:cNvSpPr txBox="1"/>
+          <p:nvPr/>
+        </p:nvSpPr>
+        <p:spPr>
+          <a:xfrm>
+            <a:off x="4953536" y="1607918"/>
+            <a:ext cx="172067" cy="138499"/>
+          </a:xfrm>
+          <a:prstGeom prst="rect">
+            <a:avLst/>
+          </a:prstGeom>
+          <a:noFill/>
+          <a:ln>
+            <a:noFill/>
+          </a:ln>
+        </p:spPr>
+        <p:txBody>
+          <a:bodyPr wrap="square" lIns="0" tIns="0" rIns="0" bIns="0" rtlCol="0">
+            <a:spAutoFit/>
+          </a:bodyPr>
+          <a:lstStyle/>
+          <a:p>
+            <a:r>
+              <a:rPr lang="en-US" sz="900" dirty="0"/>
+              <a:t>L</a:t>
+            </a:r>
+            <a:r>
+              <a:rPr lang="en-US" sz="900" baseline="-25000" dirty="0"/>
+              <a:t>34</a:t>
+            </a:r>
+          </a:p>
+        </p:txBody>
+      </p:sp>
+      <p:sp>
+        <p:nvSpPr>
+          <p:cNvPr id="118" name="TextBox 117">
+            <a:extLst>
+              <a:ext uri="{FF2B5EF4-FFF2-40B4-BE49-F238E27FC236}">
+                <a16:creationId xmlns:a16="http://schemas.microsoft.com/office/drawing/2014/main" id="{77142181-CF9C-5A4A-B055-E03D7C91F5E7}"/>
+              </a:ext>
+            </a:extLst>
+          </p:cNvPr>
+          <p:cNvSpPr txBox="1"/>
+          <p:nvPr/>
+        </p:nvSpPr>
+        <p:spPr>
+          <a:xfrm>
+            <a:off x="4739211" y="976303"/>
+            <a:ext cx="284058" cy="138499"/>
+          </a:xfrm>
+          <a:prstGeom prst="rect">
+            <a:avLst/>
+          </a:prstGeom>
+          <a:noFill/>
+          <a:ln>
+            <a:noFill/>
+          </a:ln>
+        </p:spPr>
+        <p:txBody>
+          <a:bodyPr wrap="square" lIns="0" tIns="0" rIns="0" bIns="0" rtlCol="0">
+            <a:spAutoFit/>
+          </a:bodyPr>
+          <a:lstStyle/>
+          <a:p>
+            <a:r>
+              <a:rPr lang="en-US" sz="900" dirty="0"/>
+              <a:t>LX</a:t>
+            </a:r>
+            <a:r>
+              <a:rPr lang="en-US" sz="900" baseline="-25000" dirty="0"/>
+              <a:t>34</a:t>
+            </a:r>
+          </a:p>
+        </p:txBody>
+      </p:sp>
+      <mc:AlternateContent xmlns:mc="http://schemas.openxmlformats.org/markup-compatibility/2006" xmlns:a14="http://schemas.microsoft.com/office/drawing/2010/main">
+        <mc:Choice Requires="a14">
+          <p:sp>
+            <p:nvSpPr>
+              <p:cNvPr id="120" name="TextBox 119">
+                <a:extLst>
+                  <a:ext uri="{FF2B5EF4-FFF2-40B4-BE49-F238E27FC236}">
+                    <a16:creationId xmlns:a16="http://schemas.microsoft.com/office/drawing/2014/main" id="{34351D28-9807-A94B-9227-A22A3FE84567}"/>
+                  </a:ext>
+                </a:extLst>
+              </p:cNvPr>
+              <p:cNvSpPr txBox="1"/>
+              <p:nvPr/>
+            </p:nvSpPr>
+            <p:spPr>
+              <a:xfrm>
+                <a:off x="6204170" y="224366"/>
+                <a:ext cx="1809526" cy="405496"/>
+              </a:xfrm>
+              <a:prstGeom prst="rect">
+                <a:avLst/>
+              </a:prstGeom>
+              <a:noFill/>
+            </p:spPr>
+            <p:txBody>
+              <a:bodyPr wrap="square" rtlCol="0">
+                <a:spAutoFit/>
+              </a:bodyPr>
+              <a:lstStyle/>
+              <a:p>
+                <a:pPr/>
+                <a14:m>
+                  <m:oMathPara xmlns:m="http://schemas.openxmlformats.org/officeDocument/2006/math">
+                    <m:oMathParaPr>
+                      <m:jc m:val="centerGroup"/>
+                    </m:oMathParaPr>
+                    <m:oMath xmlns:m="http://schemas.openxmlformats.org/officeDocument/2006/math">
+                      <m:sSub>
+                        <m:sSubPr>
+                          <m:ctrlPr>
+                            <a:rPr lang="pt" sz="1000" i="1" smtClean="0">
+                              <a:latin typeface="Cambria Math" panose="02040503050406030204" pitchFamily="18" charset="0"/>
+                            </a:rPr>
+                          </m:ctrlPr>
+                        </m:sSubPr>
+                        <m:e>
+                          <m:r>
+                            <a:rPr lang="en-GB" sz="1000" b="0" i="1" smtClean="0">
+                              <a:latin typeface="Cambria Math" panose="02040503050406030204" pitchFamily="18" charset="0"/>
+                            </a:rPr>
+                            <m:t>𝐿𝑋</m:t>
+                          </m:r>
+                        </m:e>
+                        <m:sub>
+                          <m:r>
+                            <a:rPr lang="en-GB" sz="1000" b="0" i="1" smtClean="0">
+                              <a:latin typeface="Cambria Math" panose="02040503050406030204" pitchFamily="18" charset="0"/>
+                            </a:rPr>
+                            <m:t>34</m:t>
+                          </m:r>
+                        </m:sub>
+                      </m:sSub>
+                      <m:r>
+                        <a:rPr lang="pt" sz="1000" i="1" smtClean="0">
+                          <a:latin typeface="Cambria Math" panose="02040503050406030204" pitchFamily="18" charset="0"/>
+                        </a:rPr>
+                        <m:t>=</m:t>
+                      </m:r>
+                      <m:rad>
+                        <m:radPr>
+                          <m:degHide m:val="on"/>
+                          <m:ctrlPr>
+                            <a:rPr lang="pt" sz="1000" i="1" smtClean="0">
+                              <a:latin typeface="Cambria Math" panose="02040503050406030204" pitchFamily="18" charset="0"/>
+                            </a:rPr>
+                          </m:ctrlPr>
+                        </m:radPr>
+                        <m:deg/>
+                        <m:e>
+                          <m:sSubSup>
+                            <m:sSubSupPr>
+                              <m:ctrlPr>
+                                <a:rPr lang="pt" sz="1000" i="1" smtClean="0">
+                                  <a:latin typeface="Cambria Math" panose="02040503050406030204" pitchFamily="18" charset="0"/>
+                                </a:rPr>
+                              </m:ctrlPr>
+                            </m:sSubSupPr>
+                            <m:e>
+                              <m:r>
+                                <a:rPr lang="en-GB" sz="1000" b="0" i="1" smtClean="0">
+                                  <a:latin typeface="Cambria Math" panose="02040503050406030204" pitchFamily="18" charset="0"/>
+                                </a:rPr>
+                                <m:t>𝐿</m:t>
+                              </m:r>
+                            </m:e>
+                            <m:sub>
+                              <m:r>
+                                <a:rPr lang="en-GB" sz="1000" b="0" i="1" smtClean="0">
+                                  <a:latin typeface="Cambria Math" panose="02040503050406030204" pitchFamily="18" charset="0"/>
+                                </a:rPr>
+                                <m:t>3</m:t>
+                              </m:r>
+                            </m:sub>
+                            <m:sup>
+                              <m:r>
+                                <a:rPr lang="en-GB" sz="1000" b="0" i="1" smtClean="0">
+                                  <a:latin typeface="Cambria Math" panose="02040503050406030204" pitchFamily="18" charset="0"/>
+                                </a:rPr>
+                                <m:t>2</m:t>
+                              </m:r>
+                            </m:sup>
+                          </m:sSubSup>
+                          <m:r>
+                            <a:rPr lang="en-GB" sz="1000" b="0" i="1" smtClean="0">
+                              <a:latin typeface="Cambria Math" panose="02040503050406030204" pitchFamily="18" charset="0"/>
+                            </a:rPr>
+                            <m:t>−</m:t>
+                          </m:r>
+                          <m:sSubSup>
+                            <m:sSubSupPr>
+                              <m:ctrlPr>
+                                <a:rPr lang="en-GB" sz="1000" b="0" i="1" smtClean="0">
+                                  <a:latin typeface="Cambria Math" panose="02040503050406030204" pitchFamily="18" charset="0"/>
+                                </a:rPr>
+                              </m:ctrlPr>
+                            </m:sSubSupPr>
+                            <m:e>
+                              <m:r>
+                                <a:rPr lang="en-GB" sz="1000" b="0" i="1" smtClean="0">
+                                  <a:latin typeface="Cambria Math" panose="02040503050406030204" pitchFamily="18" charset="0"/>
+                                </a:rPr>
+                                <m:t>𝑎</m:t>
+                              </m:r>
+                            </m:e>
+                            <m:sub>
+                              <m:r>
+                                <a:rPr lang="en-GB" sz="1000" b="0" i="1" smtClean="0">
+                                  <a:latin typeface="Cambria Math" panose="02040503050406030204" pitchFamily="18" charset="0"/>
+                                </a:rPr>
+                                <m:t>3</m:t>
+                              </m:r>
+                            </m:sub>
+                            <m:sup>
+                              <m:r>
+                                <a:rPr lang="en-GB" sz="1000" b="0" i="1" smtClean="0">
+                                  <a:latin typeface="Cambria Math" panose="02040503050406030204" pitchFamily="18" charset="0"/>
+                                </a:rPr>
+                                <m:t>2</m:t>
+                              </m:r>
+                            </m:sup>
+                          </m:sSubSup>
+                        </m:e>
+                      </m:rad>
+                    </m:oMath>
+                  </m:oMathPara>
+                </a14:m>
+                <a:endParaRPr lang="en-US" sz="1000" dirty="0"/>
+              </a:p>
+            </p:txBody>
+          </p:sp>
+        </mc:Choice>
+        <mc:Fallback xmlns="">
+          <p:sp>
+            <p:nvSpPr>
+              <p:cNvPr id="120" name="TextBox 119">
+                <a:extLst>
+                  <a:ext uri="{FF2B5EF4-FFF2-40B4-BE49-F238E27FC236}">
+                    <a16:creationId xmlns:a16="http://schemas.microsoft.com/office/drawing/2014/main" id="{34351D28-9807-A94B-9227-A22A3FE84567}"/>
+                  </a:ext>
+                </a:extLst>
+              </p:cNvPr>
+              <p:cNvSpPr txBox="1">
+                <a:spLocks noRot="1" noChangeAspect="1" noMove="1" noResize="1" noEditPoints="1" noAdjustHandles="1" noChangeArrowheads="1" noChangeShapeType="1" noTextEdit="1"/>
+              </p:cNvSpPr>
+              <p:nvPr/>
+            </p:nvSpPr>
+            <p:spPr>
+              <a:xfrm>
+                <a:off x="6204170" y="224366"/>
+                <a:ext cx="1809526" cy="405496"/>
+              </a:xfrm>
+              <a:prstGeom prst="rect">
+                <a:avLst/>
+              </a:prstGeom>
+              <a:blipFill>
+                <a:blip r:embed="rId2"/>
+                <a:stretch>
+                  <a:fillRect/>
+                </a:stretch>
+              </a:blipFill>
+            </p:spPr>
+            <p:txBody>
+              <a:bodyPr/>
+              <a:lstStyle/>
+              <a:p>
+                <a:r>
+                  <a:rPr lang="en-US">
+                    <a:noFill/>
+                  </a:rPr>
+                  <a:t> </a:t>
+                </a:r>
+              </a:p>
+            </p:txBody>
+          </p:sp>
+        </mc:Fallback>
+      </mc:AlternateContent>
+      <p:sp>
+        <p:nvSpPr>
+          <p:cNvPr id="47" name="Rectangle 46">
+            <a:extLst>
+              <a:ext uri="{FF2B5EF4-FFF2-40B4-BE49-F238E27FC236}">
+                <a16:creationId xmlns:a16="http://schemas.microsoft.com/office/drawing/2014/main" id="{11AE80C8-C136-440B-A448-F4FA1C272C74}"/>
+              </a:ext>
+            </a:extLst>
+          </p:cNvPr>
+          <p:cNvSpPr/>
+          <p:nvPr/>
+        </p:nvSpPr>
+        <p:spPr>
+          <a:xfrm>
+            <a:off x="5081087" y="1714019"/>
+            <a:ext cx="309350" cy="186402"/>
+          </a:xfrm>
+          <a:prstGeom prst="rect">
+            <a:avLst/>
+          </a:prstGeom>
+          <a:ln>
+            <a:solidFill>
+              <a:schemeClr val="tx1"/>
+            </a:solidFill>
+          </a:ln>
+        </p:spPr>
+        <p:style>
+          <a:lnRef idx="2">
+            <a:schemeClr val="accent1"/>
+          </a:lnRef>
+          <a:fillRef idx="1">
+            <a:schemeClr val="lt1"/>
+          </a:fillRef>
+          <a:effectRef idx="0">
+            <a:schemeClr val="accent1"/>
+          </a:effectRef>
+          <a:fontRef idx="minor">
+            <a:schemeClr val="dk1"/>
+          </a:fontRef>
+        </p:style>
+        <p:txBody>
+          <a:bodyPr rtlCol="0" anchor="ctr"/>
+          <a:lstStyle/>
+          <a:p>
+            <a:pPr algn="ctr"/>
+            <a:r>
+              <a:rPr lang="en-US" dirty="0"/>
+              <a:t>4</a:t>
+            </a:r>
+          </a:p>
+        </p:txBody>
+      </p:sp>
+      <p:sp>
+        <p:nvSpPr>
+          <p:cNvPr id="51" name="TextBox 50">
+            <a:extLst>
+              <a:ext uri="{FF2B5EF4-FFF2-40B4-BE49-F238E27FC236}">
+                <a16:creationId xmlns:a16="http://schemas.microsoft.com/office/drawing/2014/main" id="{8422374B-9F06-466B-A685-AC6681BE05FC}"/>
+              </a:ext>
+            </a:extLst>
+          </p:cNvPr>
+          <p:cNvSpPr txBox="1"/>
+          <p:nvPr/>
+        </p:nvSpPr>
+        <p:spPr>
+          <a:xfrm>
+            <a:off x="5371745" y="2179022"/>
+            <a:ext cx="341915" cy="138499"/>
+          </a:xfrm>
+          <a:prstGeom prst="rect">
+            <a:avLst/>
+          </a:prstGeom>
+          <a:noFill/>
+          <a:ln>
+            <a:noFill/>
+          </a:ln>
+        </p:spPr>
+        <p:txBody>
+          <a:bodyPr wrap="square" lIns="0" tIns="0" rIns="0" bIns="0" rtlCol="0">
+            <a:spAutoFit/>
+          </a:bodyPr>
+          <a:lstStyle/>
+          <a:p>
+            <a:r>
+              <a:rPr lang="en-US" sz="900" dirty="0" err="1"/>
+              <a:t>WC</a:t>
+            </a:r>
+            <a:r>
+              <a:rPr lang="en-US" sz="900" baseline="-25000" dirty="0" err="1"/>
+              <a:t>x</a:t>
+            </a:r>
+            <a:endParaRPr lang="en-US" sz="900" baseline="-25000" dirty="0"/>
+          </a:p>
+        </p:txBody>
+      </p:sp>
+      <p:sp>
+        <p:nvSpPr>
+          <p:cNvPr id="54" name="TextBox 53">
+            <a:extLst>
+              <a:ext uri="{FF2B5EF4-FFF2-40B4-BE49-F238E27FC236}">
+                <a16:creationId xmlns:a16="http://schemas.microsoft.com/office/drawing/2014/main" id="{7BE43A39-62AF-4B3E-BAB6-DD0C2BC0A635}"/>
+              </a:ext>
+            </a:extLst>
+          </p:cNvPr>
+          <p:cNvSpPr txBox="1"/>
+          <p:nvPr/>
+        </p:nvSpPr>
+        <p:spPr>
+          <a:xfrm>
+            <a:off x="4560032" y="1561447"/>
+            <a:ext cx="104775" cy="138499"/>
+          </a:xfrm>
+          <a:prstGeom prst="rect">
+            <a:avLst/>
+          </a:prstGeom>
+          <a:noFill/>
+          <a:ln>
+            <a:noFill/>
+          </a:ln>
+        </p:spPr>
+        <p:txBody>
+          <a:bodyPr wrap="square" lIns="0" tIns="0" rIns="0" bIns="0" rtlCol="0">
+            <a:spAutoFit/>
+          </a:bodyPr>
+          <a:lstStyle/>
+          <a:p>
+            <a:r>
+              <a:rPr lang="en-US" sz="900" dirty="0"/>
+              <a:t>a</a:t>
+            </a:r>
+            <a:r>
+              <a:rPr lang="en-US" sz="900" baseline="-25000" dirty="0"/>
+              <a:t>2</a:t>
+            </a:r>
+          </a:p>
+        </p:txBody>
+      </p:sp>
+      <p:sp>
+        <p:nvSpPr>
+          <p:cNvPr id="56" name="TextBox 55">
+            <a:extLst>
+              <a:ext uri="{FF2B5EF4-FFF2-40B4-BE49-F238E27FC236}">
+                <a16:creationId xmlns:a16="http://schemas.microsoft.com/office/drawing/2014/main" id="{18B7CB37-393C-4319-B5B9-87EB45A4D1B6}"/>
+              </a:ext>
+            </a:extLst>
+          </p:cNvPr>
+          <p:cNvSpPr txBox="1"/>
+          <p:nvPr/>
+        </p:nvSpPr>
+        <p:spPr>
+          <a:xfrm>
+            <a:off x="5545882" y="1245375"/>
+            <a:ext cx="104775" cy="138499"/>
+          </a:xfrm>
+          <a:prstGeom prst="rect">
+            <a:avLst/>
+          </a:prstGeom>
+          <a:noFill/>
+          <a:ln>
+            <a:noFill/>
+          </a:ln>
+        </p:spPr>
+        <p:txBody>
+          <a:bodyPr wrap="square" lIns="0" tIns="0" rIns="0" bIns="0" rtlCol="0">
+            <a:spAutoFit/>
+          </a:bodyPr>
+          <a:lstStyle/>
+          <a:p>
+            <a:r>
+              <a:rPr lang="en-US" sz="900" dirty="0"/>
+              <a:t>F</a:t>
+            </a:r>
+            <a:endParaRPr lang="en-US" sz="900" baseline="-25000" dirty="0"/>
+          </a:p>
+        </p:txBody>
+      </p:sp>
+      <p:sp>
+        <p:nvSpPr>
+          <p:cNvPr id="57" name="TextBox 56">
+            <a:extLst>
+              <a:ext uri="{FF2B5EF4-FFF2-40B4-BE49-F238E27FC236}">
+                <a16:creationId xmlns:a16="http://schemas.microsoft.com/office/drawing/2014/main" id="{56A95049-E818-4012-82A6-50317D924199}"/>
+              </a:ext>
+            </a:extLst>
+          </p:cNvPr>
+          <p:cNvSpPr txBox="1"/>
+          <p:nvPr/>
+        </p:nvSpPr>
+        <p:spPr>
+          <a:xfrm>
+            <a:off x="5953018" y="2024883"/>
+            <a:ext cx="341915" cy="138499"/>
+          </a:xfrm>
+          <a:prstGeom prst="rect">
+            <a:avLst/>
+          </a:prstGeom>
+          <a:noFill/>
+          <a:ln>
+            <a:noFill/>
+          </a:ln>
+        </p:spPr>
+        <p:txBody>
+          <a:bodyPr wrap="square" lIns="0" tIns="0" rIns="0" bIns="0" rtlCol="0">
+            <a:spAutoFit/>
+          </a:bodyPr>
+          <a:lstStyle/>
+          <a:p>
+            <a:r>
+              <a:rPr lang="en-US" sz="900" dirty="0" err="1"/>
+              <a:t>WC</a:t>
+            </a:r>
+            <a:r>
+              <a:rPr lang="en-US" sz="900" baseline="-25000" dirty="0" err="1"/>
+              <a:t>y</a:t>
+            </a:r>
+            <a:endParaRPr lang="en-US" sz="900" baseline="-25000" dirty="0"/>
+          </a:p>
+        </p:txBody>
+      </p:sp>
+      <p:sp>
+        <p:nvSpPr>
+          <p:cNvPr id="59" name="TextBox 58">
+            <a:extLst>
+              <a:ext uri="{FF2B5EF4-FFF2-40B4-BE49-F238E27FC236}">
+                <a16:creationId xmlns:a16="http://schemas.microsoft.com/office/drawing/2014/main" id="{D7D9A7EC-FAD4-4666-93EF-480174118421}"/>
+              </a:ext>
+            </a:extLst>
+          </p:cNvPr>
+          <p:cNvSpPr txBox="1"/>
+          <p:nvPr/>
+        </p:nvSpPr>
+        <p:spPr>
+          <a:xfrm>
+            <a:off x="5099749" y="1427226"/>
+            <a:ext cx="227875" cy="138499"/>
+          </a:xfrm>
+          <a:prstGeom prst="rect">
+            <a:avLst/>
+          </a:prstGeom>
+          <a:noFill/>
+          <a:ln>
+            <a:noFill/>
+          </a:ln>
+        </p:spPr>
+        <p:txBody>
+          <a:bodyPr wrap="square" lIns="0" tIns="0" rIns="0" bIns="0" rtlCol="0">
+            <a:spAutoFit/>
+          </a:bodyPr>
+          <a:lstStyle/>
+          <a:p>
+            <a:r>
+              <a:rPr lang="en-US" sz="900" dirty="0"/>
+              <a:t>0.96</a:t>
+            </a:r>
+          </a:p>
+        </p:txBody>
+      </p:sp>
+      <p:sp>
+        <p:nvSpPr>
+          <p:cNvPr id="60" name="TextBox 59">
+            <a:extLst>
+              <a:ext uri="{FF2B5EF4-FFF2-40B4-BE49-F238E27FC236}">
+                <a16:creationId xmlns:a16="http://schemas.microsoft.com/office/drawing/2014/main" id="{F49EDAD9-03A0-40E8-B00F-1CC0C8DC9EA3}"/>
+              </a:ext>
+            </a:extLst>
+          </p:cNvPr>
+          <p:cNvSpPr txBox="1"/>
+          <p:nvPr/>
+        </p:nvSpPr>
+        <p:spPr>
+          <a:xfrm>
+            <a:off x="5448926" y="1463969"/>
+            <a:ext cx="558461" cy="138499"/>
+          </a:xfrm>
+          <a:prstGeom prst="rect">
+            <a:avLst/>
+          </a:prstGeom>
+          <a:noFill/>
+          <a:ln>
+            <a:noFill/>
+          </a:ln>
+        </p:spPr>
+        <p:txBody>
+          <a:bodyPr wrap="square" lIns="0" tIns="0" rIns="0" bIns="0" rtlCol="0">
+            <a:spAutoFit/>
+          </a:bodyPr>
+          <a:lstStyle/>
+          <a:p>
+            <a:r>
+              <a:rPr lang="en-US" sz="900" dirty="0"/>
+              <a:t>A</a:t>
+            </a:r>
+            <a:r>
+              <a:rPr lang="en-US" sz="900" baseline="-25000" dirty="0"/>
+              <a:t>3 </a:t>
+            </a:r>
+            <a:r>
+              <a:rPr lang="en-US" sz="900" dirty="0"/>
+              <a:t>0.054</a:t>
+            </a:r>
+          </a:p>
+        </p:txBody>
+      </p:sp>
+      <p:sp>
+        <p:nvSpPr>
+          <p:cNvPr id="61" name="TextBox 60">
+            <a:extLst>
+              <a:ext uri="{FF2B5EF4-FFF2-40B4-BE49-F238E27FC236}">
+                <a16:creationId xmlns:a16="http://schemas.microsoft.com/office/drawing/2014/main" id="{86F2582E-AB66-44D4-B7B2-91658829A0F9}"/>
+              </a:ext>
+            </a:extLst>
+          </p:cNvPr>
+          <p:cNvSpPr txBox="1"/>
+          <p:nvPr/>
+        </p:nvSpPr>
+        <p:spPr>
+          <a:xfrm>
+            <a:off x="5448926" y="1800665"/>
+            <a:ext cx="227875" cy="138499"/>
+          </a:xfrm>
+          <a:prstGeom prst="rect">
+            <a:avLst/>
+          </a:prstGeom>
+          <a:noFill/>
+          <a:ln>
+            <a:noFill/>
+          </a:ln>
+        </p:spPr>
+        <p:txBody>
+          <a:bodyPr wrap="square" lIns="0" tIns="0" rIns="0" bIns="0" rtlCol="0">
+            <a:spAutoFit/>
+          </a:bodyPr>
+          <a:lstStyle/>
+          <a:p>
+            <a:r>
+              <a:rPr lang="en-US" sz="900" dirty="0"/>
+              <a:t>L</a:t>
+            </a:r>
+            <a:r>
+              <a:rPr lang="en-US" sz="900" baseline="-25000" dirty="0"/>
+              <a:t>4WC</a:t>
+            </a:r>
+            <a:endParaRPr lang="en-US" sz="900" dirty="0"/>
+          </a:p>
+        </p:txBody>
+      </p:sp>
+      <p:sp>
+        <p:nvSpPr>
+          <p:cNvPr id="63" name="TextBox 62">
+            <a:extLst>
+              <a:ext uri="{FF2B5EF4-FFF2-40B4-BE49-F238E27FC236}">
+                <a16:creationId xmlns:a16="http://schemas.microsoft.com/office/drawing/2014/main" id="{686D9566-D513-4CB9-AD78-CAF46DE0D429}"/>
+              </a:ext>
+            </a:extLst>
+          </p:cNvPr>
+          <p:cNvSpPr txBox="1"/>
+          <p:nvPr/>
+        </p:nvSpPr>
+        <p:spPr>
+          <a:xfrm>
+            <a:off x="5304581" y="2009166"/>
+            <a:ext cx="346076" cy="138499"/>
+          </a:xfrm>
+          <a:prstGeom prst="rect">
+            <a:avLst/>
+          </a:prstGeom>
+          <a:noFill/>
+          <a:ln>
+            <a:noFill/>
+          </a:ln>
+        </p:spPr>
+        <p:txBody>
+          <a:bodyPr wrap="square" lIns="0" tIns="0" rIns="0" bIns="0" rtlCol="0">
+            <a:spAutoFit/>
+          </a:bodyPr>
+          <a:lstStyle/>
+          <a:p>
+            <a:r>
+              <a:rPr lang="en-US" sz="900" dirty="0"/>
+              <a:t>H</a:t>
+            </a:r>
+            <a:r>
+              <a:rPr lang="en-US" sz="900" baseline="-25000" dirty="0"/>
+              <a:t>2WC</a:t>
+            </a:r>
+            <a:endParaRPr lang="en-US" sz="900" dirty="0"/>
+          </a:p>
+        </p:txBody>
+      </p:sp>
+      <p:sp>
+        <p:nvSpPr>
+          <p:cNvPr id="35" name="Rectangle 34">
+            <a:extLst>
+              <a:ext uri="{FF2B5EF4-FFF2-40B4-BE49-F238E27FC236}">
+                <a16:creationId xmlns:a16="http://schemas.microsoft.com/office/drawing/2014/main" id="{4D7F4DAC-0731-40DA-A483-AA3AF92A0C7E}"/>
+              </a:ext>
+            </a:extLst>
+          </p:cNvPr>
+          <p:cNvSpPr/>
+          <p:nvPr/>
+        </p:nvSpPr>
+        <p:spPr>
+          <a:xfrm rot="1674800">
+            <a:off x="5254578" y="1631961"/>
+            <a:ext cx="45719" cy="45719"/>
+          </a:xfrm>
+          <a:prstGeom prst="rect">
+            <a:avLst/>
+          </a:prstGeom>
+          <a:ln>
+            <a:prstDash val="sysDot"/>
+          </a:ln>
+        </p:spPr>
+        <p:style>
+          <a:lnRef idx="1">
+            <a:schemeClr val="accent4"/>
+          </a:lnRef>
+          <a:fillRef idx="0">
+            <a:schemeClr val="accent4"/>
+          </a:fillRef>
+          <a:effectRef idx="0">
+            <a:schemeClr val="accent4"/>
+          </a:effectRef>
+          <a:fontRef idx="minor">
+            <a:schemeClr val="tx1"/>
+          </a:fontRef>
+        </p:style>
+        <p:txBody>
+          <a:bodyPr rtlCol="0" anchor="ctr"/>
+          <a:lstStyle/>
+          <a:p>
+            <a:pPr algn="ctr"/>
+            <a:endParaRPr lang="en-GB"/>
+          </a:p>
+        </p:txBody>
+      </p:sp>
+      <p:sp>
+        <p:nvSpPr>
+          <p:cNvPr id="38" name="Freeform: Shape 37">
+            <a:extLst>
+              <a:ext uri="{FF2B5EF4-FFF2-40B4-BE49-F238E27FC236}">
+                <a16:creationId xmlns:a16="http://schemas.microsoft.com/office/drawing/2014/main" id="{798BFFDA-7F93-4606-A191-51FA093FD9B2}"/>
+              </a:ext>
+            </a:extLst>
+          </p:cNvPr>
+          <p:cNvSpPr/>
+          <p:nvPr/>
+        </p:nvSpPr>
+        <p:spPr>
+          <a:xfrm>
+            <a:off x="5295900" y="1604964"/>
+            <a:ext cx="214313" cy="87829"/>
+          </a:xfrm>
+          <a:custGeom>
+            <a:avLst/>
+            <a:gdLst>
+              <a:gd name="connsiteX0" fmla="*/ 245269 w 245269"/>
+              <a:gd name="connsiteY0" fmla="*/ 0 h 142875"/>
+              <a:gd name="connsiteX1" fmla="*/ 0 w 245269"/>
+              <a:gd name="connsiteY1" fmla="*/ 142875 h 142875"/>
+              <a:gd name="connsiteX0" fmla="*/ 245269 w 245269"/>
+              <a:gd name="connsiteY0" fmla="*/ 0 h 143620"/>
+              <a:gd name="connsiteX1" fmla="*/ 0 w 245269"/>
+              <a:gd name="connsiteY1" fmla="*/ 142875 h 143620"/>
+              <a:gd name="connsiteX0" fmla="*/ 214313 w 214313"/>
+              <a:gd name="connsiteY0" fmla="*/ 0 h 87425"/>
+              <a:gd name="connsiteX1" fmla="*/ 0 w 214313"/>
+              <a:gd name="connsiteY1" fmla="*/ 85725 h 87425"/>
+              <a:gd name="connsiteX0" fmla="*/ 214313 w 214313"/>
+              <a:gd name="connsiteY0" fmla="*/ 0 h 87829"/>
+              <a:gd name="connsiteX1" fmla="*/ 0 w 214313"/>
+              <a:gd name="connsiteY1" fmla="*/ 85725 h 87829"/>
+            </a:gdLst>
+            <a:ahLst/>
+            <a:cxnLst>
+              <a:cxn ang="0">
+                <a:pos x="connsiteX0" y="connsiteY0"/>
+              </a:cxn>
+              <a:cxn ang="0">
+                <a:pos x="connsiteX1" y="connsiteY1"/>
+              </a:cxn>
+            </a:cxnLst>
+            <a:rect l="l" t="t" r="r" b="b"/>
+            <a:pathLst>
+              <a:path w="214313" h="87829">
+                <a:moveTo>
+                  <a:pt x="214313" y="0"/>
+                </a:moveTo>
+                <a:cubicBezTo>
+                  <a:pt x="200224" y="71040"/>
+                  <a:pt x="85726" y="95647"/>
+                  <a:pt x="0" y="85725"/>
+                </a:cubicBezTo>
+              </a:path>
+            </a:pathLst>
+          </a:custGeom>
+          <a:ln>
+            <a:prstDash val="sysDot"/>
+            <a:headEnd type="none" w="sm" len="sm"/>
+            <a:tailEnd type="triangle" w="sm" len="sm"/>
+          </a:ln>
+        </p:spPr>
+        <p:style>
+          <a:lnRef idx="1">
+            <a:schemeClr val="accent3"/>
+          </a:lnRef>
+          <a:fillRef idx="0">
+            <a:schemeClr val="accent3"/>
+          </a:fillRef>
+          <a:effectRef idx="0">
+            <a:schemeClr val="accent3"/>
+          </a:effectRef>
+          <a:fontRef idx="minor">
+            <a:schemeClr val="tx1"/>
+          </a:fontRef>
+        </p:style>
+        <p:txBody>
+          <a:bodyPr rtlCol="0" anchor="ctr"/>
+          <a:lstStyle/>
+          <a:p>
+            <a:pPr algn="ctr"/>
+            <a:endParaRPr lang="en-GB"/>
+          </a:p>
+        </p:txBody>
+      </p:sp>
+      <p:sp>
+        <p:nvSpPr>
+          <p:cNvPr id="70" name="TextBox 69">
+            <a:extLst>
+              <a:ext uri="{FF2B5EF4-FFF2-40B4-BE49-F238E27FC236}">
+                <a16:creationId xmlns:a16="http://schemas.microsoft.com/office/drawing/2014/main" id="{D5FFD317-3B33-455D-8818-A91F436A1A44}"/>
+              </a:ext>
+            </a:extLst>
+          </p:cNvPr>
+          <p:cNvSpPr txBox="1"/>
+          <p:nvPr/>
+        </p:nvSpPr>
+        <p:spPr>
+          <a:xfrm>
+            <a:off x="5589355" y="1619727"/>
+            <a:ext cx="284504" cy="138499"/>
+          </a:xfrm>
+          <a:prstGeom prst="rect">
+            <a:avLst/>
+          </a:prstGeom>
+          <a:noFill/>
+          <a:ln>
+            <a:noFill/>
+          </a:ln>
+        </p:spPr>
+        <p:txBody>
+          <a:bodyPr wrap="square" lIns="0" tIns="0" rIns="0" bIns="0" rtlCol="0">
+            <a:spAutoFit/>
+          </a:bodyPr>
+          <a:lstStyle/>
+          <a:p>
+            <a:r>
+              <a:rPr lang="en-US" sz="900" dirty="0"/>
+              <a:t>L</a:t>
+            </a:r>
+            <a:r>
+              <a:rPr lang="en-US" sz="900" baseline="-25000" dirty="0"/>
+              <a:t>4WC</a:t>
+            </a:r>
+            <a:r>
+              <a:rPr lang="en-US" sz="900" dirty="0"/>
+              <a:t>x</a:t>
+            </a:r>
+          </a:p>
+        </p:txBody>
+      </p:sp>
+      <p:sp>
+        <p:nvSpPr>
+          <p:cNvPr id="64" name="Freeform 63">
+            <a:extLst>
+              <a:ext uri="{FF2B5EF4-FFF2-40B4-BE49-F238E27FC236}">
+                <a16:creationId xmlns:a16="http://schemas.microsoft.com/office/drawing/2014/main" id="{2919C9E4-A866-1A48-A904-60092D9A6B66}"/>
+              </a:ext>
+            </a:extLst>
+          </p:cNvPr>
+          <p:cNvSpPr/>
+          <p:nvPr/>
+        </p:nvSpPr>
+        <p:spPr>
+          <a:xfrm>
+            <a:off x="4596582" y="1900813"/>
+            <a:ext cx="174274" cy="229659"/>
+          </a:xfrm>
+          <a:custGeom>
+            <a:avLst/>
+            <a:gdLst>
+              <a:gd name="connsiteX0" fmla="*/ 0 w 147545"/>
+              <a:gd name="connsiteY0" fmla="*/ 0 h 212781"/>
+              <a:gd name="connsiteX1" fmla="*/ 146050 w 147545"/>
+              <a:gd name="connsiteY1" fmla="*/ 200025 h 212781"/>
+              <a:gd name="connsiteX2" fmla="*/ 79375 w 147545"/>
+              <a:gd name="connsiteY2" fmla="*/ 203200 h 212781"/>
+              <a:gd name="connsiteX0" fmla="*/ 0 w 153794"/>
+              <a:gd name="connsiteY0" fmla="*/ 0 h 203200"/>
+              <a:gd name="connsiteX1" fmla="*/ 152400 w 153794"/>
+              <a:gd name="connsiteY1" fmla="*/ 66675 h 203200"/>
+              <a:gd name="connsiteX2" fmla="*/ 79375 w 153794"/>
+              <a:gd name="connsiteY2" fmla="*/ 203200 h 203200"/>
+              <a:gd name="connsiteX0" fmla="*/ 0 w 79375"/>
+              <a:gd name="connsiteY0" fmla="*/ 0 h 203200"/>
+              <a:gd name="connsiteX1" fmla="*/ 79375 w 79375"/>
+              <a:gd name="connsiteY1" fmla="*/ 203200 h 203200"/>
+              <a:gd name="connsiteX0" fmla="*/ 0 w 142919"/>
+              <a:gd name="connsiteY0" fmla="*/ 0 h 203200"/>
+              <a:gd name="connsiteX1" fmla="*/ 79375 w 142919"/>
+              <a:gd name="connsiteY1" fmla="*/ 203200 h 203200"/>
+              <a:gd name="connsiteX0" fmla="*/ 0 w 186211"/>
+              <a:gd name="connsiteY0" fmla="*/ 0 h 203200"/>
+              <a:gd name="connsiteX1" fmla="*/ 79375 w 186211"/>
+              <a:gd name="connsiteY1" fmla="*/ 203200 h 203200"/>
+              <a:gd name="connsiteX0" fmla="*/ 0 w 125812"/>
+              <a:gd name="connsiteY0" fmla="*/ 0 h 203200"/>
+              <a:gd name="connsiteX1" fmla="*/ 79375 w 125812"/>
+              <a:gd name="connsiteY1" fmla="*/ 203200 h 203200"/>
+              <a:gd name="connsiteX0" fmla="*/ 0 w 122234"/>
+              <a:gd name="connsiteY0" fmla="*/ 1233 h 204433"/>
+              <a:gd name="connsiteX1" fmla="*/ 79375 w 122234"/>
+              <a:gd name="connsiteY1" fmla="*/ 204433 h 204433"/>
+              <a:gd name="connsiteX0" fmla="*/ 0 w 148382"/>
+              <a:gd name="connsiteY0" fmla="*/ 1233 h 204433"/>
+              <a:gd name="connsiteX1" fmla="*/ 111125 w 148382"/>
+              <a:gd name="connsiteY1" fmla="*/ 204433 h 204433"/>
+              <a:gd name="connsiteX0" fmla="*/ 0 w 354546"/>
+              <a:gd name="connsiteY0" fmla="*/ 772 h 284406"/>
+              <a:gd name="connsiteX1" fmla="*/ 335492 w 354546"/>
+              <a:gd name="connsiteY1" fmla="*/ 284406 h 284406"/>
+              <a:gd name="connsiteX0" fmla="*/ 0 w 335731"/>
+              <a:gd name="connsiteY0" fmla="*/ 1961 h 285595"/>
+              <a:gd name="connsiteX1" fmla="*/ 335492 w 335731"/>
+              <a:gd name="connsiteY1" fmla="*/ 285595 h 285595"/>
+              <a:gd name="connsiteX0" fmla="*/ 0 w 336219"/>
+              <a:gd name="connsiteY0" fmla="*/ 60 h 283694"/>
+              <a:gd name="connsiteX1" fmla="*/ 335492 w 336219"/>
+              <a:gd name="connsiteY1" fmla="*/ 283694 h 283694"/>
+              <a:gd name="connsiteX0" fmla="*/ 0 w 335839"/>
+              <a:gd name="connsiteY0" fmla="*/ 0 h 283634"/>
+              <a:gd name="connsiteX1" fmla="*/ 335492 w 335839"/>
+              <a:gd name="connsiteY1" fmla="*/ 283634 h 283634"/>
+              <a:gd name="connsiteX0" fmla="*/ 0 w 335492"/>
+              <a:gd name="connsiteY0" fmla="*/ 0 h 283634"/>
+              <a:gd name="connsiteX1" fmla="*/ 335492 w 335492"/>
+              <a:gd name="connsiteY1" fmla="*/ 283634 h 283634"/>
+              <a:gd name="connsiteX0" fmla="*/ 0 w 113242"/>
+              <a:gd name="connsiteY0" fmla="*/ 23817 h 101076"/>
+              <a:gd name="connsiteX1" fmla="*/ 113242 w 113242"/>
+              <a:gd name="connsiteY1" fmla="*/ 101076 h 101076"/>
+              <a:gd name="connsiteX0" fmla="*/ 0 w 131430"/>
+              <a:gd name="connsiteY0" fmla="*/ 0 h 77259"/>
+              <a:gd name="connsiteX1" fmla="*/ 113242 w 131430"/>
+              <a:gd name="connsiteY1" fmla="*/ 77259 h 77259"/>
+              <a:gd name="connsiteX0" fmla="*/ 0 w 88086"/>
+              <a:gd name="connsiteY0" fmla="*/ 0 h 96309"/>
+              <a:gd name="connsiteX1" fmla="*/ 33867 w 88086"/>
+              <a:gd name="connsiteY1" fmla="*/ 96309 h 96309"/>
+              <a:gd name="connsiteX0" fmla="*/ 0 w 51968"/>
+              <a:gd name="connsiteY0" fmla="*/ 0 h 96309"/>
+              <a:gd name="connsiteX1" fmla="*/ 33867 w 51968"/>
+              <a:gd name="connsiteY1" fmla="*/ 96309 h 96309"/>
+              <a:gd name="connsiteX0" fmla="*/ 0 w 65690"/>
+              <a:gd name="connsiteY0" fmla="*/ 0 h 93134"/>
+              <a:gd name="connsiteX1" fmla="*/ 52917 w 65690"/>
+              <a:gd name="connsiteY1" fmla="*/ 93134 h 93134"/>
+              <a:gd name="connsiteX0" fmla="*/ 0 w 171150"/>
+              <a:gd name="connsiteY0" fmla="*/ 0 h 229659"/>
+              <a:gd name="connsiteX1" fmla="*/ 167217 w 171150"/>
+              <a:gd name="connsiteY1" fmla="*/ 229659 h 229659"/>
+              <a:gd name="connsiteX0" fmla="*/ 0 w 172717"/>
+              <a:gd name="connsiteY0" fmla="*/ 0 h 229659"/>
+              <a:gd name="connsiteX1" fmla="*/ 167217 w 172717"/>
+              <a:gd name="connsiteY1" fmla="*/ 229659 h 229659"/>
+              <a:gd name="connsiteX0" fmla="*/ 0 w 178939"/>
+              <a:gd name="connsiteY0" fmla="*/ 0 h 229659"/>
+              <a:gd name="connsiteX1" fmla="*/ 167217 w 178939"/>
+              <a:gd name="connsiteY1" fmla="*/ 229659 h 229659"/>
+              <a:gd name="connsiteX0" fmla="*/ 0 w 174274"/>
+              <a:gd name="connsiteY0" fmla="*/ 0 h 229659"/>
+              <a:gd name="connsiteX1" fmla="*/ 167217 w 174274"/>
+              <a:gd name="connsiteY1" fmla="*/ 229659 h 229659"/>
+            </a:gdLst>
+            <a:ahLst/>
+            <a:cxnLst>
+              <a:cxn ang="0">
+                <a:pos x="connsiteX0" y="connsiteY0"/>
+              </a:cxn>
+              <a:cxn ang="0">
+                <a:pos x="connsiteX1" y="connsiteY1"/>
+              </a:cxn>
+            </a:cxnLst>
+            <a:rect l="l" t="t" r="r" b="b"/>
+            <a:pathLst>
+              <a:path w="174274" h="229659">
+                <a:moveTo>
+                  <a:pt x="0" y="0"/>
+                </a:moveTo>
+                <a:cubicBezTo>
+                  <a:pt x="109009" y="17991"/>
+                  <a:pt x="200882" y="96988"/>
+                  <a:pt x="167217" y="229659"/>
+                </a:cubicBezTo>
+              </a:path>
+            </a:pathLst>
+          </a:custGeom>
+          <a:noFill/>
+          <a:ln>
+            <a:solidFill>
+              <a:schemeClr val="tx1"/>
+            </a:solidFill>
+            <a:headEnd type="triangle" w="med" len="med"/>
+            <a:tailEnd type="none" w="sm" len="med"/>
+          </a:ln>
+        </p:spPr>
+        <p:style>
+          <a:lnRef idx="2">
+            <a:schemeClr val="accent1">
+              <a:shade val="50000"/>
+            </a:schemeClr>
+          </a:lnRef>
+          <a:fillRef idx="1">
+            <a:schemeClr val="accent1"/>
+          </a:fillRef>
+          <a:effectRef idx="0">
+            <a:schemeClr val="accent1"/>
+          </a:effectRef>
+          <a:fontRef idx="minor">
+            <a:schemeClr val="lt1"/>
+          </a:fontRef>
+        </p:style>
+        <p:txBody>
+          <a:bodyPr rtlCol="0" anchor="ctr"/>
+          <a:lstStyle/>
+          <a:p>
+            <a:pPr algn="ctr"/>
+            <a:endParaRPr lang="en-US"/>
+          </a:p>
+        </p:txBody>
+      </p:sp>
+      <p:sp>
+        <p:nvSpPr>
+          <p:cNvPr id="66" name="TextBox 65">
+            <a:extLst>
+              <a:ext uri="{FF2B5EF4-FFF2-40B4-BE49-F238E27FC236}">
+                <a16:creationId xmlns:a16="http://schemas.microsoft.com/office/drawing/2014/main" id="{AFCA11D4-CA72-7A4E-9EC8-2F7190E26C08}"/>
+              </a:ext>
+            </a:extLst>
+          </p:cNvPr>
+          <p:cNvSpPr txBox="1"/>
+          <p:nvPr/>
+        </p:nvSpPr>
+        <p:spPr>
+          <a:xfrm>
+            <a:off x="4659864" y="1931942"/>
+            <a:ext cx="154845" cy="138499"/>
+          </a:xfrm>
+          <a:prstGeom prst="rect">
+            <a:avLst/>
+          </a:prstGeom>
+          <a:noFill/>
+          <a:ln>
+            <a:noFill/>
+          </a:ln>
+        </p:spPr>
+        <p:txBody>
+          <a:bodyPr wrap="square" lIns="0" tIns="0" rIns="0" bIns="0" rtlCol="0">
+            <a:spAutoFit/>
+          </a:bodyPr>
+          <a:lstStyle/>
+          <a:p>
+            <a:r>
+              <a:rPr lang="en-US" sz="900" dirty="0"/>
+              <a:t>g</a:t>
+            </a:r>
+            <a:r>
+              <a:rPr lang="en-US" sz="900" baseline="-25000" dirty="0"/>
+              <a:t>2</a:t>
+            </a:r>
+          </a:p>
+        </p:txBody>
+      </p:sp>
+      <p:sp>
+        <p:nvSpPr>
+          <p:cNvPr id="67" name="Freeform 66">
+            <a:extLst>
+              <a:ext uri="{FF2B5EF4-FFF2-40B4-BE49-F238E27FC236}">
+                <a16:creationId xmlns:a16="http://schemas.microsoft.com/office/drawing/2014/main" id="{E4127EA4-724D-E048-B277-3119A2536AF2}"/>
+              </a:ext>
+            </a:extLst>
+          </p:cNvPr>
+          <p:cNvSpPr/>
+          <p:nvPr/>
+        </p:nvSpPr>
+        <p:spPr>
+          <a:xfrm>
+            <a:off x="4627471" y="1772037"/>
+            <a:ext cx="274098" cy="432859"/>
+          </a:xfrm>
+          <a:custGeom>
+            <a:avLst/>
+            <a:gdLst>
+              <a:gd name="connsiteX0" fmla="*/ 0 w 147545"/>
+              <a:gd name="connsiteY0" fmla="*/ 0 h 212781"/>
+              <a:gd name="connsiteX1" fmla="*/ 146050 w 147545"/>
+              <a:gd name="connsiteY1" fmla="*/ 200025 h 212781"/>
+              <a:gd name="connsiteX2" fmla="*/ 79375 w 147545"/>
+              <a:gd name="connsiteY2" fmla="*/ 203200 h 212781"/>
+              <a:gd name="connsiteX0" fmla="*/ 0 w 153794"/>
+              <a:gd name="connsiteY0" fmla="*/ 0 h 203200"/>
+              <a:gd name="connsiteX1" fmla="*/ 152400 w 153794"/>
+              <a:gd name="connsiteY1" fmla="*/ 66675 h 203200"/>
+              <a:gd name="connsiteX2" fmla="*/ 79375 w 153794"/>
+              <a:gd name="connsiteY2" fmla="*/ 203200 h 203200"/>
+              <a:gd name="connsiteX0" fmla="*/ 0 w 79375"/>
+              <a:gd name="connsiteY0" fmla="*/ 0 h 203200"/>
+              <a:gd name="connsiteX1" fmla="*/ 79375 w 79375"/>
+              <a:gd name="connsiteY1" fmla="*/ 203200 h 203200"/>
+              <a:gd name="connsiteX0" fmla="*/ 0 w 142919"/>
+              <a:gd name="connsiteY0" fmla="*/ 0 h 203200"/>
+              <a:gd name="connsiteX1" fmla="*/ 79375 w 142919"/>
+              <a:gd name="connsiteY1" fmla="*/ 203200 h 203200"/>
+              <a:gd name="connsiteX0" fmla="*/ 0 w 186211"/>
+              <a:gd name="connsiteY0" fmla="*/ 0 h 203200"/>
+              <a:gd name="connsiteX1" fmla="*/ 79375 w 186211"/>
+              <a:gd name="connsiteY1" fmla="*/ 203200 h 203200"/>
+              <a:gd name="connsiteX0" fmla="*/ 0 w 125812"/>
+              <a:gd name="connsiteY0" fmla="*/ 0 h 203200"/>
+              <a:gd name="connsiteX1" fmla="*/ 79375 w 125812"/>
+              <a:gd name="connsiteY1" fmla="*/ 203200 h 203200"/>
+              <a:gd name="connsiteX0" fmla="*/ 0 w 122234"/>
+              <a:gd name="connsiteY0" fmla="*/ 1233 h 204433"/>
+              <a:gd name="connsiteX1" fmla="*/ 79375 w 122234"/>
+              <a:gd name="connsiteY1" fmla="*/ 204433 h 204433"/>
+              <a:gd name="connsiteX0" fmla="*/ 0 w 148382"/>
+              <a:gd name="connsiteY0" fmla="*/ 1233 h 204433"/>
+              <a:gd name="connsiteX1" fmla="*/ 111125 w 148382"/>
+              <a:gd name="connsiteY1" fmla="*/ 204433 h 204433"/>
+              <a:gd name="connsiteX0" fmla="*/ 0 w 354546"/>
+              <a:gd name="connsiteY0" fmla="*/ 772 h 284406"/>
+              <a:gd name="connsiteX1" fmla="*/ 335492 w 354546"/>
+              <a:gd name="connsiteY1" fmla="*/ 284406 h 284406"/>
+              <a:gd name="connsiteX0" fmla="*/ 0 w 335731"/>
+              <a:gd name="connsiteY0" fmla="*/ 1961 h 285595"/>
+              <a:gd name="connsiteX1" fmla="*/ 335492 w 335731"/>
+              <a:gd name="connsiteY1" fmla="*/ 285595 h 285595"/>
+              <a:gd name="connsiteX0" fmla="*/ 0 w 336219"/>
+              <a:gd name="connsiteY0" fmla="*/ 60 h 283694"/>
+              <a:gd name="connsiteX1" fmla="*/ 335492 w 336219"/>
+              <a:gd name="connsiteY1" fmla="*/ 283694 h 283694"/>
+              <a:gd name="connsiteX0" fmla="*/ 0 w 335839"/>
+              <a:gd name="connsiteY0" fmla="*/ 0 h 283634"/>
+              <a:gd name="connsiteX1" fmla="*/ 335492 w 335839"/>
+              <a:gd name="connsiteY1" fmla="*/ 283634 h 283634"/>
+              <a:gd name="connsiteX0" fmla="*/ 0 w 335492"/>
+              <a:gd name="connsiteY0" fmla="*/ 0 h 283634"/>
+              <a:gd name="connsiteX1" fmla="*/ 335492 w 335492"/>
+              <a:gd name="connsiteY1" fmla="*/ 283634 h 283634"/>
+              <a:gd name="connsiteX0" fmla="*/ 0 w 113242"/>
+              <a:gd name="connsiteY0" fmla="*/ 23817 h 101076"/>
+              <a:gd name="connsiteX1" fmla="*/ 113242 w 113242"/>
+              <a:gd name="connsiteY1" fmla="*/ 101076 h 101076"/>
+              <a:gd name="connsiteX0" fmla="*/ 0 w 131430"/>
+              <a:gd name="connsiteY0" fmla="*/ 0 h 77259"/>
+              <a:gd name="connsiteX1" fmla="*/ 113242 w 131430"/>
+              <a:gd name="connsiteY1" fmla="*/ 77259 h 77259"/>
+              <a:gd name="connsiteX0" fmla="*/ 0 w 88086"/>
+              <a:gd name="connsiteY0" fmla="*/ 0 h 96309"/>
+              <a:gd name="connsiteX1" fmla="*/ 33867 w 88086"/>
+              <a:gd name="connsiteY1" fmla="*/ 96309 h 96309"/>
+              <a:gd name="connsiteX0" fmla="*/ 0 w 51968"/>
+              <a:gd name="connsiteY0" fmla="*/ 0 h 96309"/>
+              <a:gd name="connsiteX1" fmla="*/ 33867 w 51968"/>
+              <a:gd name="connsiteY1" fmla="*/ 96309 h 96309"/>
+              <a:gd name="connsiteX0" fmla="*/ 0 w 65690"/>
+              <a:gd name="connsiteY0" fmla="*/ 0 h 93134"/>
+              <a:gd name="connsiteX1" fmla="*/ 52917 w 65690"/>
+              <a:gd name="connsiteY1" fmla="*/ 93134 h 93134"/>
+              <a:gd name="connsiteX0" fmla="*/ 0 w 171150"/>
+              <a:gd name="connsiteY0" fmla="*/ 0 h 229659"/>
+              <a:gd name="connsiteX1" fmla="*/ 167217 w 171150"/>
+              <a:gd name="connsiteY1" fmla="*/ 229659 h 229659"/>
+              <a:gd name="connsiteX0" fmla="*/ 0 w 172717"/>
+              <a:gd name="connsiteY0" fmla="*/ 0 h 229659"/>
+              <a:gd name="connsiteX1" fmla="*/ 167217 w 172717"/>
+              <a:gd name="connsiteY1" fmla="*/ 229659 h 229659"/>
+              <a:gd name="connsiteX0" fmla="*/ 0 w 178939"/>
+              <a:gd name="connsiteY0" fmla="*/ 0 h 229659"/>
+              <a:gd name="connsiteX1" fmla="*/ 167217 w 178939"/>
+              <a:gd name="connsiteY1" fmla="*/ 229659 h 229659"/>
+              <a:gd name="connsiteX0" fmla="*/ 0 w 248138"/>
+              <a:gd name="connsiteY0" fmla="*/ 0 h 432859"/>
+              <a:gd name="connsiteX1" fmla="*/ 240242 w 248138"/>
+              <a:gd name="connsiteY1" fmla="*/ 432859 h 432859"/>
+              <a:gd name="connsiteX0" fmla="*/ 0 w 265317"/>
+              <a:gd name="connsiteY0" fmla="*/ 0 h 432859"/>
+              <a:gd name="connsiteX1" fmla="*/ 240242 w 265317"/>
+              <a:gd name="connsiteY1" fmla="*/ 432859 h 432859"/>
+              <a:gd name="connsiteX0" fmla="*/ 0 w 274098"/>
+              <a:gd name="connsiteY0" fmla="*/ 0 h 432859"/>
+              <a:gd name="connsiteX1" fmla="*/ 240242 w 274098"/>
+              <a:gd name="connsiteY1" fmla="*/ 432859 h 432859"/>
+            </a:gdLst>
+            <a:ahLst/>
+            <a:cxnLst>
+              <a:cxn ang="0">
+                <a:pos x="connsiteX0" y="connsiteY0"/>
+              </a:cxn>
+              <a:cxn ang="0">
+                <a:pos x="connsiteX1" y="connsiteY1"/>
+              </a:cxn>
+            </a:cxnLst>
+            <a:rect l="l" t="t" r="r" b="b"/>
+            <a:pathLst>
+              <a:path w="274098" h="432859">
+                <a:moveTo>
+                  <a:pt x="0" y="0"/>
+                </a:moveTo>
+                <a:cubicBezTo>
+                  <a:pt x="201084" y="49741"/>
+                  <a:pt x="341842" y="293159"/>
+                  <a:pt x="240242" y="432859"/>
+                </a:cubicBezTo>
+              </a:path>
+            </a:pathLst>
+          </a:custGeom>
+          <a:noFill/>
+          <a:ln>
+            <a:solidFill>
+              <a:schemeClr val="tx1"/>
+            </a:solidFill>
+            <a:headEnd type="triangle" w="med" len="med"/>
+            <a:tailEnd type="none" w="sm" len="med"/>
+          </a:ln>
+        </p:spPr>
+        <p:style>
+          <a:lnRef idx="2">
+            <a:schemeClr val="accent1">
+              <a:shade val="50000"/>
+            </a:schemeClr>
+          </a:lnRef>
+          <a:fillRef idx="1">
+            <a:schemeClr val="accent1"/>
+          </a:fillRef>
+          <a:effectRef idx="0">
+            <a:schemeClr val="accent1"/>
+          </a:effectRef>
+          <a:fontRef idx="minor">
+            <a:schemeClr val="lt1"/>
+          </a:fontRef>
+        </p:style>
+        <p:txBody>
+          <a:bodyPr rtlCol="0" anchor="ctr"/>
+          <a:lstStyle/>
+          <a:p>
+            <a:pPr algn="ctr"/>
+            <a:endParaRPr lang="en-US"/>
+          </a:p>
+        </p:txBody>
+      </p:sp>
+      <p:sp>
+        <p:nvSpPr>
+          <p:cNvPr id="68" name="TextBox 67">
+            <a:extLst>
+              <a:ext uri="{FF2B5EF4-FFF2-40B4-BE49-F238E27FC236}">
+                <a16:creationId xmlns:a16="http://schemas.microsoft.com/office/drawing/2014/main" id="{F91A86AF-7EB7-9C4C-8398-67DBD4B79590}"/>
+              </a:ext>
+            </a:extLst>
+          </p:cNvPr>
+          <p:cNvSpPr txBox="1"/>
+          <p:nvPr/>
+        </p:nvSpPr>
+        <p:spPr>
+          <a:xfrm>
+            <a:off x="4849776" y="1822690"/>
+            <a:ext cx="154845" cy="138499"/>
+          </a:xfrm>
+          <a:prstGeom prst="rect">
+            <a:avLst/>
+          </a:prstGeom>
+          <a:noFill/>
+          <a:ln>
+            <a:noFill/>
+          </a:ln>
+        </p:spPr>
+        <p:txBody>
+          <a:bodyPr wrap="square" lIns="0" tIns="0" rIns="0" bIns="0" rtlCol="0">
+            <a:spAutoFit/>
+          </a:bodyPr>
+          <a:lstStyle/>
+          <a:p>
+            <a:r>
+              <a:rPr lang="en-US" sz="900" dirty="0"/>
+              <a:t>θ</a:t>
+            </a:r>
+            <a:r>
+              <a:rPr lang="en-US" sz="900" baseline="-25000" dirty="0"/>
+              <a:t>2</a:t>
+            </a:r>
+          </a:p>
+        </p:txBody>
+      </p:sp>
+      <p:sp>
+        <p:nvSpPr>
+          <p:cNvPr id="71" name="Freeform 70">
+            <a:extLst>
+              <a:ext uri="{FF2B5EF4-FFF2-40B4-BE49-F238E27FC236}">
+                <a16:creationId xmlns:a16="http://schemas.microsoft.com/office/drawing/2014/main" id="{0984C2DF-436C-BE4B-A186-332CAFF2CA4E}"/>
+              </a:ext>
+            </a:extLst>
+          </p:cNvPr>
+          <p:cNvSpPr/>
+          <p:nvPr/>
+        </p:nvSpPr>
+        <p:spPr>
+          <a:xfrm>
+            <a:off x="4675183" y="1512203"/>
+            <a:ext cx="300735" cy="144411"/>
+          </a:xfrm>
+          <a:custGeom>
+            <a:avLst/>
+            <a:gdLst>
+              <a:gd name="connsiteX0" fmla="*/ 0 w 147545"/>
+              <a:gd name="connsiteY0" fmla="*/ 0 h 212781"/>
+              <a:gd name="connsiteX1" fmla="*/ 146050 w 147545"/>
+              <a:gd name="connsiteY1" fmla="*/ 200025 h 212781"/>
+              <a:gd name="connsiteX2" fmla="*/ 79375 w 147545"/>
+              <a:gd name="connsiteY2" fmla="*/ 203200 h 212781"/>
+              <a:gd name="connsiteX0" fmla="*/ 0 w 153794"/>
+              <a:gd name="connsiteY0" fmla="*/ 0 h 203200"/>
+              <a:gd name="connsiteX1" fmla="*/ 152400 w 153794"/>
+              <a:gd name="connsiteY1" fmla="*/ 66675 h 203200"/>
+              <a:gd name="connsiteX2" fmla="*/ 79375 w 153794"/>
+              <a:gd name="connsiteY2" fmla="*/ 203200 h 203200"/>
+              <a:gd name="connsiteX0" fmla="*/ 0 w 79375"/>
+              <a:gd name="connsiteY0" fmla="*/ 0 h 203200"/>
+              <a:gd name="connsiteX1" fmla="*/ 79375 w 79375"/>
+              <a:gd name="connsiteY1" fmla="*/ 203200 h 203200"/>
+              <a:gd name="connsiteX0" fmla="*/ 0 w 142919"/>
+              <a:gd name="connsiteY0" fmla="*/ 0 h 203200"/>
+              <a:gd name="connsiteX1" fmla="*/ 79375 w 142919"/>
+              <a:gd name="connsiteY1" fmla="*/ 203200 h 203200"/>
+              <a:gd name="connsiteX0" fmla="*/ 0 w 186211"/>
+              <a:gd name="connsiteY0" fmla="*/ 0 h 203200"/>
+              <a:gd name="connsiteX1" fmla="*/ 79375 w 186211"/>
+              <a:gd name="connsiteY1" fmla="*/ 203200 h 203200"/>
+              <a:gd name="connsiteX0" fmla="*/ 0 w 125812"/>
+              <a:gd name="connsiteY0" fmla="*/ 0 h 203200"/>
+              <a:gd name="connsiteX1" fmla="*/ 79375 w 125812"/>
+              <a:gd name="connsiteY1" fmla="*/ 203200 h 203200"/>
+              <a:gd name="connsiteX0" fmla="*/ 0 w 122234"/>
+              <a:gd name="connsiteY0" fmla="*/ 1233 h 204433"/>
+              <a:gd name="connsiteX1" fmla="*/ 79375 w 122234"/>
+              <a:gd name="connsiteY1" fmla="*/ 204433 h 204433"/>
+              <a:gd name="connsiteX0" fmla="*/ 0 w 148382"/>
+              <a:gd name="connsiteY0" fmla="*/ 1233 h 204433"/>
+              <a:gd name="connsiteX1" fmla="*/ 111125 w 148382"/>
+              <a:gd name="connsiteY1" fmla="*/ 204433 h 204433"/>
+              <a:gd name="connsiteX0" fmla="*/ 0 w 354546"/>
+              <a:gd name="connsiteY0" fmla="*/ 772 h 284406"/>
+              <a:gd name="connsiteX1" fmla="*/ 335492 w 354546"/>
+              <a:gd name="connsiteY1" fmla="*/ 284406 h 284406"/>
+              <a:gd name="connsiteX0" fmla="*/ 0 w 335731"/>
+              <a:gd name="connsiteY0" fmla="*/ 1961 h 285595"/>
+              <a:gd name="connsiteX1" fmla="*/ 335492 w 335731"/>
+              <a:gd name="connsiteY1" fmla="*/ 285595 h 285595"/>
+              <a:gd name="connsiteX0" fmla="*/ 0 w 336219"/>
+              <a:gd name="connsiteY0" fmla="*/ 60 h 283694"/>
+              <a:gd name="connsiteX1" fmla="*/ 335492 w 336219"/>
+              <a:gd name="connsiteY1" fmla="*/ 283694 h 283694"/>
+              <a:gd name="connsiteX0" fmla="*/ 0 w 335839"/>
+              <a:gd name="connsiteY0" fmla="*/ 0 h 283634"/>
+              <a:gd name="connsiteX1" fmla="*/ 335492 w 335839"/>
+              <a:gd name="connsiteY1" fmla="*/ 283634 h 283634"/>
+              <a:gd name="connsiteX0" fmla="*/ 0 w 335492"/>
+              <a:gd name="connsiteY0" fmla="*/ 0 h 283634"/>
+              <a:gd name="connsiteX1" fmla="*/ 335492 w 335492"/>
+              <a:gd name="connsiteY1" fmla="*/ 283634 h 283634"/>
+              <a:gd name="connsiteX0" fmla="*/ 0 w 113242"/>
+              <a:gd name="connsiteY0" fmla="*/ 23817 h 101076"/>
+              <a:gd name="connsiteX1" fmla="*/ 113242 w 113242"/>
+              <a:gd name="connsiteY1" fmla="*/ 101076 h 101076"/>
+              <a:gd name="connsiteX0" fmla="*/ 0 w 131430"/>
+              <a:gd name="connsiteY0" fmla="*/ 0 h 77259"/>
+              <a:gd name="connsiteX1" fmla="*/ 113242 w 131430"/>
+              <a:gd name="connsiteY1" fmla="*/ 77259 h 77259"/>
+              <a:gd name="connsiteX0" fmla="*/ 0 w 88086"/>
+              <a:gd name="connsiteY0" fmla="*/ 0 h 96309"/>
+              <a:gd name="connsiteX1" fmla="*/ 33867 w 88086"/>
+              <a:gd name="connsiteY1" fmla="*/ 96309 h 96309"/>
+              <a:gd name="connsiteX0" fmla="*/ 0 w 51968"/>
+              <a:gd name="connsiteY0" fmla="*/ 0 h 96309"/>
+              <a:gd name="connsiteX1" fmla="*/ 33867 w 51968"/>
+              <a:gd name="connsiteY1" fmla="*/ 96309 h 96309"/>
+              <a:gd name="connsiteX0" fmla="*/ 0 w 65690"/>
+              <a:gd name="connsiteY0" fmla="*/ 0 h 93134"/>
+              <a:gd name="connsiteX1" fmla="*/ 52917 w 65690"/>
+              <a:gd name="connsiteY1" fmla="*/ 93134 h 93134"/>
+              <a:gd name="connsiteX0" fmla="*/ 0 w 171150"/>
+              <a:gd name="connsiteY0" fmla="*/ 0 h 229659"/>
+              <a:gd name="connsiteX1" fmla="*/ 167217 w 171150"/>
+              <a:gd name="connsiteY1" fmla="*/ 229659 h 229659"/>
+              <a:gd name="connsiteX0" fmla="*/ 0 w 172717"/>
+              <a:gd name="connsiteY0" fmla="*/ 0 h 229659"/>
+              <a:gd name="connsiteX1" fmla="*/ 167217 w 172717"/>
+              <a:gd name="connsiteY1" fmla="*/ 229659 h 229659"/>
+              <a:gd name="connsiteX0" fmla="*/ 0 w 178939"/>
+              <a:gd name="connsiteY0" fmla="*/ 0 h 229659"/>
+              <a:gd name="connsiteX1" fmla="*/ 167217 w 178939"/>
+              <a:gd name="connsiteY1" fmla="*/ 229659 h 229659"/>
+              <a:gd name="connsiteX0" fmla="*/ 0 w 248138"/>
+              <a:gd name="connsiteY0" fmla="*/ 0 h 432859"/>
+              <a:gd name="connsiteX1" fmla="*/ 240242 w 248138"/>
+              <a:gd name="connsiteY1" fmla="*/ 432859 h 432859"/>
+              <a:gd name="connsiteX0" fmla="*/ 0 w 265317"/>
+              <a:gd name="connsiteY0" fmla="*/ 0 h 432859"/>
+              <a:gd name="connsiteX1" fmla="*/ 240242 w 265317"/>
+              <a:gd name="connsiteY1" fmla="*/ 432859 h 432859"/>
+              <a:gd name="connsiteX0" fmla="*/ 0 w 274098"/>
+              <a:gd name="connsiteY0" fmla="*/ 0 h 432859"/>
+              <a:gd name="connsiteX1" fmla="*/ 240242 w 274098"/>
+              <a:gd name="connsiteY1" fmla="*/ 432859 h 432859"/>
+              <a:gd name="connsiteX0" fmla="*/ 11043 w 123323"/>
+              <a:gd name="connsiteY0" fmla="*/ 0 h 513131"/>
+              <a:gd name="connsiteX1" fmla="*/ 0 w 123323"/>
+              <a:gd name="connsiteY1" fmla="*/ 513131 h 513131"/>
+              <a:gd name="connsiteX0" fmla="*/ 349581 w 400790"/>
+              <a:gd name="connsiteY0" fmla="*/ 0 h 115262"/>
+              <a:gd name="connsiteX1" fmla="*/ 0 w 400790"/>
+              <a:gd name="connsiteY1" fmla="*/ 115262 h 115262"/>
+              <a:gd name="connsiteX0" fmla="*/ 349581 w 398662"/>
+              <a:gd name="connsiteY0" fmla="*/ 0 h 117610"/>
+              <a:gd name="connsiteX1" fmla="*/ 0 w 398662"/>
+              <a:gd name="connsiteY1" fmla="*/ 115262 h 117610"/>
+              <a:gd name="connsiteX0" fmla="*/ 300720 w 353952"/>
+              <a:gd name="connsiteY0" fmla="*/ 0 h 141571"/>
+              <a:gd name="connsiteX1" fmla="*/ 0 w 353952"/>
+              <a:gd name="connsiteY1" fmla="*/ 139693 h 141571"/>
+              <a:gd name="connsiteX0" fmla="*/ 300720 w 300735"/>
+              <a:gd name="connsiteY0" fmla="*/ 0 h 144411"/>
+              <a:gd name="connsiteX1" fmla="*/ 0 w 300735"/>
+              <a:gd name="connsiteY1" fmla="*/ 139693 h 144411"/>
+            </a:gdLst>
+            <a:ahLst/>
+            <a:cxnLst>
+              <a:cxn ang="0">
+                <a:pos x="connsiteX0" y="connsiteY0"/>
+              </a:cxn>
+              <a:cxn ang="0">
+                <a:pos x="connsiteX1" y="connsiteY1"/>
+              </a:cxn>
+            </a:cxnLst>
+            <a:rect l="l" t="t" r="r" b="b"/>
+            <a:pathLst>
+              <a:path w="300735" h="144411">
+                <a:moveTo>
+                  <a:pt x="300720" y="0"/>
+                </a:moveTo>
+                <a:cubicBezTo>
+                  <a:pt x="302870" y="130013"/>
+                  <a:pt x="73679" y="157047"/>
+                  <a:pt x="0" y="139693"/>
+                </a:cubicBezTo>
+              </a:path>
+            </a:pathLst>
+          </a:custGeom>
+          <a:noFill/>
+          <a:ln>
+            <a:solidFill>
+              <a:schemeClr val="tx1"/>
+            </a:solidFill>
+            <a:headEnd type="triangle" w="med" len="med"/>
+            <a:tailEnd type="none" w="sm" len="med"/>
+          </a:ln>
+        </p:spPr>
+        <p:style>
+          <a:lnRef idx="2">
+            <a:schemeClr val="accent1">
+              <a:shade val="50000"/>
+            </a:schemeClr>
+          </a:lnRef>
+          <a:fillRef idx="1">
+            <a:schemeClr val="accent1"/>
+          </a:fillRef>
+          <a:effectRef idx="0">
+            <a:schemeClr val="accent1"/>
+          </a:effectRef>
+          <a:fontRef idx="minor">
+            <a:schemeClr val="lt1"/>
+          </a:fontRef>
+        </p:style>
+        <p:txBody>
+          <a:bodyPr rtlCol="0" anchor="ctr"/>
+          <a:lstStyle/>
+          <a:p>
+            <a:pPr algn="ctr"/>
+            <a:endParaRPr lang="en-US"/>
+          </a:p>
+        </p:txBody>
+      </p:sp>
+      <p:sp>
+        <p:nvSpPr>
+          <p:cNvPr id="73" name="TextBox 72">
+            <a:extLst>
+              <a:ext uri="{FF2B5EF4-FFF2-40B4-BE49-F238E27FC236}">
+                <a16:creationId xmlns:a16="http://schemas.microsoft.com/office/drawing/2014/main" id="{958BEA23-5D5B-AC44-A031-0D1AB2758EDE}"/>
+              </a:ext>
+            </a:extLst>
+          </p:cNvPr>
+          <p:cNvSpPr txBox="1"/>
+          <p:nvPr/>
+        </p:nvSpPr>
+        <p:spPr>
+          <a:xfrm>
+            <a:off x="4718574" y="1628338"/>
+            <a:ext cx="154845" cy="138499"/>
+          </a:xfrm>
+          <a:prstGeom prst="rect">
+            <a:avLst/>
+          </a:prstGeom>
+          <a:noFill/>
+          <a:ln>
+            <a:noFill/>
+          </a:ln>
+        </p:spPr>
+        <p:txBody>
+          <a:bodyPr wrap="square" lIns="0" tIns="0" rIns="0" bIns="0" rtlCol="0">
+            <a:spAutoFit/>
+          </a:bodyPr>
+          <a:lstStyle/>
+          <a:p>
+            <a:r>
+              <a:rPr lang="en-US" sz="900" dirty="0"/>
+              <a:t>g</a:t>
+            </a:r>
+            <a:r>
+              <a:rPr lang="en-US" sz="900" baseline="-25000" dirty="0"/>
+              <a:t>3</a:t>
+            </a:r>
+          </a:p>
+        </p:txBody>
+      </p:sp>
+      <p:sp>
+        <p:nvSpPr>
+          <p:cNvPr id="74" name="Freeform 73">
+            <a:extLst>
+              <a:ext uri="{FF2B5EF4-FFF2-40B4-BE49-F238E27FC236}">
+                <a16:creationId xmlns:a16="http://schemas.microsoft.com/office/drawing/2014/main" id="{A11F7750-B990-E044-A3B6-E1F9728CC996}"/>
+              </a:ext>
+            </a:extLst>
+          </p:cNvPr>
+          <p:cNvSpPr/>
+          <p:nvPr/>
+        </p:nvSpPr>
+        <p:spPr>
+          <a:xfrm>
+            <a:off x="5013390" y="1513036"/>
+            <a:ext cx="92841" cy="113814"/>
+          </a:xfrm>
+          <a:custGeom>
+            <a:avLst/>
+            <a:gdLst>
+              <a:gd name="connsiteX0" fmla="*/ 0 w 147545"/>
+              <a:gd name="connsiteY0" fmla="*/ 0 h 212781"/>
+              <a:gd name="connsiteX1" fmla="*/ 146050 w 147545"/>
+              <a:gd name="connsiteY1" fmla="*/ 200025 h 212781"/>
+              <a:gd name="connsiteX2" fmla="*/ 79375 w 147545"/>
+              <a:gd name="connsiteY2" fmla="*/ 203200 h 212781"/>
+              <a:gd name="connsiteX0" fmla="*/ 0 w 153794"/>
+              <a:gd name="connsiteY0" fmla="*/ 0 h 203200"/>
+              <a:gd name="connsiteX1" fmla="*/ 152400 w 153794"/>
+              <a:gd name="connsiteY1" fmla="*/ 66675 h 203200"/>
+              <a:gd name="connsiteX2" fmla="*/ 79375 w 153794"/>
+              <a:gd name="connsiteY2" fmla="*/ 203200 h 203200"/>
+              <a:gd name="connsiteX0" fmla="*/ 0 w 79375"/>
+              <a:gd name="connsiteY0" fmla="*/ 0 h 203200"/>
+              <a:gd name="connsiteX1" fmla="*/ 79375 w 79375"/>
+              <a:gd name="connsiteY1" fmla="*/ 203200 h 203200"/>
+              <a:gd name="connsiteX0" fmla="*/ 0 w 142919"/>
+              <a:gd name="connsiteY0" fmla="*/ 0 h 203200"/>
+              <a:gd name="connsiteX1" fmla="*/ 79375 w 142919"/>
+              <a:gd name="connsiteY1" fmla="*/ 203200 h 203200"/>
+              <a:gd name="connsiteX0" fmla="*/ 0 w 186211"/>
+              <a:gd name="connsiteY0" fmla="*/ 0 h 203200"/>
+              <a:gd name="connsiteX1" fmla="*/ 79375 w 186211"/>
+              <a:gd name="connsiteY1" fmla="*/ 203200 h 203200"/>
+              <a:gd name="connsiteX0" fmla="*/ 0 w 125812"/>
+              <a:gd name="connsiteY0" fmla="*/ 0 h 203200"/>
+              <a:gd name="connsiteX1" fmla="*/ 79375 w 125812"/>
+              <a:gd name="connsiteY1" fmla="*/ 203200 h 203200"/>
+              <a:gd name="connsiteX0" fmla="*/ 0 w 122234"/>
+              <a:gd name="connsiteY0" fmla="*/ 1233 h 204433"/>
+              <a:gd name="connsiteX1" fmla="*/ 79375 w 122234"/>
+              <a:gd name="connsiteY1" fmla="*/ 204433 h 204433"/>
+              <a:gd name="connsiteX0" fmla="*/ 0 w 148382"/>
+              <a:gd name="connsiteY0" fmla="*/ 1233 h 204433"/>
+              <a:gd name="connsiteX1" fmla="*/ 111125 w 148382"/>
+              <a:gd name="connsiteY1" fmla="*/ 204433 h 204433"/>
+              <a:gd name="connsiteX0" fmla="*/ 0 w 354546"/>
+              <a:gd name="connsiteY0" fmla="*/ 772 h 284406"/>
+              <a:gd name="connsiteX1" fmla="*/ 335492 w 354546"/>
+              <a:gd name="connsiteY1" fmla="*/ 284406 h 284406"/>
+              <a:gd name="connsiteX0" fmla="*/ 0 w 335731"/>
+              <a:gd name="connsiteY0" fmla="*/ 1961 h 285595"/>
+              <a:gd name="connsiteX1" fmla="*/ 335492 w 335731"/>
+              <a:gd name="connsiteY1" fmla="*/ 285595 h 285595"/>
+              <a:gd name="connsiteX0" fmla="*/ 0 w 336219"/>
+              <a:gd name="connsiteY0" fmla="*/ 60 h 283694"/>
+              <a:gd name="connsiteX1" fmla="*/ 335492 w 336219"/>
+              <a:gd name="connsiteY1" fmla="*/ 283694 h 283694"/>
+              <a:gd name="connsiteX0" fmla="*/ 0 w 335839"/>
+              <a:gd name="connsiteY0" fmla="*/ 0 h 283634"/>
+              <a:gd name="connsiteX1" fmla="*/ 335492 w 335839"/>
+              <a:gd name="connsiteY1" fmla="*/ 283634 h 283634"/>
+              <a:gd name="connsiteX0" fmla="*/ 0 w 335492"/>
+              <a:gd name="connsiteY0" fmla="*/ 0 h 283634"/>
+              <a:gd name="connsiteX1" fmla="*/ 335492 w 335492"/>
+              <a:gd name="connsiteY1" fmla="*/ 283634 h 283634"/>
+              <a:gd name="connsiteX0" fmla="*/ 0 w 113242"/>
+              <a:gd name="connsiteY0" fmla="*/ 23817 h 101076"/>
+              <a:gd name="connsiteX1" fmla="*/ 113242 w 113242"/>
+              <a:gd name="connsiteY1" fmla="*/ 101076 h 101076"/>
+              <a:gd name="connsiteX0" fmla="*/ 0 w 131430"/>
+              <a:gd name="connsiteY0" fmla="*/ 0 h 77259"/>
+              <a:gd name="connsiteX1" fmla="*/ 113242 w 131430"/>
+              <a:gd name="connsiteY1" fmla="*/ 77259 h 77259"/>
+              <a:gd name="connsiteX0" fmla="*/ 0 w 88086"/>
+              <a:gd name="connsiteY0" fmla="*/ 0 h 96309"/>
+              <a:gd name="connsiteX1" fmla="*/ 33867 w 88086"/>
+              <a:gd name="connsiteY1" fmla="*/ 96309 h 96309"/>
+              <a:gd name="connsiteX0" fmla="*/ 0 w 51968"/>
+              <a:gd name="connsiteY0" fmla="*/ 0 h 96309"/>
+              <a:gd name="connsiteX1" fmla="*/ 33867 w 51968"/>
+              <a:gd name="connsiteY1" fmla="*/ 96309 h 96309"/>
+              <a:gd name="connsiteX0" fmla="*/ 0 w 65690"/>
+              <a:gd name="connsiteY0" fmla="*/ 0 h 93134"/>
+              <a:gd name="connsiteX1" fmla="*/ 52917 w 65690"/>
+              <a:gd name="connsiteY1" fmla="*/ 93134 h 93134"/>
+              <a:gd name="connsiteX0" fmla="*/ 0 w 171150"/>
+              <a:gd name="connsiteY0" fmla="*/ 0 h 229659"/>
+              <a:gd name="connsiteX1" fmla="*/ 167217 w 171150"/>
+              <a:gd name="connsiteY1" fmla="*/ 229659 h 229659"/>
+              <a:gd name="connsiteX0" fmla="*/ 0 w 172717"/>
+              <a:gd name="connsiteY0" fmla="*/ 0 h 229659"/>
+              <a:gd name="connsiteX1" fmla="*/ 167217 w 172717"/>
+              <a:gd name="connsiteY1" fmla="*/ 229659 h 229659"/>
+              <a:gd name="connsiteX0" fmla="*/ 0 w 178939"/>
+              <a:gd name="connsiteY0" fmla="*/ 0 h 229659"/>
+              <a:gd name="connsiteX1" fmla="*/ 167217 w 178939"/>
+              <a:gd name="connsiteY1" fmla="*/ 229659 h 229659"/>
+              <a:gd name="connsiteX0" fmla="*/ 0 w 248138"/>
+              <a:gd name="connsiteY0" fmla="*/ 0 h 432859"/>
+              <a:gd name="connsiteX1" fmla="*/ 240242 w 248138"/>
+              <a:gd name="connsiteY1" fmla="*/ 432859 h 432859"/>
+              <a:gd name="connsiteX0" fmla="*/ 0 w 265317"/>
+              <a:gd name="connsiteY0" fmla="*/ 0 h 432859"/>
+              <a:gd name="connsiteX1" fmla="*/ 240242 w 265317"/>
+              <a:gd name="connsiteY1" fmla="*/ 432859 h 432859"/>
+              <a:gd name="connsiteX0" fmla="*/ 0 w 274098"/>
+              <a:gd name="connsiteY0" fmla="*/ 0 h 432859"/>
+              <a:gd name="connsiteX1" fmla="*/ 240242 w 274098"/>
+              <a:gd name="connsiteY1" fmla="*/ 432859 h 432859"/>
+              <a:gd name="connsiteX0" fmla="*/ 11043 w 123323"/>
+              <a:gd name="connsiteY0" fmla="*/ 0 h 513131"/>
+              <a:gd name="connsiteX1" fmla="*/ 0 w 123323"/>
+              <a:gd name="connsiteY1" fmla="*/ 513131 h 513131"/>
+              <a:gd name="connsiteX0" fmla="*/ 349581 w 400790"/>
+              <a:gd name="connsiteY0" fmla="*/ 0 h 115262"/>
+              <a:gd name="connsiteX1" fmla="*/ 0 w 400790"/>
+              <a:gd name="connsiteY1" fmla="*/ 115262 h 115262"/>
+              <a:gd name="connsiteX0" fmla="*/ 349581 w 398662"/>
+              <a:gd name="connsiteY0" fmla="*/ 0 h 117610"/>
+              <a:gd name="connsiteX1" fmla="*/ 0 w 398662"/>
+              <a:gd name="connsiteY1" fmla="*/ 115262 h 117610"/>
+              <a:gd name="connsiteX0" fmla="*/ 300720 w 353952"/>
+              <a:gd name="connsiteY0" fmla="*/ 0 h 141571"/>
+              <a:gd name="connsiteX1" fmla="*/ 0 w 353952"/>
+              <a:gd name="connsiteY1" fmla="*/ 139693 h 141571"/>
+              <a:gd name="connsiteX0" fmla="*/ 300720 w 300735"/>
+              <a:gd name="connsiteY0" fmla="*/ 0 h 144411"/>
+              <a:gd name="connsiteX1" fmla="*/ 0 w 300735"/>
+              <a:gd name="connsiteY1" fmla="*/ 139693 h 144411"/>
+              <a:gd name="connsiteX0" fmla="*/ 35474 w 46173"/>
+              <a:gd name="connsiteY0" fmla="*/ 0 h 94844"/>
+              <a:gd name="connsiteX1" fmla="*/ 0 w 46173"/>
+              <a:gd name="connsiteY1" fmla="*/ 76872 h 94844"/>
+              <a:gd name="connsiteX0" fmla="*/ 35474 w 48838"/>
+              <a:gd name="connsiteY0" fmla="*/ 0 h 80909"/>
+              <a:gd name="connsiteX1" fmla="*/ 0 w 48838"/>
+              <a:gd name="connsiteY1" fmla="*/ 76872 h 80909"/>
+              <a:gd name="connsiteX0" fmla="*/ 35474 w 35524"/>
+              <a:gd name="connsiteY0" fmla="*/ 0 h 89934"/>
+              <a:gd name="connsiteX1" fmla="*/ 9174 w 35524"/>
+              <a:gd name="connsiteY1" fmla="*/ 89934 h 89934"/>
+              <a:gd name="connsiteX2" fmla="*/ 0 w 35524"/>
+              <a:gd name="connsiteY2" fmla="*/ 76872 h 89934"/>
+              <a:gd name="connsiteX0" fmla="*/ 26379 w 33904"/>
+              <a:gd name="connsiteY0" fmla="*/ 0 h 114618"/>
+              <a:gd name="connsiteX1" fmla="*/ 79 w 33904"/>
+              <a:gd name="connsiteY1" fmla="*/ 89934 h 114618"/>
+              <a:gd name="connsiteX2" fmla="*/ 1375 w 33904"/>
+              <a:gd name="connsiteY2" fmla="*/ 111773 h 114618"/>
+              <a:gd name="connsiteX0" fmla="*/ 158938 w 158947"/>
+              <a:gd name="connsiteY0" fmla="*/ 0 h 320532"/>
+              <a:gd name="connsiteX1" fmla="*/ 15 w 158947"/>
+              <a:gd name="connsiteY1" fmla="*/ 295848 h 320532"/>
+              <a:gd name="connsiteX2" fmla="*/ 1311 w 158947"/>
+              <a:gd name="connsiteY2" fmla="*/ 317687 h 320532"/>
+              <a:gd name="connsiteX0" fmla="*/ 157627 w 157627"/>
+              <a:gd name="connsiteY0" fmla="*/ 0 h 317687"/>
+              <a:gd name="connsiteX1" fmla="*/ 0 w 157627"/>
+              <a:gd name="connsiteY1" fmla="*/ 317687 h 317687"/>
+              <a:gd name="connsiteX0" fmla="*/ 178567 w 178567"/>
+              <a:gd name="connsiteY0" fmla="*/ 0 h 300237"/>
+              <a:gd name="connsiteX1" fmla="*/ 0 w 178567"/>
+              <a:gd name="connsiteY1" fmla="*/ 300237 h 300237"/>
+              <a:gd name="connsiteX0" fmla="*/ 178567 w 178567"/>
+              <a:gd name="connsiteY0" fmla="*/ 0 h 303942"/>
+              <a:gd name="connsiteX1" fmla="*/ 0 w 178567"/>
+              <a:gd name="connsiteY1" fmla="*/ 300237 h 303942"/>
+              <a:gd name="connsiteX0" fmla="*/ 52924 w 52924"/>
+              <a:gd name="connsiteY0" fmla="*/ 0 h 103297"/>
+              <a:gd name="connsiteX1" fmla="*/ 0 w 52924"/>
+              <a:gd name="connsiteY1" fmla="*/ 87342 h 103297"/>
+              <a:gd name="connsiteX0" fmla="*/ 10722 w 86816"/>
+              <a:gd name="connsiteY0" fmla="*/ 0 h 108939"/>
+              <a:gd name="connsiteX1" fmla="*/ 55520 w 86816"/>
+              <a:gd name="connsiteY1" fmla="*/ 94323 h 108939"/>
+              <a:gd name="connsiteX0" fmla="*/ 10722 w 86816"/>
+              <a:gd name="connsiteY0" fmla="*/ 0 h 120706"/>
+              <a:gd name="connsiteX1" fmla="*/ 55520 w 86816"/>
+              <a:gd name="connsiteY1" fmla="*/ 108283 h 120706"/>
+              <a:gd name="connsiteX0" fmla="*/ 80845 w 80845"/>
+              <a:gd name="connsiteY0" fmla="*/ 0 h 136105"/>
+              <a:gd name="connsiteX1" fmla="*/ 0 w 80845"/>
+              <a:gd name="connsiteY1" fmla="*/ 125733 h 136105"/>
+              <a:gd name="connsiteX0" fmla="*/ 80845 w 121113"/>
+              <a:gd name="connsiteY0" fmla="*/ 0 h 135489"/>
+              <a:gd name="connsiteX1" fmla="*/ 0 w 121113"/>
+              <a:gd name="connsiteY1" fmla="*/ 125733 h 135489"/>
+              <a:gd name="connsiteX0" fmla="*/ 38964 w 92841"/>
+              <a:gd name="connsiteY0" fmla="*/ 0 h 113814"/>
+              <a:gd name="connsiteX1" fmla="*/ 0 w 92841"/>
+              <a:gd name="connsiteY1" fmla="*/ 101302 h 113814"/>
+            </a:gdLst>
+            <a:ahLst/>
+            <a:cxnLst>
+              <a:cxn ang="0">
+                <a:pos x="connsiteX0" y="connsiteY0"/>
+              </a:cxn>
+              <a:cxn ang="0">
+                <a:pos x="connsiteX1" y="connsiteY1"/>
+              </a:cxn>
+            </a:cxnLst>
+            <a:rect l="l" t="t" r="r" b="b"/>
+            <a:pathLst>
+              <a:path w="92841" h="113814">
+                <a:moveTo>
+                  <a:pt x="38964" y="0"/>
+                </a:moveTo>
+                <a:cubicBezTo>
+                  <a:pt x="122535" y="93099"/>
+                  <a:pt x="108383" y="137336"/>
+                  <a:pt x="0" y="101302"/>
+                </a:cubicBezTo>
+              </a:path>
+            </a:pathLst>
+          </a:custGeom>
+          <a:noFill/>
+          <a:ln>
+            <a:solidFill>
+              <a:schemeClr val="tx1"/>
+            </a:solidFill>
+            <a:headEnd type="triangle" w="med" len="med"/>
+            <a:tailEnd type="none" w="sm" len="med"/>
+          </a:ln>
+        </p:spPr>
+        <p:style>
+          <a:lnRef idx="2">
+            <a:schemeClr val="accent1">
+              <a:shade val="50000"/>
+            </a:schemeClr>
+          </a:lnRef>
+          <a:fillRef idx="1">
+            <a:schemeClr val="accent1"/>
+          </a:fillRef>
+          <a:effectRef idx="0">
+            <a:schemeClr val="accent1"/>
+          </a:effectRef>
+          <a:fontRef idx="minor">
+            <a:schemeClr val="lt1"/>
+          </a:fontRef>
+        </p:style>
+        <p:txBody>
+          <a:bodyPr rtlCol="0" anchor="ctr"/>
+          <a:lstStyle/>
+          <a:p>
+            <a:pPr algn="ctr"/>
+            <a:endParaRPr lang="en-US"/>
+          </a:p>
+        </p:txBody>
+      </p:sp>
+      <p:sp>
+        <p:nvSpPr>
+          <p:cNvPr id="75" name="TextBox 74">
+            <a:extLst>
+              <a:ext uri="{FF2B5EF4-FFF2-40B4-BE49-F238E27FC236}">
+                <a16:creationId xmlns:a16="http://schemas.microsoft.com/office/drawing/2014/main" id="{3FB9905F-EF2F-0A4B-9665-926D46280EBB}"/>
+              </a:ext>
+            </a:extLst>
+          </p:cNvPr>
+          <p:cNvSpPr txBox="1"/>
+          <p:nvPr/>
+        </p:nvSpPr>
+        <p:spPr>
+          <a:xfrm>
+            <a:off x="5110318" y="1541614"/>
+            <a:ext cx="154845" cy="138499"/>
+          </a:xfrm>
+          <a:prstGeom prst="rect">
+            <a:avLst/>
+          </a:prstGeom>
+          <a:noFill/>
+          <a:ln>
+            <a:noFill/>
+          </a:ln>
+        </p:spPr>
+        <p:txBody>
+          <a:bodyPr wrap="square" lIns="0" tIns="0" rIns="0" bIns="0" rtlCol="0">
+            <a:spAutoFit/>
+          </a:bodyPr>
+          <a:lstStyle/>
+          <a:p>
+            <a:r>
+              <a:rPr lang="en-US" sz="900" dirty="0"/>
+              <a:t>g</a:t>
+            </a:r>
+            <a:r>
+              <a:rPr lang="en-US" sz="900" baseline="-25000" dirty="0"/>
+              <a:t>4</a:t>
+            </a:r>
+          </a:p>
+        </p:txBody>
+      </p:sp>
+    </p:spTree>
+    <p:extLst>
+      <p:ext uri="{BB962C8B-B14F-4D97-AF65-F5344CB8AC3E}">
+        <p14:creationId xmlns:p14="http://schemas.microsoft.com/office/powerpoint/2010/main" val="327070223"/>
+      </p:ext>
+    </p:extLst>
+  </p:cSld>
+  <p:clrMapOvr>
+    <a:masterClrMapping/>
+  </p:clrMapOvr>
+</p:sld>
+</file>
+
+<file path=ppt/slides/slide6.xml><?xml version="1.0" encoding="utf-8"?>
 <p:sld xmlns:a="http://schemas.openxmlformats.org/drawingml/2006/main" xmlns:r="http://schemas.openxmlformats.org/officeDocument/2006/relationships" xmlns:p="http://schemas.openxmlformats.org/presentationml/2006/main">
   <p:cSld>
     <p:spTree>

</xml_diff>

<commit_message>
remove temp ppt file
</commit_message>
<xml_diff>
--- a/catkin_ws/diagrams.pptx
+++ b/catkin_ws/diagrams.pptx
@@ -202,7 +202,7 @@
           <a:p>
             <a:fld id="{29E52F65-0780-45DC-A6B0-5D271DABE297}" type="datetimeFigureOut">
               <a:rPr lang="en-GB" smtClean="0"/>
-              <a:t>14/12/2018</a:t>
+              <a:t>15/12/2018</a:t>
             </a:fld>
             <a:endParaRPr lang="en-GB"/>
           </a:p>
@@ -617,7 +617,7 @@
           <a:p>
             <a:fld id="{50BABC5D-73AD-A341-9003-8412548A7140}" type="datetimeFigureOut">
               <a:rPr lang="en-US" smtClean="0"/>
-              <a:t>12/14/18</a:t>
+              <a:t>12/15/18</a:t>
             </a:fld>
             <a:endParaRPr lang="en-US"/>
           </a:p>
@@ -815,7 +815,7 @@
           <a:p>
             <a:fld id="{50BABC5D-73AD-A341-9003-8412548A7140}" type="datetimeFigureOut">
               <a:rPr lang="en-US" smtClean="0"/>
-              <a:t>12/14/18</a:t>
+              <a:t>12/15/18</a:t>
             </a:fld>
             <a:endParaRPr lang="en-US"/>
           </a:p>
@@ -1023,7 +1023,7 @@
           <a:p>
             <a:fld id="{50BABC5D-73AD-A341-9003-8412548A7140}" type="datetimeFigureOut">
               <a:rPr lang="en-US" smtClean="0"/>
-              <a:t>12/14/18</a:t>
+              <a:t>12/15/18</a:t>
             </a:fld>
             <a:endParaRPr lang="en-US"/>
           </a:p>
@@ -1221,7 +1221,7 @@
           <a:p>
             <a:fld id="{50BABC5D-73AD-A341-9003-8412548A7140}" type="datetimeFigureOut">
               <a:rPr lang="en-US" smtClean="0"/>
-              <a:t>12/14/18</a:t>
+              <a:t>12/15/18</a:t>
             </a:fld>
             <a:endParaRPr lang="en-US"/>
           </a:p>
@@ -1496,7 +1496,7 @@
           <a:p>
             <a:fld id="{50BABC5D-73AD-A341-9003-8412548A7140}" type="datetimeFigureOut">
               <a:rPr lang="en-US" smtClean="0"/>
-              <a:t>12/14/18</a:t>
+              <a:t>12/15/18</a:t>
             </a:fld>
             <a:endParaRPr lang="en-US"/>
           </a:p>
@@ -1761,7 +1761,7 @@
           <a:p>
             <a:fld id="{50BABC5D-73AD-A341-9003-8412548A7140}" type="datetimeFigureOut">
               <a:rPr lang="en-US" smtClean="0"/>
-              <a:t>12/14/18</a:t>
+              <a:t>12/15/18</a:t>
             </a:fld>
             <a:endParaRPr lang="en-US"/>
           </a:p>
@@ -2173,7 +2173,7 @@
           <a:p>
             <a:fld id="{50BABC5D-73AD-A341-9003-8412548A7140}" type="datetimeFigureOut">
               <a:rPr lang="en-US" smtClean="0"/>
-              <a:t>12/14/18</a:t>
+              <a:t>12/15/18</a:t>
             </a:fld>
             <a:endParaRPr lang="en-US"/>
           </a:p>
@@ -2314,7 +2314,7 @@
           <a:p>
             <a:fld id="{50BABC5D-73AD-A341-9003-8412548A7140}" type="datetimeFigureOut">
               <a:rPr lang="en-US" smtClean="0"/>
-              <a:t>12/14/18</a:t>
+              <a:t>12/15/18</a:t>
             </a:fld>
             <a:endParaRPr lang="en-US"/>
           </a:p>
@@ -2427,7 +2427,7 @@
           <a:p>
             <a:fld id="{50BABC5D-73AD-A341-9003-8412548A7140}" type="datetimeFigureOut">
               <a:rPr lang="en-US" smtClean="0"/>
-              <a:t>12/14/18</a:t>
+              <a:t>12/15/18</a:t>
             </a:fld>
             <a:endParaRPr lang="en-US"/>
           </a:p>
@@ -2738,7 +2738,7 @@
           <a:p>
             <a:fld id="{50BABC5D-73AD-A341-9003-8412548A7140}" type="datetimeFigureOut">
               <a:rPr lang="en-US" smtClean="0"/>
-              <a:t>12/14/18</a:t>
+              <a:t>12/15/18</a:t>
             </a:fld>
             <a:endParaRPr lang="en-US"/>
           </a:p>
@@ -3026,7 +3026,7 @@
           <a:p>
             <a:fld id="{50BABC5D-73AD-A341-9003-8412548A7140}" type="datetimeFigureOut">
               <a:rPr lang="en-US" smtClean="0"/>
-              <a:t>12/14/18</a:t>
+              <a:t>12/15/18</a:t>
             </a:fld>
             <a:endParaRPr lang="en-US"/>
           </a:p>
@@ -3267,7 +3267,7 @@
           <a:p>
             <a:fld id="{50BABC5D-73AD-A341-9003-8412548A7140}" type="datetimeFigureOut">
               <a:rPr lang="en-US" smtClean="0"/>
-              <a:t>12/14/18</a:t>
+              <a:t>12/15/18</a:t>
             </a:fld>
             <a:endParaRPr lang="en-US"/>
           </a:p>
@@ -10102,7 +10102,7 @@
         </p:nvSpPr>
         <p:spPr>
           <a:xfrm>
-            <a:off x="1975269" y="812940"/>
+            <a:off x="473041" y="3429000"/>
             <a:ext cx="1662364" cy="1292662"/>
           </a:xfrm>
           <a:prstGeom prst="rect">

</xml_diff>